<commit_message>
Un poco mas completa
</commit_message>
<xml_diff>
--- a/exposiciones/planificadorCFS/planificadorCFS.pptx
+++ b/exposiciones/planificadorCFS/planificadorCFS.pptx
@@ -20,7 +20,11 @@
     <p:sldId id="268" r:id="rId15"/>
     <p:sldId id="269" r:id="rId16"/>
     <p:sldId id="270" r:id="rId17"/>
-    <p:sldId id="264" r:id="rId18"/>
+    <p:sldId id="272" r:id="rId18"/>
+    <p:sldId id="273" r:id="rId19"/>
+    <p:sldId id="274" r:id="rId20"/>
+    <p:sldId id="275" r:id="rId21"/>
+    <p:sldId id="264" r:id="rId22"/>
   </p:sldIdLst>
   <p:sldSz cx="10080625" cy="7559675"/>
   <p:notesSz cx="7772400" cy="10058400"/>
@@ -6662,6 +6666,49 @@
           </a:p>
         </p:txBody>
       </p:sp>
+      <p:sp>
+        <p:nvSpPr>
+          <p:cNvPr id="2" name="Oval 1"/>
+          <p:cNvSpPr/>
+          <p:nvPr/>
+        </p:nvSpPr>
+        <p:spPr>
+          <a:xfrm>
+            <a:off x="8109585" y="249555"/>
+            <a:ext cx="1229995" cy="1109980"/>
+          </a:xfrm>
+          <a:prstGeom prst="ellipse">
+            <a:avLst/>
+          </a:prstGeom>
+        </p:spPr>
+        <p:style>
+          <a:lnRef idx="2">
+            <a:schemeClr val="accent2">
+              <a:shade val="50000"/>
+            </a:schemeClr>
+          </a:lnRef>
+          <a:fillRef idx="1">
+            <a:schemeClr val="accent2"/>
+          </a:fillRef>
+          <a:effectRef idx="0">
+            <a:schemeClr val="accent2"/>
+          </a:effectRef>
+          <a:fontRef idx="minor">
+            <a:schemeClr val="lt1"/>
+          </a:fontRef>
+        </p:style>
+        <p:txBody>
+          <a:bodyPr rtlCol="0" anchor="ctr"/>
+          <a:p>
+            <a:pPr algn="ctr"/>
+            <a:r>
+              <a:rPr lang="x-none" altLang="en-US"/>
+              <a:t>Pag 3</a:t>
+            </a:r>
+            <a:endParaRPr lang="x-none" altLang="en-US"/>
+          </a:p>
+        </p:txBody>
+      </p:sp>
     </p:spTree>
   </p:cSld>
   <p:clrMapOvr>
@@ -7252,7 +7299,7 @@
                 </a:uFill>
                 <a:latin typeface="Arial" charset="0"/>
               </a:rPr>
-              <a:t>todo y no puede ser prevista por nada </a:t>
+              <a:t>todo y no puede ser prevista por nada. La clase IDLE es usada para planificar la tarea IDLE la cual es ejecutada cuando no hay nada que se pueda ejecutar. Las clases de enmedio son para la implementacion de tiempo real y normal.  </a:t>
             </a:r>
             <a:endParaRPr lang="x-none" altLang="es-MX" sz="3200" b="0" strike="noStrike" spc="-1">
               <a:solidFill>
@@ -7277,6 +7324,1047 @@
 </file>
 
 <file path=ppt/slides/slide14.xml><?xml version="1.0" encoding="utf-8"?>
+<p:sld xmlns:a="http://schemas.openxmlformats.org/drawingml/2006/main" xmlns:r="http://schemas.openxmlformats.org/officeDocument/2006/relationships" xmlns:p="http://schemas.openxmlformats.org/presentationml/2006/main">
+  <p:cSld>
+    <p:spTree>
+      <p:nvGrpSpPr>
+        <p:cNvPr id="1" name=""/>
+        <p:cNvGrpSpPr/>
+        <p:nvPr/>
+      </p:nvGrpSpPr>
+      <p:grpSpPr>
+        <a:xfrm>
+          <a:off x="0" y="0"/>
+          <a:ext cx="0" cy="0"/>
+          <a:chOff x="0" y="0"/>
+          <a:chExt cx="0" cy="0"/>
+        </a:xfrm>
+      </p:grpSpPr>
+      <p:sp>
+        <p:nvSpPr>
+          <p:cNvPr id="133" name="TextShape 1"/>
+          <p:cNvSpPr txBox="1"/>
+          <p:nvPr/>
+        </p:nvSpPr>
+        <p:spPr>
+          <a:xfrm>
+            <a:off x="457200" y="182880"/>
+            <a:ext cx="8568000" cy="1440000"/>
+          </a:xfrm>
+          <a:prstGeom prst="rect">
+            <a:avLst/>
+          </a:prstGeom>
+          <a:noFill/>
+          <a:ln>
+            <a:noFill/>
+          </a:ln>
+        </p:spPr>
+        <p:txBody>
+          <a:bodyPr lIns="0" tIns="0" rIns="0" bIns="0" anchor="ctr"/>
+          <a:p>
+            <a:r>
+              <a:rPr lang="x-none" altLang="es-MX" sz="4000" b="0" strike="noStrike" spc="-1">
+                <a:solidFill>
+                  <a:srgbClr val="FFFFFF"/>
+                </a:solidFill>
+                <a:uFill>
+                  <a:solidFill>
+                    <a:srgbClr val="FFFFFF"/>
+                  </a:solidFill>
+                </a:uFill>
+                <a:latin typeface="Arial" charset="0"/>
+              </a:rPr>
+              <a:t>3 Cola de ejecución principal </a:t>
+            </a:r>
+            <a:r>
+              <a:rPr lang="es-MX" sz="4000" b="0" strike="noStrike" spc="-1">
+                <a:solidFill>
+                  <a:srgbClr val="FFFFFF"/>
+                </a:solidFill>
+                <a:uFill>
+                  <a:solidFill>
+                    <a:srgbClr val="FFFFFF"/>
+                  </a:solidFill>
+                </a:uFill>
+                <a:latin typeface="Arial" charset="0"/>
+              </a:rPr>
+              <a:t> </a:t>
+            </a:r>
+            <a:endParaRPr lang="es-MX" sz="4000" b="0" strike="noStrike" spc="-1">
+              <a:solidFill>
+                <a:srgbClr val="000000"/>
+              </a:solidFill>
+              <a:uFill>
+                <a:solidFill>
+                  <a:srgbClr val="FFFFFF"/>
+                </a:solidFill>
+              </a:uFill>
+              <a:latin typeface="Arial" charset="0"/>
+            </a:endParaRPr>
+          </a:p>
+        </p:txBody>
+      </p:sp>
+      <p:sp>
+        <p:nvSpPr>
+          <p:cNvPr id="134" name="TextShape 2"/>
+          <p:cNvSpPr txBox="1"/>
+          <p:nvPr/>
+        </p:nvSpPr>
+        <p:spPr>
+          <a:xfrm>
+            <a:off x="468000" y="1823760"/>
+            <a:ext cx="9072000" cy="4384440"/>
+          </a:xfrm>
+          <a:prstGeom prst="rect">
+            <a:avLst/>
+          </a:prstGeom>
+          <a:noFill/>
+          <a:ln>
+            <a:noFill/>
+          </a:ln>
+        </p:spPr>
+        <p:txBody>
+          <a:bodyPr lIns="0" tIns="0" rIns="0" bIns="0"/>
+          <a:p>
+            <a:pPr marL="431800" indent="-323850" algn="just">
+              <a:buClr>
+                <a:srgbClr val="000000"/>
+              </a:buClr>
+              <a:buSzPct val="45000"/>
+              <a:buFont typeface="Wingdings" panose="05000000000000000000" charset="2"/>
+              <a:buChar char=""/>
+            </a:pPr>
+            <a:r>
+              <a:rPr lang="x-none" altLang="es-MX" sz="3200" b="0" strike="noStrike" spc="-1">
+                <a:solidFill>
+                  <a:srgbClr val="000000"/>
+                </a:solidFill>
+                <a:uFill>
+                  <a:solidFill>
+                    <a:srgbClr val="FFFFFF"/>
+                  </a:solidFill>
+                </a:uFill>
+                <a:latin typeface="Arial" charset="0"/>
+              </a:rPr>
+              <a:t>Esta cola se diferencia por procesador, esta estructura esta definida en kernel/sched.c , este programa guarda pista de todos las tareas asignadas a un procesador en particular,  y maneja varias estadisticas de planeación acerca la carga del CPU para un mejor balanceo. </a:t>
+            </a:r>
+            <a:endParaRPr lang="x-none" altLang="es-MX" sz="3200" b="0" strike="noStrike" spc="-1">
+              <a:solidFill>
+                <a:srgbClr val="000000"/>
+              </a:solidFill>
+              <a:uFill>
+                <a:solidFill>
+                  <a:srgbClr val="FFFFFF"/>
+                </a:solidFill>
+              </a:uFill>
+              <a:latin typeface="Arial" charset="0"/>
+            </a:endParaRPr>
+          </a:p>
+        </p:txBody>
+      </p:sp>
+    </p:spTree>
+  </p:cSld>
+  <p:clrMapOvr>
+    <a:masterClrMapping/>
+  </p:clrMapOvr>
+</p:sld>
+</file>
+
+<file path=ppt/slides/slide15.xml><?xml version="1.0" encoding="utf-8"?>
+<p:sld xmlns:a="http://schemas.openxmlformats.org/drawingml/2006/main" xmlns:r="http://schemas.openxmlformats.org/officeDocument/2006/relationships" xmlns:p="http://schemas.openxmlformats.org/presentationml/2006/main">
+  <p:cSld>
+    <p:spTree>
+      <p:nvGrpSpPr>
+        <p:cNvPr id="1" name=""/>
+        <p:cNvGrpSpPr/>
+        <p:nvPr/>
+      </p:nvGrpSpPr>
+      <p:grpSpPr>
+        <a:xfrm>
+          <a:off x="0" y="0"/>
+          <a:ext cx="0" cy="0"/>
+          <a:chOff x="0" y="0"/>
+          <a:chExt cx="0" cy="0"/>
+        </a:xfrm>
+      </p:grpSpPr>
+      <p:sp>
+        <p:nvSpPr>
+          <p:cNvPr id="133" name="TextShape 1"/>
+          <p:cNvSpPr txBox="1"/>
+          <p:nvPr/>
+        </p:nvSpPr>
+        <p:spPr>
+          <a:xfrm>
+            <a:off x="457200" y="182880"/>
+            <a:ext cx="8568000" cy="1440000"/>
+          </a:xfrm>
+          <a:prstGeom prst="rect">
+            <a:avLst/>
+          </a:prstGeom>
+          <a:noFill/>
+          <a:ln>
+            <a:noFill/>
+          </a:ln>
+        </p:spPr>
+        <p:txBody>
+          <a:bodyPr lIns="0" tIns="0" rIns="0" bIns="0" anchor="ctr"/>
+          <a:p>
+            <a:r>
+              <a:rPr lang="x-none" altLang="es-MX" sz="4000" b="0" strike="noStrike" spc="-1">
+                <a:solidFill>
+                  <a:srgbClr val="FFFFFF"/>
+                </a:solidFill>
+                <a:uFill>
+                  <a:solidFill>
+                    <a:srgbClr val="FFFFFF"/>
+                  </a:solidFill>
+                </a:uFill>
+                <a:latin typeface="Arial" charset="0"/>
+              </a:rPr>
+              <a:t>3 Cola de ejecución principal </a:t>
+            </a:r>
+            <a:r>
+              <a:rPr lang="es-MX" sz="4000" b="0" strike="noStrike" spc="-1">
+                <a:solidFill>
+                  <a:srgbClr val="FFFFFF"/>
+                </a:solidFill>
+                <a:uFill>
+                  <a:solidFill>
+                    <a:srgbClr val="FFFFFF"/>
+                  </a:solidFill>
+                </a:uFill>
+                <a:latin typeface="Arial" charset="0"/>
+              </a:rPr>
+              <a:t> </a:t>
+            </a:r>
+            <a:endParaRPr lang="es-MX" sz="4000" b="0" strike="noStrike" spc="-1">
+              <a:solidFill>
+                <a:srgbClr val="000000"/>
+              </a:solidFill>
+              <a:uFill>
+                <a:solidFill>
+                  <a:srgbClr val="FFFFFF"/>
+                </a:solidFill>
+              </a:uFill>
+              <a:latin typeface="Arial" charset="0"/>
+            </a:endParaRPr>
+          </a:p>
+        </p:txBody>
+      </p:sp>
+      <p:sp>
+        <p:nvSpPr>
+          <p:cNvPr id="134" name="TextShape 2"/>
+          <p:cNvSpPr txBox="1"/>
+          <p:nvPr/>
+        </p:nvSpPr>
+        <p:spPr>
+          <a:xfrm>
+            <a:off x="468000" y="1823760"/>
+            <a:ext cx="9072000" cy="4384440"/>
+          </a:xfrm>
+          <a:prstGeom prst="rect">
+            <a:avLst/>
+          </a:prstGeom>
+          <a:noFill/>
+          <a:ln>
+            <a:noFill/>
+          </a:ln>
+        </p:spPr>
+        <p:txBody>
+          <a:bodyPr lIns="0" tIns="0" rIns="0" bIns="0"/>
+          <a:p>
+            <a:pPr marL="107950" indent="0" algn="just">
+              <a:buClr>
+                <a:srgbClr val="000000"/>
+              </a:buClr>
+              <a:buSzPct val="45000"/>
+              <a:buFont typeface="Wingdings" panose="05000000000000000000" charset="2"/>
+              <a:buNone/>
+            </a:pPr>
+            <a:r>
+              <a:rPr lang="x-none" altLang="es-MX" sz="3200" b="0" strike="noStrike" spc="-1">
+                <a:solidFill>
+                  <a:srgbClr val="000000"/>
+                </a:solidFill>
+                <a:uFill>
+                  <a:solidFill>
+                    <a:srgbClr val="FFFFFF"/>
+                  </a:solidFill>
+                </a:uFill>
+                <a:latin typeface="Arial" charset="0"/>
+              </a:rPr>
+              <a:t>Este programa contiene: </a:t>
+            </a:r>
+            <a:endParaRPr lang="x-none" altLang="es-MX" sz="3200" b="0" strike="noStrike" spc="-1">
+              <a:solidFill>
+                <a:srgbClr val="000000"/>
+              </a:solidFill>
+              <a:uFill>
+                <a:solidFill>
+                  <a:srgbClr val="FFFFFF"/>
+                </a:solidFill>
+              </a:uFill>
+              <a:latin typeface="Arial" charset="0"/>
+            </a:endParaRPr>
+          </a:p>
+          <a:p>
+            <a:pPr marL="431800" indent="-323850" algn="just">
+              <a:buClr>
+                <a:srgbClr val="000000"/>
+              </a:buClr>
+              <a:buSzPct val="45000"/>
+              <a:buFont typeface="Wingdings" panose="05000000000000000000" charset="2"/>
+              <a:buChar char=""/>
+            </a:pPr>
+            <a:r>
+              <a:rPr lang="x-none" altLang="es-MX" sz="3200" b="0" strike="noStrike" spc="-1">
+                <a:solidFill>
+                  <a:srgbClr val="000000"/>
+                </a:solidFill>
+                <a:uFill>
+                  <a:solidFill>
+                    <a:srgbClr val="FFFFFF"/>
+                  </a:solidFill>
+                </a:uFill>
+                <a:latin typeface="Arial" charset="0"/>
+              </a:rPr>
+              <a:t>un candado para sincronizar operaciones en un CPU  </a:t>
+            </a:r>
+            <a:endParaRPr lang="x-none" altLang="es-MX" sz="3200" b="0" strike="noStrike" spc="-1">
+              <a:solidFill>
+                <a:srgbClr val="000000"/>
+              </a:solidFill>
+              <a:uFill>
+                <a:solidFill>
+                  <a:srgbClr val="FFFFFF"/>
+                </a:solidFill>
+              </a:uFill>
+              <a:latin typeface="Arial" charset="0"/>
+            </a:endParaRPr>
+          </a:p>
+          <a:p>
+            <a:pPr marL="431800" indent="-323850" algn="just">
+              <a:buClr>
+                <a:srgbClr val="000000"/>
+              </a:buClr>
+              <a:buSzPct val="45000"/>
+              <a:buFont typeface="Wingdings" panose="05000000000000000000" charset="2"/>
+              <a:buChar char=""/>
+            </a:pPr>
+            <a:r>
+              <a:rPr lang="x-none" altLang="es-MX" sz="3200" b="0" strike="noStrike" spc="-1">
+                <a:solidFill>
+                  <a:srgbClr val="000000"/>
+                </a:solidFill>
+                <a:uFill>
+                  <a:solidFill>
+                    <a:srgbClr val="FFFFFF"/>
+                  </a:solidFill>
+                </a:uFill>
+                <a:latin typeface="Arial" charset="0"/>
+              </a:rPr>
+              <a:t>apuntadores al </a:t>
+            </a:r>
+            <a:r>
+              <a:rPr lang="x-none" altLang="es-MX" sz="3200" b="0" i="1" strike="noStrike" spc="-1">
+                <a:solidFill>
+                  <a:srgbClr val="000000"/>
+                </a:solidFill>
+                <a:uFill>
+                  <a:solidFill>
+                    <a:srgbClr val="FFFFFF"/>
+                  </a:solidFill>
+                </a:uFill>
+                <a:latin typeface="Arial" charset="0"/>
+              </a:rPr>
+              <a:t>task_structs </a:t>
+            </a:r>
+            <a:r>
+              <a:rPr lang="x-none" altLang="es-MX" sz="3200" b="0" strike="noStrike" spc="-1">
+                <a:solidFill>
+                  <a:srgbClr val="000000"/>
+                </a:solidFill>
+                <a:uFill>
+                  <a:solidFill>
+                    <a:srgbClr val="FFFFFF"/>
+                  </a:solidFill>
+                </a:uFill>
+                <a:latin typeface="Arial" charset="0"/>
+              </a:rPr>
+              <a:t>de la ejecución actual, el IDLE  y tarea STOP </a:t>
+            </a:r>
+            <a:endParaRPr lang="x-none" altLang="es-MX" sz="3200" b="0" strike="noStrike" spc="-1">
+              <a:solidFill>
+                <a:srgbClr val="000000"/>
+              </a:solidFill>
+              <a:uFill>
+                <a:solidFill>
+                  <a:srgbClr val="FFFFFF"/>
+                </a:solidFill>
+              </a:uFill>
+              <a:latin typeface="Arial" charset="0"/>
+            </a:endParaRPr>
+          </a:p>
+          <a:p>
+            <a:pPr marL="431800" indent="-323850" algn="just">
+              <a:buClr>
+                <a:srgbClr val="000000"/>
+              </a:buClr>
+              <a:buSzPct val="45000"/>
+              <a:buFont typeface="Wingdings" panose="05000000000000000000" charset="2"/>
+              <a:buChar char=""/>
+            </a:pPr>
+            <a:endParaRPr lang="x-none" altLang="es-MX" sz="3200" b="0" strike="noStrike" spc="-1">
+              <a:solidFill>
+                <a:srgbClr val="000000"/>
+              </a:solidFill>
+              <a:uFill>
+                <a:solidFill>
+                  <a:srgbClr val="FFFFFF"/>
+                </a:solidFill>
+              </a:uFill>
+              <a:latin typeface="Arial" charset="0"/>
+            </a:endParaRPr>
+          </a:p>
+          <a:p>
+            <a:pPr marL="431800" indent="-323850" algn="just">
+              <a:buClr>
+                <a:srgbClr val="000000"/>
+              </a:buClr>
+              <a:buSzPct val="45000"/>
+              <a:buFont typeface="Wingdings" panose="05000000000000000000" charset="2"/>
+              <a:buChar char=""/>
+            </a:pPr>
+            <a:r>
+              <a:rPr lang="x-none" altLang="es-MX" sz="3200" b="0" strike="noStrike" spc="-1">
+                <a:solidFill>
+                  <a:srgbClr val="000000"/>
+                </a:solidFill>
+                <a:uFill>
+                  <a:solidFill>
+                    <a:srgbClr val="FFFFFF"/>
+                  </a:solidFill>
+                </a:uFill>
+                <a:latin typeface="Arial" charset="0"/>
+              </a:rPr>
+              <a:t>Cola de ejecuciones para tiempo real y normal(fair)</a:t>
+            </a:r>
+            <a:endParaRPr lang="x-none" altLang="es-MX" sz="3200" b="0" strike="noStrike" spc="-1">
+              <a:solidFill>
+                <a:srgbClr val="000000"/>
+              </a:solidFill>
+              <a:uFill>
+                <a:solidFill>
+                  <a:srgbClr val="FFFFFF"/>
+                </a:solidFill>
+              </a:uFill>
+              <a:latin typeface="Arial" charset="0"/>
+            </a:endParaRPr>
+          </a:p>
+          <a:p>
+            <a:pPr marL="431800" indent="-323850" algn="just">
+              <a:buClr>
+                <a:srgbClr val="000000"/>
+              </a:buClr>
+              <a:buSzPct val="45000"/>
+              <a:buFont typeface="Wingdings" panose="05000000000000000000" charset="2"/>
+              <a:buChar char=""/>
+            </a:pPr>
+            <a:endParaRPr lang="x-none" altLang="es-MX" sz="3200" b="0" strike="noStrike" spc="-1">
+              <a:solidFill>
+                <a:srgbClr val="000000"/>
+              </a:solidFill>
+              <a:uFill>
+                <a:solidFill>
+                  <a:srgbClr val="FFFFFF"/>
+                </a:solidFill>
+              </a:uFill>
+              <a:latin typeface="Arial" charset="0"/>
+            </a:endParaRPr>
+          </a:p>
+        </p:txBody>
+      </p:sp>
+      <p:pic>
+        <p:nvPicPr>
+          <p:cNvPr id="2" name="Picture 1"/>
+          <p:cNvPicPr>
+            <a:picLocks noChangeAspect="1"/>
+          </p:cNvPicPr>
+          <p:nvPr/>
+        </p:nvPicPr>
+        <p:blipFill>
+          <a:blip r:embed="rId1"/>
+          <a:stretch>
+            <a:fillRect/>
+          </a:stretch>
+        </p:blipFill>
+        <p:spPr>
+          <a:xfrm>
+            <a:off x="2017395" y="2741295"/>
+            <a:ext cx="3004820" cy="522605"/>
+          </a:xfrm>
+          <a:prstGeom prst="rect">
+            <a:avLst/>
+          </a:prstGeom>
+        </p:spPr>
+      </p:pic>
+      <p:pic>
+        <p:nvPicPr>
+          <p:cNvPr id="3" name="Picture 2"/>
+          <p:cNvPicPr>
+            <a:picLocks noChangeAspect="1"/>
+          </p:cNvPicPr>
+          <p:nvPr/>
+        </p:nvPicPr>
+        <p:blipFill>
+          <a:blip r:embed="rId2"/>
+          <a:stretch>
+            <a:fillRect/>
+          </a:stretch>
+        </p:blipFill>
+        <p:spPr>
+          <a:xfrm>
+            <a:off x="1778635" y="4162425"/>
+            <a:ext cx="5953125" cy="567055"/>
+          </a:xfrm>
+          <a:prstGeom prst="rect">
+            <a:avLst/>
+          </a:prstGeom>
+        </p:spPr>
+      </p:pic>
+      <p:pic>
+        <p:nvPicPr>
+          <p:cNvPr id="4" name="Picture 3"/>
+          <p:cNvPicPr>
+            <a:picLocks noChangeAspect="1"/>
+          </p:cNvPicPr>
+          <p:nvPr/>
+        </p:nvPicPr>
+        <p:blipFill>
+          <a:blip r:embed="rId3"/>
+          <a:stretch>
+            <a:fillRect/>
+          </a:stretch>
+        </p:blipFill>
+        <p:spPr>
+          <a:xfrm>
+            <a:off x="1018540" y="5756910"/>
+            <a:ext cx="3121025" cy="924560"/>
+          </a:xfrm>
+          <a:prstGeom prst="rect">
+            <a:avLst/>
+          </a:prstGeom>
+        </p:spPr>
+      </p:pic>
+    </p:spTree>
+  </p:cSld>
+  <p:clrMapOvr>
+    <a:masterClrMapping/>
+  </p:clrMapOvr>
+</p:sld>
+</file>
+
+<file path=ppt/slides/slide16.xml><?xml version="1.0" encoding="utf-8"?>
+<p:sld xmlns:a="http://schemas.openxmlformats.org/drawingml/2006/main" xmlns:r="http://schemas.openxmlformats.org/officeDocument/2006/relationships" xmlns:p="http://schemas.openxmlformats.org/presentationml/2006/main">
+  <p:cSld>
+    <p:spTree>
+      <p:nvGrpSpPr>
+        <p:cNvPr id="1" name=""/>
+        <p:cNvGrpSpPr/>
+        <p:nvPr/>
+      </p:nvGrpSpPr>
+      <p:grpSpPr>
+        <a:xfrm>
+          <a:off x="0" y="0"/>
+          <a:ext cx="0" cy="0"/>
+          <a:chOff x="0" y="0"/>
+          <a:chExt cx="0" cy="0"/>
+        </a:xfrm>
+      </p:grpSpPr>
+      <p:sp>
+        <p:nvSpPr>
+          <p:cNvPr id="133" name="TextShape 1"/>
+          <p:cNvSpPr txBox="1"/>
+          <p:nvPr/>
+        </p:nvSpPr>
+        <p:spPr>
+          <a:xfrm>
+            <a:off x="457200" y="182880"/>
+            <a:ext cx="8568000" cy="1440000"/>
+          </a:xfrm>
+          <a:prstGeom prst="rect">
+            <a:avLst/>
+          </a:prstGeom>
+          <a:noFill/>
+          <a:ln>
+            <a:noFill/>
+          </a:ln>
+        </p:spPr>
+        <p:txBody>
+          <a:bodyPr lIns="0" tIns="0" rIns="0" bIns="0" anchor="ctr"/>
+          <a:p>
+            <a:r>
+              <a:rPr lang="x-none" altLang="es-MX" sz="4000" b="0" strike="noStrike" spc="-1">
+                <a:solidFill>
+                  <a:srgbClr val="FFFFFF"/>
+                </a:solidFill>
+                <a:uFill>
+                  <a:solidFill>
+                    <a:srgbClr val="FFFFFF"/>
+                  </a:solidFill>
+                </a:uFill>
+                <a:latin typeface="Arial" charset="0"/>
+              </a:rPr>
+              <a:t>4 El esqueleto del planificador </a:t>
+            </a:r>
+            <a:r>
+              <a:rPr lang="es-MX" sz="4000" b="0" strike="noStrike" spc="-1">
+                <a:solidFill>
+                  <a:srgbClr val="FFFFFF"/>
+                </a:solidFill>
+                <a:uFill>
+                  <a:solidFill>
+                    <a:srgbClr val="FFFFFF"/>
+                  </a:solidFill>
+                </a:uFill>
+                <a:latin typeface="Arial" charset="0"/>
+              </a:rPr>
+              <a:t> </a:t>
+            </a:r>
+            <a:endParaRPr lang="es-MX" sz="4000" b="0" strike="noStrike" spc="-1">
+              <a:solidFill>
+                <a:srgbClr val="000000"/>
+              </a:solidFill>
+              <a:uFill>
+                <a:solidFill>
+                  <a:srgbClr val="FFFFFF"/>
+                </a:solidFill>
+              </a:uFill>
+              <a:latin typeface="Arial" charset="0"/>
+            </a:endParaRPr>
+          </a:p>
+        </p:txBody>
+      </p:sp>
+      <p:sp>
+        <p:nvSpPr>
+          <p:cNvPr id="134" name="TextShape 2"/>
+          <p:cNvSpPr txBox="1"/>
+          <p:nvPr/>
+        </p:nvSpPr>
+        <p:spPr>
+          <a:xfrm>
+            <a:off x="436885" y="1807250"/>
+            <a:ext cx="9072000" cy="4384440"/>
+          </a:xfrm>
+          <a:prstGeom prst="rect">
+            <a:avLst/>
+          </a:prstGeom>
+          <a:noFill/>
+          <a:ln>
+            <a:noFill/>
+          </a:ln>
+        </p:spPr>
+        <p:txBody>
+          <a:bodyPr lIns="0" tIns="0" rIns="0" bIns="0"/>
+          <a:p>
+            <a:pPr marL="431800" indent="-323850" algn="just">
+              <a:buClr>
+                <a:srgbClr val="000000"/>
+              </a:buClr>
+              <a:buSzPct val="45000"/>
+              <a:buFont typeface="Wingdings" panose="05000000000000000000" charset="2"/>
+              <a:buChar char=""/>
+            </a:pPr>
+            <a:r>
+              <a:rPr lang="x-none" altLang="es-MX" sz="3200" b="0" strike="noStrike" spc="-1">
+                <a:solidFill>
+                  <a:srgbClr val="000000"/>
+                </a:solidFill>
+                <a:uFill>
+                  <a:solidFill>
+                    <a:srgbClr val="FFFFFF"/>
+                  </a:solidFill>
+                </a:uFill>
+                <a:latin typeface="Arial" charset="0"/>
+              </a:rPr>
+              <a:t>Para abordar este tema se puede tomar como punto de partida la función schedule(), definida  en kernel/sched.c . Esta es la función que el resto del kernel usa para ejecutar el ejecutar el proceso planificador, decidiendo que proceso ejecutar y ejecuntándolo.</a:t>
+            </a:r>
+            <a:endParaRPr lang="x-none" altLang="es-MX" sz="3200" b="0" strike="noStrike" spc="-1">
+              <a:solidFill>
+                <a:srgbClr val="000000"/>
+              </a:solidFill>
+              <a:uFill>
+                <a:solidFill>
+                  <a:srgbClr val="FFFFFF"/>
+                </a:solidFill>
+              </a:uFill>
+              <a:latin typeface="Arial" charset="0"/>
+            </a:endParaRPr>
+          </a:p>
+          <a:p>
+            <a:pPr marL="431800" indent="-323850" algn="just">
+              <a:buClr>
+                <a:srgbClr val="000000"/>
+              </a:buClr>
+              <a:buSzPct val="45000"/>
+              <a:buFont typeface="Wingdings" panose="05000000000000000000" charset="2"/>
+              <a:buChar char=""/>
+            </a:pPr>
+            <a:r>
+              <a:rPr lang="x-none" altLang="es-MX" sz="3200" b="0" strike="noStrike" spc="-1">
+                <a:solidFill>
+                  <a:srgbClr val="000000"/>
+                </a:solidFill>
+                <a:uFill>
+                  <a:solidFill>
+                    <a:srgbClr val="FFFFFF"/>
+                  </a:solidFill>
+                </a:uFill>
+                <a:latin typeface="Arial" charset="0"/>
+              </a:rPr>
+              <a:t>Su objetivo principal es buscar la siguiente tarea a ser ejecutada y asignarlo a la variable </a:t>
+            </a:r>
+            <a:r>
+              <a:rPr lang="x-none" altLang="es-MX" sz="3200" b="0" i="1" strike="noStrike" spc="-1">
+                <a:solidFill>
+                  <a:srgbClr val="000000"/>
+                </a:solidFill>
+                <a:uFill>
+                  <a:solidFill>
+                    <a:srgbClr val="FFFFFF"/>
+                  </a:solidFill>
+                </a:uFill>
+                <a:latin typeface="Arial" charset="0"/>
+              </a:rPr>
+              <a:t>next </a:t>
+            </a:r>
+            <a:r>
+              <a:rPr lang="x-none" altLang="es-MX" sz="3200" b="0" strike="noStrike" spc="-1">
+                <a:solidFill>
+                  <a:srgbClr val="000000"/>
+                </a:solidFill>
+                <a:uFill>
+                  <a:solidFill>
+                    <a:srgbClr val="FFFFFF"/>
+                  </a:solidFill>
+                </a:uFill>
+                <a:latin typeface="Arial" charset="0"/>
+              </a:rPr>
+              <a:t>. Al final ejecutar un cambio de contexto para cambiar a una nueva tarea.</a:t>
+            </a:r>
+            <a:endParaRPr lang="x-none" altLang="es-MX" sz="3200" b="0" strike="noStrike" spc="-1">
+              <a:solidFill>
+                <a:srgbClr val="000000"/>
+              </a:solidFill>
+              <a:uFill>
+                <a:solidFill>
+                  <a:srgbClr val="FFFFFF"/>
+                </a:solidFill>
+              </a:uFill>
+              <a:latin typeface="Arial" charset="0"/>
+            </a:endParaRPr>
+          </a:p>
+        </p:txBody>
+      </p:sp>
+      <p:sp>
+        <p:nvSpPr>
+          <p:cNvPr id="5" name="TextShape 2"/>
+          <p:cNvSpPr txBox="1"/>
+          <p:nvPr/>
+        </p:nvSpPr>
+        <p:spPr>
+          <a:xfrm>
+            <a:off x="563885" y="1934250"/>
+            <a:ext cx="9072000" cy="4384440"/>
+          </a:xfrm>
+          <a:prstGeom prst="rect">
+            <a:avLst/>
+          </a:prstGeom>
+          <a:noFill/>
+          <a:ln>
+            <a:noFill/>
+          </a:ln>
+        </p:spPr>
+        <p:txBody>
+          <a:bodyPr lIns="0" tIns="0" rIns="0" bIns="0"/>
+          <a:p>
+            <a:pPr marL="431800" indent="-323850" algn="just">
+              <a:buClr>
+                <a:srgbClr val="000000"/>
+              </a:buClr>
+              <a:buSzPct val="45000"/>
+              <a:buFont typeface="Wingdings" panose="05000000000000000000" charset="2"/>
+              <a:buChar char=""/>
+            </a:pPr>
+            <a:endParaRPr lang="x-none" altLang="es-MX" sz="3200" b="0" strike="noStrike" spc="-1">
+              <a:solidFill>
+                <a:srgbClr val="000000"/>
+              </a:solidFill>
+              <a:uFill>
+                <a:solidFill>
+                  <a:srgbClr val="FFFFFF"/>
+                </a:solidFill>
+              </a:uFill>
+              <a:latin typeface="Arial" charset="0"/>
+            </a:endParaRPr>
+          </a:p>
+        </p:txBody>
+      </p:sp>
+    </p:spTree>
+  </p:cSld>
+  <p:clrMapOvr>
+    <a:masterClrMapping/>
+  </p:clrMapOvr>
+</p:sld>
+</file>
+
+<file path=ppt/slides/slide17.xml><?xml version="1.0" encoding="utf-8"?>
+<p:sld xmlns:a="http://schemas.openxmlformats.org/drawingml/2006/main" xmlns:r="http://schemas.openxmlformats.org/officeDocument/2006/relationships" xmlns:p="http://schemas.openxmlformats.org/presentationml/2006/main">
+  <p:cSld>
+    <p:spTree>
+      <p:nvGrpSpPr>
+        <p:cNvPr id="1" name=""/>
+        <p:cNvGrpSpPr/>
+        <p:nvPr/>
+      </p:nvGrpSpPr>
+      <p:grpSpPr>
+        <a:xfrm>
+          <a:off x="0" y="0"/>
+          <a:ext cx="0" cy="0"/>
+          <a:chOff x="0" y="0"/>
+          <a:chExt cx="0" cy="0"/>
+        </a:xfrm>
+      </p:grpSpPr>
+      <p:sp>
+        <p:nvSpPr>
+          <p:cNvPr id="133" name="TextShape 1"/>
+          <p:cNvSpPr txBox="1"/>
+          <p:nvPr/>
+        </p:nvSpPr>
+        <p:spPr>
+          <a:xfrm>
+            <a:off x="457200" y="182880"/>
+            <a:ext cx="8568000" cy="1440000"/>
+          </a:xfrm>
+          <a:prstGeom prst="rect">
+            <a:avLst/>
+          </a:prstGeom>
+          <a:noFill/>
+          <a:ln>
+            <a:noFill/>
+          </a:ln>
+        </p:spPr>
+        <p:txBody>
+          <a:bodyPr lIns="0" tIns="0" rIns="0" bIns="0" anchor="ctr"/>
+          <a:p>
+            <a:r>
+              <a:rPr lang="x-none" altLang="es-MX" sz="4000" b="0" strike="noStrike" spc="-1">
+                <a:solidFill>
+                  <a:srgbClr val="FFFFFF"/>
+                </a:solidFill>
+                <a:uFill>
+                  <a:solidFill>
+                    <a:srgbClr val="FFFFFF"/>
+                  </a:solidFill>
+                </a:uFill>
+                <a:latin typeface="Arial" charset="0"/>
+              </a:rPr>
+              <a:t>4 El esqueleto del planificador </a:t>
+            </a:r>
+            <a:r>
+              <a:rPr lang="es-MX" sz="4000" b="0" strike="noStrike" spc="-1">
+                <a:solidFill>
+                  <a:srgbClr val="FFFFFF"/>
+                </a:solidFill>
+                <a:uFill>
+                  <a:solidFill>
+                    <a:srgbClr val="FFFFFF"/>
+                  </a:solidFill>
+                </a:uFill>
+                <a:latin typeface="Arial" charset="0"/>
+              </a:rPr>
+              <a:t> </a:t>
+            </a:r>
+            <a:endParaRPr lang="es-MX" sz="4000" b="0" strike="noStrike" spc="-1">
+              <a:solidFill>
+                <a:srgbClr val="000000"/>
+              </a:solidFill>
+              <a:uFill>
+                <a:solidFill>
+                  <a:srgbClr val="FFFFFF"/>
+                </a:solidFill>
+              </a:uFill>
+              <a:latin typeface="Arial" charset="0"/>
+            </a:endParaRPr>
+          </a:p>
+        </p:txBody>
+      </p:sp>
+      <p:sp>
+        <p:nvSpPr>
+          <p:cNvPr id="134" name="TextShape 2"/>
+          <p:cNvSpPr txBox="1"/>
+          <p:nvPr/>
+        </p:nvSpPr>
+        <p:spPr>
+          <a:xfrm>
+            <a:off x="436885" y="1807250"/>
+            <a:ext cx="9072000" cy="4384440"/>
+          </a:xfrm>
+          <a:prstGeom prst="rect">
+            <a:avLst/>
+          </a:prstGeom>
+          <a:noFill/>
+          <a:ln>
+            <a:noFill/>
+          </a:ln>
+        </p:spPr>
+        <p:txBody>
+          <a:bodyPr lIns="0" tIns="0" rIns="0" bIns="0"/>
+          <a:p>
+            <a:pPr marL="431800" indent="-323850" algn="just">
+              <a:buClr>
+                <a:srgbClr val="000000"/>
+              </a:buClr>
+              <a:buSzPct val="45000"/>
+              <a:buFont typeface="Wingdings" panose="05000000000000000000" charset="2"/>
+              <a:buChar char=""/>
+            </a:pPr>
+            <a:r>
+              <a:rPr lang="x-none" altLang="es-MX" sz="3200" b="0" strike="noStrike" spc="-1">
+                <a:solidFill>
+                  <a:srgbClr val="000000"/>
+                </a:solidFill>
+                <a:uFill>
+                  <a:solidFill>
+                    <a:srgbClr val="FFFFFF"/>
+                  </a:solidFill>
+                </a:uFill>
+                <a:latin typeface="Arial" charset="0"/>
+              </a:rPr>
+              <a:t>Desde que el kernel de Linux es </a:t>
+            </a:r>
+            <a:r>
+              <a:rPr lang="x-none" altLang="es-MX" sz="3200" b="0" i="1" strike="noStrike" spc="-1">
+                <a:solidFill>
+                  <a:srgbClr val="000000"/>
+                </a:solidFill>
+                <a:uFill>
+                  <a:solidFill>
+                    <a:srgbClr val="FFFFFF"/>
+                  </a:solidFill>
+                </a:uFill>
+                <a:latin typeface="Arial" charset="0"/>
+              </a:rPr>
+              <a:t>expulsivo,</a:t>
+            </a:r>
+            <a:r>
+              <a:rPr lang="x-none" altLang="es-MX" sz="3200" b="0" strike="noStrike" spc="-1">
+                <a:solidFill>
+                  <a:srgbClr val="000000"/>
+                </a:solidFill>
+                <a:uFill>
+                  <a:solidFill>
+                    <a:srgbClr val="FFFFFF"/>
+                  </a:solidFill>
+                </a:uFill>
+                <a:latin typeface="Arial" charset="0"/>
+              </a:rPr>
+              <a:t> puede pasar que una tarea que se ejeuta en espacio de kernel se involutariamente expulsada por otra tarea de mayor prioridad es por eso que lo primero que se hace es ejecutar  la función  </a:t>
+            </a:r>
+            <a:r>
+              <a:rPr lang="x-none" altLang="es-MX" sz="3200" b="0" i="1" strike="noStrike" spc="-1">
+                <a:solidFill>
+                  <a:srgbClr val="000000"/>
+                </a:solidFill>
+                <a:uFill>
+                  <a:solidFill>
+                    <a:srgbClr val="FFFFFF"/>
+                  </a:solidFill>
+                </a:uFill>
+                <a:latin typeface="Arial" charset="0"/>
+              </a:rPr>
+              <a:t>preempt_disable() </a:t>
+            </a:r>
+            <a:r>
+              <a:rPr lang="x-none" altLang="es-MX" sz="3200" b="0" strike="noStrike" spc="-1">
+                <a:solidFill>
+                  <a:srgbClr val="000000"/>
+                </a:solidFill>
+                <a:uFill>
+                  <a:solidFill>
+                    <a:srgbClr val="FFFFFF"/>
+                  </a:solidFill>
+                </a:uFill>
+                <a:latin typeface="Arial" charset="0"/>
+              </a:rPr>
+              <a:t>entonces el planificador no puede ser interrumpido durante la ejecución de un operación crítica.</a:t>
+            </a:r>
+            <a:endParaRPr lang="x-none" altLang="es-MX" sz="3200" b="0" strike="noStrike" spc="-1">
+              <a:solidFill>
+                <a:srgbClr val="000000"/>
+              </a:solidFill>
+              <a:uFill>
+                <a:solidFill>
+                  <a:srgbClr val="FFFFFF"/>
+                </a:solidFill>
+              </a:uFill>
+              <a:latin typeface="Arial" charset="0"/>
+            </a:endParaRPr>
+          </a:p>
+        </p:txBody>
+      </p:sp>
+      <p:sp>
+        <p:nvSpPr>
+          <p:cNvPr id="2" name="Oval 1"/>
+          <p:cNvSpPr/>
+          <p:nvPr/>
+        </p:nvSpPr>
+        <p:spPr>
+          <a:xfrm>
+            <a:off x="8109585" y="249555"/>
+            <a:ext cx="1229995" cy="1109980"/>
+          </a:xfrm>
+          <a:prstGeom prst="ellipse">
+            <a:avLst/>
+          </a:prstGeom>
+        </p:spPr>
+        <p:style>
+          <a:lnRef idx="2">
+            <a:schemeClr val="accent2">
+              <a:shade val="50000"/>
+            </a:schemeClr>
+          </a:lnRef>
+          <a:fillRef idx="1">
+            <a:schemeClr val="accent2"/>
+          </a:fillRef>
+          <a:effectRef idx="0">
+            <a:schemeClr val="accent2"/>
+          </a:effectRef>
+          <a:fontRef idx="minor">
+            <a:schemeClr val="lt1"/>
+          </a:fontRef>
+        </p:style>
+        <p:txBody>
+          <a:bodyPr rtlCol="0" anchor="ctr"/>
+          <a:p>
+            <a:pPr algn="ctr"/>
+            <a:r>
+              <a:rPr lang="x-none" altLang="en-US"/>
+              <a:t>Pag 6</a:t>
+            </a:r>
+            <a:endParaRPr lang="x-none" altLang="en-US"/>
+          </a:p>
+        </p:txBody>
+      </p:sp>
+    </p:spTree>
+  </p:cSld>
+  <p:clrMapOvr>
+    <a:masterClrMapping/>
+  </p:clrMapOvr>
+</p:sld>
+</file>
+
+<file path=ppt/slides/slide18.xml><?xml version="1.0" encoding="utf-8"?>
 <p:sld xmlns:a="http://schemas.openxmlformats.org/drawingml/2006/main" xmlns:r="http://schemas.openxmlformats.org/officeDocument/2006/relationships" xmlns:p="http://schemas.openxmlformats.org/presentationml/2006/main">
   <p:cSld>
     <p:spTree>

</xml_diff>

<commit_message>
casi termino falta 6,7,7.1,7.2
</commit_message>
<xml_diff>
--- a/exposiciones/planificadorCFS/planificadorCFS.pptx
+++ b/exposiciones/planificadorCFS/planificadorCFS.pptx
@@ -24,7 +24,12 @@
     <p:sldId id="273" r:id="rId19"/>
     <p:sldId id="274" r:id="rId20"/>
     <p:sldId id="275" r:id="rId21"/>
-    <p:sldId id="264" r:id="rId22"/>
+    <p:sldId id="277" r:id="rId22"/>
+    <p:sldId id="278" r:id="rId23"/>
+    <p:sldId id="279" r:id="rId24"/>
+    <p:sldId id="280" r:id="rId25"/>
+    <p:sldId id="281" r:id="rId26"/>
+    <p:sldId id="264" r:id="rId27"/>
   </p:sldIdLst>
   <p:sldSz cx="10080625" cy="7559675"/>
   <p:notesSz cx="7772400" cy="10058400"/>
@@ -8383,14 +8388,14 @@
       </p:grpSpPr>
       <p:sp>
         <p:nvSpPr>
-          <p:cNvPr id="135" name="TextShape 1"/>
+          <p:cNvPr id="133" name="TextShape 1"/>
           <p:cNvSpPr txBox="1"/>
           <p:nvPr/>
         </p:nvSpPr>
         <p:spPr>
           <a:xfrm>
-            <a:off x="504000" y="627840"/>
-            <a:ext cx="7020000" cy="567360"/>
+            <a:off x="457200" y="182880"/>
+            <a:ext cx="8568000" cy="1440000"/>
           </a:xfrm>
           <a:prstGeom prst="rect">
             <a:avLst/>
@@ -8404,6 +8409,20 @@
           <a:bodyPr lIns="0" tIns="0" rIns="0" bIns="0" anchor="ctr"/>
           <a:p>
             <a:r>
+              <a:rPr lang="x-none" altLang="es-MX" sz="4000" b="0" strike="noStrike" spc="-1">
+                <a:solidFill>
+                  <a:srgbClr val="FFFFFF"/>
+                </a:solidFill>
+                <a:uFill>
+                  <a:solidFill>
+                    <a:srgbClr val="FFFFFF"/>
+                  </a:solidFill>
+                </a:uFill>
+                <a:latin typeface="Arial" charset="0"/>
+              </a:rPr>
+              <a:t>4 El esqueleto del planificador </a:t>
+            </a:r>
+            <a:r>
               <a:rPr lang="es-MX" sz="4000" b="0" strike="noStrike" spc="-1">
                 <a:solidFill>
                   <a:srgbClr val="FFFFFF"/>
@@ -8415,7 +8434,7 @@
                 </a:uFill>
                 <a:latin typeface="Arial" charset="0"/>
               </a:rPr>
-              <a:t>Referencias</a:t>
+              <a:t> </a:t>
             </a:r>
             <a:endParaRPr lang="es-MX" sz="4000" b="0" strike="noStrike" spc="-1">
               <a:solidFill>
@@ -8433,14 +8452,14 @@
       </p:sp>
       <p:sp>
         <p:nvSpPr>
-          <p:cNvPr id="136" name="TextShape 2"/>
+          <p:cNvPr id="134" name="TextShape 2"/>
           <p:cNvSpPr txBox="1"/>
           <p:nvPr/>
         </p:nvSpPr>
         <p:spPr>
           <a:xfrm>
-            <a:off x="-66240" y="1823760"/>
-            <a:ext cx="9850320" cy="4384440"/>
+            <a:off x="436885" y="1807250"/>
+            <a:ext cx="9072000" cy="4384440"/>
           </a:xfrm>
           <a:prstGeom prst="rect">
             <a:avLst/>
@@ -8453,7 +8472,7 @@
         <p:txBody>
           <a:bodyPr lIns="0" tIns="0" rIns="0" bIns="0"/>
           <a:p>
-            <a:pPr marL="431800" indent="-323850">
+            <a:pPr marL="431800" indent="-323850" algn="just">
               <a:buClr>
                 <a:srgbClr val="000000"/>
               </a:buClr>
@@ -8462,61 +8481,33 @@
               <a:buChar char=""/>
             </a:pPr>
             <a:r>
-              <a:rPr lang="es-MX" sz="2800" b="0" i="1" strike="noStrike" spc="-1">
-                <a:solidFill>
-                  <a:srgbClr val="000000"/>
-                </a:solidFill>
-                <a:uFill>
-                  <a:solidFill>
-                    <a:srgbClr val="FFFFFF"/>
-                  </a:solidFill>
-                </a:uFill>
-                <a:latin typeface="Arial" charset="0"/>
-              </a:rPr>
-              <a:t>Process Scheduling in Linux, </a:t>
-            </a:r>
-            <a:r>
-              <a:rPr lang="es-MX" sz="2800" b="1" strike="noStrike" spc="-1">
-                <a:solidFill>
-                  <a:srgbClr val="000000"/>
-                </a:solidFill>
-                <a:uFill>
-                  <a:solidFill>
-                    <a:srgbClr val="FFFFFF"/>
-                  </a:solidFill>
-                </a:uFill>
-                <a:latin typeface="Arial" charset="0"/>
-              </a:rPr>
-              <a:t>Volker Seeker</a:t>
-            </a:r>
-            <a:r>
-              <a:rPr lang="es-MX" sz="2800" b="0" strike="noStrike" spc="-1">
-                <a:solidFill>
-                  <a:srgbClr val="000000"/>
-                </a:solidFill>
-                <a:uFill>
-                  <a:solidFill>
-                    <a:srgbClr val="FFFFFF"/>
-                  </a:solidFill>
-                </a:uFill>
-                <a:latin typeface="Arial" charset="0"/>
-              </a:rPr>
-              <a:t>, University of Edinburg, Critical Blue, 5 de Mayo del 2013</a:t>
-            </a:r>
-            <a:endParaRPr lang="es-MX" sz="4620" b="0" strike="noStrike" spc="-1">
-              <a:solidFill>
-                <a:srgbClr val="000000"/>
-              </a:solidFill>
-              <a:uFill>
-                <a:solidFill>
-                  <a:srgbClr val="FFFFFF"/>
-                </a:solidFill>
-              </a:uFill>
-              <a:latin typeface="Arial" charset="0"/>
-            </a:endParaRPr>
-          </a:p>
-          <a:p>
-            <a:pPr marL="431800" indent="-323850">
+              <a:rPr lang="x-none" altLang="es-MX" sz="3200" b="0" strike="noStrike" spc="-1">
+                <a:solidFill>
+                  <a:srgbClr val="000000"/>
+                </a:solidFill>
+                <a:uFill>
+                  <a:solidFill>
+                    <a:srgbClr val="FFFFFF"/>
+                  </a:solidFill>
+                </a:uFill>
+                <a:latin typeface="Arial" charset="0"/>
+              </a:rPr>
+              <a:t>Después el planificador bloquea 	la cola de procesos del CPU actual para que un solo hilo a la vez pueda modificarla.</a:t>
+            </a:r>
+            <a:endParaRPr lang="x-none" altLang="es-MX" sz="3200" b="0" strike="noStrike" spc="-1">
+              <a:solidFill>
+                <a:srgbClr val="000000"/>
+              </a:solidFill>
+              <a:uFill>
+                <a:solidFill>
+                  <a:srgbClr val="FFFFFF"/>
+                </a:solidFill>
+              </a:uFill>
+              <a:latin typeface="Arial" charset="0"/>
+            </a:endParaRPr>
+          </a:p>
+          <a:p>
+            <a:pPr marL="431800" indent="-323850" algn="just">
               <a:buClr>
                 <a:srgbClr val="000000"/>
               </a:buClr>
@@ -8524,91 +8515,20 @@
               <a:buFont typeface="Wingdings" panose="05000000000000000000" charset="2"/>
               <a:buChar char=""/>
             </a:pPr>
-            <a:r>
-              <a:rPr lang="es-MX" sz="2800" b="0" i="1" strike="noStrike" spc="-1">
-                <a:solidFill>
-                  <a:srgbClr val="000000"/>
-                </a:solidFill>
-                <a:uFill>
-                  <a:solidFill>
-                    <a:srgbClr val="FFFFFF"/>
-                  </a:solidFill>
-                </a:uFill>
-                <a:latin typeface="Arial" charset="0"/>
-              </a:rPr>
-              <a:t>Process Scheduling in Linux,</a:t>
-            </a:r>
-            <a:r>
-              <a:rPr lang="es-MX" sz="2800" b="1" i="1" strike="noStrike" spc="-1">
-                <a:solidFill>
-                  <a:srgbClr val="000000"/>
-                </a:solidFill>
-                <a:uFill>
-                  <a:solidFill>
-                    <a:srgbClr val="FFFFFF"/>
-                  </a:solidFill>
-                </a:uFill>
-                <a:latin typeface="Arial" charset="0"/>
-              </a:rPr>
-              <a:t> </a:t>
-            </a:r>
-            <a:r>
-              <a:rPr lang="es-MX" sz="2800" b="1" strike="noStrike" spc="-1">
-                <a:solidFill>
-                  <a:srgbClr val="000000"/>
-                </a:solidFill>
-                <a:uFill>
-                  <a:solidFill>
-                    <a:srgbClr val="FFFFFF"/>
-                  </a:solidFill>
-                </a:uFill>
-                <a:latin typeface="Arial" charset="0"/>
-              </a:rPr>
-              <a:t>Desconocido</a:t>
-            </a:r>
-            <a:r>
-              <a:rPr lang="es-MX" sz="2800" b="0" strike="noStrike" spc="-1">
-                <a:solidFill>
-                  <a:srgbClr val="000000"/>
-                </a:solidFill>
-                <a:uFill>
-                  <a:solidFill>
-                    <a:srgbClr val="FFFFFF"/>
-                  </a:solidFill>
-                </a:uFill>
-                <a:latin typeface="Arial" charset="0"/>
-              </a:rPr>
-              <a:t>,</a:t>
-            </a:r>
-            <a:r>
-              <a:rPr lang="es-MX" sz="2800" b="0" strike="noStrike" spc="-1">
-                <a:solidFill>
-                  <a:srgbClr val="000000"/>
-                </a:solidFill>
-                <a:uFill>
-                  <a:solidFill>
-                    <a:srgbClr val="FFFFFF"/>
-                  </a:solidFill>
-                </a:uFill>
-                <a:latin typeface="Arial" charset="0"/>
-                <a:hlinkClick r:id="rId1"/>
-              </a:rPr>
-              <a:t>http://cs.boisestate.edu/~amit/teaching/597/scheduling.pdf</a:t>
-            </a:r>
-            <a:endParaRPr lang="es-MX" sz="4620" b="0" strike="noStrike" spc="-1">
-              <a:solidFill>
-                <a:srgbClr val="000000"/>
-              </a:solidFill>
-              <a:uFill>
-                <a:solidFill>
-                  <a:srgbClr val="FFFFFF"/>
-                </a:solidFill>
-              </a:uFill>
-              <a:latin typeface="Arial" charset="0"/>
-            </a:endParaRPr>
-          </a:p>
-          <a:p>
-            <a:pPr marL="431800" indent="-323850">
+            <a:endParaRPr lang="x-none" altLang="es-MX" sz="3200" b="0" strike="noStrike" spc="-1">
+              <a:solidFill>
+                <a:srgbClr val="000000"/>
+              </a:solidFill>
+              <a:uFill>
+                <a:solidFill>
+                  <a:srgbClr val="FFFFFF"/>
+                </a:solidFill>
+              </a:uFill>
+              <a:latin typeface="Arial" charset="0"/>
+            </a:endParaRPr>
+          </a:p>
+          <a:p>
+            <a:pPr marL="431800" indent="-323850" algn="just">
               <a:buClr>
                 <a:srgbClr val="000000"/>
               </a:buClr>
@@ -8617,9 +8537,141 @@
               <a:buChar char=""/>
             </a:pPr>
             <a:r>
-              <a:rPr lang="es-MX" sz="2800" b="0" strike="noStrike" spc="-1">
-                <a:solidFill>
-                  <a:srgbClr val="000000"/>
+              <a:rPr lang="x-none" altLang="es-MX" sz="3200" b="0" strike="noStrike" spc="-1">
+                <a:solidFill>
+                  <a:srgbClr val="000000"/>
+                </a:solidFill>
+                <a:uFill>
+                  <a:solidFill>
+                    <a:srgbClr val="FFFFFF"/>
+                  </a:solidFill>
+                </a:uFill>
+                <a:latin typeface="Arial" charset="0"/>
+              </a:rPr>
+              <a:t>Despues el planificador examamina el estado de la tarea anterior y si no es ejecutable y no ha sido expulsada del modo kernel, entonces el removida de la cola de procesos. Si no tiene bloqueo de señal pendiente, su estado es cambiado a tarea en ejecución y es dejado en la cola de procesos .</a:t>
+            </a:r>
+            <a:endParaRPr lang="x-none" altLang="es-MX" sz="3200" b="0" strike="noStrike" spc="-1">
+              <a:solidFill>
+                <a:srgbClr val="000000"/>
+              </a:solidFill>
+              <a:uFill>
+                <a:solidFill>
+                  <a:srgbClr val="FFFFFF"/>
+                </a:solidFill>
+              </a:uFill>
+              <a:latin typeface="Arial" charset="0"/>
+            </a:endParaRPr>
+          </a:p>
+        </p:txBody>
+      </p:sp>
+      <p:sp>
+        <p:nvSpPr>
+          <p:cNvPr id="2" name="Oval 1"/>
+          <p:cNvSpPr/>
+          <p:nvPr/>
+        </p:nvSpPr>
+        <p:spPr>
+          <a:xfrm>
+            <a:off x="8109585" y="249555"/>
+            <a:ext cx="1229995" cy="1109980"/>
+          </a:xfrm>
+          <a:prstGeom prst="ellipse">
+            <a:avLst/>
+          </a:prstGeom>
+        </p:spPr>
+        <p:style>
+          <a:lnRef idx="2">
+            <a:schemeClr val="accent2">
+              <a:shade val="50000"/>
+            </a:schemeClr>
+          </a:lnRef>
+          <a:fillRef idx="1">
+            <a:schemeClr val="accent2"/>
+          </a:fillRef>
+          <a:effectRef idx="0">
+            <a:schemeClr val="accent2"/>
+          </a:effectRef>
+          <a:fontRef idx="minor">
+            <a:schemeClr val="lt1"/>
+          </a:fontRef>
+        </p:style>
+        <p:txBody>
+          <a:bodyPr rtlCol="0" anchor="ctr"/>
+          <a:p>
+            <a:pPr algn="ctr"/>
+            <a:r>
+              <a:rPr lang="x-none" altLang="en-US"/>
+              <a:t>Pag 6</a:t>
+            </a:r>
+            <a:endParaRPr lang="x-none" altLang="en-US"/>
+          </a:p>
+        </p:txBody>
+      </p:sp>
+    </p:spTree>
+  </p:cSld>
+  <p:clrMapOvr>
+    <a:masterClrMapping/>
+  </p:clrMapOvr>
+</p:sld>
+</file>
+
+<file path=ppt/slides/slide19.xml><?xml version="1.0" encoding="utf-8"?>
+<p:sld xmlns:a="http://schemas.openxmlformats.org/drawingml/2006/main" xmlns:r="http://schemas.openxmlformats.org/officeDocument/2006/relationships" xmlns:p="http://schemas.openxmlformats.org/presentationml/2006/main">
+  <p:cSld>
+    <p:spTree>
+      <p:nvGrpSpPr>
+        <p:cNvPr id="1" name=""/>
+        <p:cNvGrpSpPr/>
+        <p:nvPr/>
+      </p:nvGrpSpPr>
+      <p:grpSpPr>
+        <a:xfrm>
+          <a:off x="0" y="0"/>
+          <a:ext cx="0" cy="0"/>
+          <a:chOff x="0" y="0"/>
+          <a:chExt cx="0" cy="0"/>
+        </a:xfrm>
+      </p:grpSpPr>
+      <p:sp>
+        <p:nvSpPr>
+          <p:cNvPr id="133" name="TextShape 1"/>
+          <p:cNvSpPr txBox="1"/>
+          <p:nvPr/>
+        </p:nvSpPr>
+        <p:spPr>
+          <a:xfrm>
+            <a:off x="457200" y="182880"/>
+            <a:ext cx="8568000" cy="1440000"/>
+          </a:xfrm>
+          <a:prstGeom prst="rect">
+            <a:avLst/>
+          </a:prstGeom>
+          <a:noFill/>
+          <a:ln>
+            <a:noFill/>
+          </a:ln>
+        </p:spPr>
+        <p:txBody>
+          <a:bodyPr lIns="0" tIns="0" rIns="0" bIns="0" anchor="ctr"/>
+          <a:p>
+            <a:r>
+              <a:rPr lang="x-none" altLang="es-MX" sz="4000" b="0" strike="noStrike" spc="-1">
+                <a:solidFill>
+                  <a:srgbClr val="FFFFFF"/>
+                </a:solidFill>
+                <a:uFill>
+                  <a:solidFill>
+                    <a:srgbClr val="FFFFFF"/>
+                  </a:solidFill>
+                </a:uFill>
+                <a:latin typeface="Arial" charset="0"/>
+              </a:rPr>
+              <a:t>4 El esqueleto del planificador </a:t>
+            </a:r>
+            <a:r>
+              <a:rPr lang="es-MX" sz="4000" b="0" strike="noStrike" spc="-1">
+                <a:solidFill>
+                  <a:srgbClr val="FFFFFF"/>
                 </a:solidFill>
                 <a:uFill>
                   <a:solidFill>
@@ -8630,20 +8682,165 @@
               </a:rPr>
               <a:t> </a:t>
             </a:r>
-            <a:endParaRPr lang="es-MX" sz="4620" b="0" strike="noStrike" spc="-1">
-              <a:solidFill>
-                <a:srgbClr val="000000"/>
-              </a:solidFill>
-              <a:uFill>
-                <a:solidFill>
-                  <a:srgbClr val="FFFFFF"/>
-                </a:solidFill>
-              </a:uFill>
-              <a:latin typeface="Arial" charset="0"/>
-            </a:endParaRPr>
-          </a:p>
-        </p:txBody>
-      </p:sp>
+            <a:endParaRPr lang="es-MX" sz="4000" b="0" strike="noStrike" spc="-1">
+              <a:solidFill>
+                <a:srgbClr val="000000"/>
+              </a:solidFill>
+              <a:uFill>
+                <a:solidFill>
+                  <a:srgbClr val="FFFFFF"/>
+                </a:solidFill>
+              </a:uFill>
+              <a:latin typeface="Arial" charset="0"/>
+            </a:endParaRPr>
+          </a:p>
+        </p:txBody>
+      </p:sp>
+      <p:sp>
+        <p:nvSpPr>
+          <p:cNvPr id="134" name="TextShape 2"/>
+          <p:cNvSpPr txBox="1"/>
+          <p:nvPr/>
+        </p:nvSpPr>
+        <p:spPr>
+          <a:xfrm>
+            <a:off x="436885" y="1807250"/>
+            <a:ext cx="9072000" cy="4384440"/>
+          </a:xfrm>
+          <a:prstGeom prst="rect">
+            <a:avLst/>
+          </a:prstGeom>
+          <a:noFill/>
+          <a:ln>
+            <a:noFill/>
+          </a:ln>
+        </p:spPr>
+        <p:txBody>
+          <a:bodyPr lIns="0" tIns="0" rIns="0" bIns="0"/>
+          <a:p>
+            <a:pPr marL="431800" indent="-323850" algn="just">
+              <a:buClr>
+                <a:srgbClr val="000000"/>
+              </a:buClr>
+              <a:buSzPct val="45000"/>
+              <a:buFont typeface="Wingdings" panose="05000000000000000000" charset="2"/>
+              <a:buChar char=""/>
+            </a:pPr>
+            <a:r>
+              <a:rPr lang="x-none" altLang="es-MX" sz="3200" b="0" strike="noStrike" spc="-1">
+                <a:solidFill>
+                  <a:srgbClr val="000000"/>
+                </a:solidFill>
+                <a:uFill>
+                  <a:solidFill>
+                    <a:srgbClr val="FFFFFF"/>
+                  </a:solidFill>
+                </a:uFill>
+                <a:latin typeface="Arial" charset="0"/>
+              </a:rPr>
+              <a:t>Para que una tarea sea removida de la cola de procesos, el planificador llama a la función </a:t>
+            </a:r>
+            <a:r>
+              <a:rPr lang="x-none" altLang="es-MX" sz="3200" b="0" i="1" strike="noStrike" spc="-1">
+                <a:solidFill>
+                  <a:srgbClr val="000000"/>
+                </a:solidFill>
+                <a:uFill>
+                  <a:solidFill>
+                    <a:srgbClr val="FFFFFF"/>
+                  </a:solidFill>
+                </a:uFill>
+                <a:latin typeface="Arial" charset="0"/>
+              </a:rPr>
+              <a:t>deactivate_task() </a:t>
+            </a:r>
+            <a:r>
+              <a:rPr lang="x-none" altLang="es-MX" sz="3200" b="0" strike="noStrike" spc="-1">
+                <a:solidFill>
+                  <a:srgbClr val="000000"/>
+                </a:solidFill>
+                <a:uFill>
+                  <a:solidFill>
+                    <a:srgbClr val="FFFFFF"/>
+                  </a:solidFill>
+                </a:uFill>
+                <a:latin typeface="Arial" charset="0"/>
+              </a:rPr>
+              <a:t> la cual de manera interna llama a </a:t>
+            </a:r>
+            <a:r>
+              <a:rPr lang="x-none" altLang="es-MX" sz="3200" b="0" i="1" strike="noStrike" spc="-1">
+                <a:solidFill>
+                  <a:srgbClr val="000000"/>
+                </a:solidFill>
+                <a:uFill>
+                  <a:solidFill>
+                    <a:srgbClr val="FFFFFF"/>
+                  </a:solidFill>
+                </a:uFill>
+                <a:latin typeface="Arial" charset="0"/>
+              </a:rPr>
+              <a:t>dequeue_task(). </a:t>
+            </a:r>
+            <a:endParaRPr lang="x-none" altLang="es-MX" sz="3200" b="0" i="1" strike="noStrike" spc="-1">
+              <a:solidFill>
+                <a:srgbClr val="000000"/>
+              </a:solidFill>
+              <a:uFill>
+                <a:solidFill>
+                  <a:srgbClr val="FFFFFF"/>
+                </a:solidFill>
+              </a:uFill>
+              <a:latin typeface="Arial" charset="0"/>
+            </a:endParaRPr>
+          </a:p>
+          <a:p>
+            <a:pPr marL="431800" indent="-323850" algn="just">
+              <a:buClr>
+                <a:srgbClr val="000000"/>
+              </a:buClr>
+              <a:buSzPct val="45000"/>
+              <a:buFont typeface="Wingdings" panose="05000000000000000000" charset="2"/>
+              <a:buChar char=""/>
+            </a:pPr>
+            <a:endParaRPr lang="x-none" altLang="es-MX" sz="3200" b="0" i="1" strike="noStrike" spc="-1">
+              <a:solidFill>
+                <a:srgbClr val="000000"/>
+              </a:solidFill>
+              <a:uFill>
+                <a:solidFill>
+                  <a:srgbClr val="FFFFFF"/>
+                </a:solidFill>
+              </a:uFill>
+              <a:latin typeface="Arial" charset="0"/>
+            </a:endParaRPr>
+          </a:p>
+        </p:txBody>
+      </p:sp>
+      <p:pic>
+        <p:nvPicPr>
+          <p:cNvPr id="3" name="Picture 2"/>
+          <p:cNvPicPr>
+            <a:picLocks noChangeAspect="1"/>
+          </p:cNvPicPr>
+          <p:nvPr/>
+        </p:nvPicPr>
+        <p:blipFill>
+          <a:blip r:embed="rId1"/>
+          <a:stretch>
+            <a:fillRect/>
+          </a:stretch>
+        </p:blipFill>
+        <p:spPr>
+          <a:xfrm>
+            <a:off x="-10160" y="3922395"/>
+            <a:ext cx="10074275" cy="1836420"/>
+          </a:xfrm>
+          <a:prstGeom prst="rect">
+            <a:avLst/>
+          </a:prstGeom>
+        </p:spPr>
+      </p:pic>
     </p:spTree>
   </p:cSld>
   <p:clrMapOvr>
@@ -8797,6 +8994,1212 @@
                 <a:latin typeface="Arial" charset="0"/>
               </a:rPr>
               <a:t>Su nombre es CFS (Completely fair scheduling) y es un algoritmo   </a:t>
+            </a:r>
+            <a:endParaRPr lang="es-MX" sz="4620" b="0" strike="noStrike" spc="-1">
+              <a:solidFill>
+                <a:srgbClr val="000000"/>
+              </a:solidFill>
+              <a:uFill>
+                <a:solidFill>
+                  <a:srgbClr val="FFFFFF"/>
+                </a:solidFill>
+              </a:uFill>
+              <a:latin typeface="Arial" charset="0"/>
+            </a:endParaRPr>
+          </a:p>
+        </p:txBody>
+      </p:sp>
+    </p:spTree>
+  </p:cSld>
+  <p:clrMapOvr>
+    <a:masterClrMapping/>
+  </p:clrMapOvr>
+</p:sld>
+</file>
+
+<file path=ppt/slides/slide20.xml><?xml version="1.0" encoding="utf-8"?>
+<p:sld xmlns:a="http://schemas.openxmlformats.org/drawingml/2006/main" xmlns:r="http://schemas.openxmlformats.org/officeDocument/2006/relationships" xmlns:p="http://schemas.openxmlformats.org/presentationml/2006/main">
+  <p:cSld>
+    <p:spTree>
+      <p:nvGrpSpPr>
+        <p:cNvPr id="1" name=""/>
+        <p:cNvGrpSpPr/>
+        <p:nvPr/>
+      </p:nvGrpSpPr>
+      <p:grpSpPr>
+        <a:xfrm>
+          <a:off x="0" y="0"/>
+          <a:ext cx="0" cy="0"/>
+          <a:chOff x="0" y="0"/>
+          <a:chExt cx="0" cy="0"/>
+        </a:xfrm>
+      </p:grpSpPr>
+      <p:sp>
+        <p:nvSpPr>
+          <p:cNvPr id="133" name="TextShape 1"/>
+          <p:cNvSpPr txBox="1"/>
+          <p:nvPr/>
+        </p:nvSpPr>
+        <p:spPr>
+          <a:xfrm>
+            <a:off x="457200" y="182880"/>
+            <a:ext cx="8568000" cy="1440000"/>
+          </a:xfrm>
+          <a:prstGeom prst="rect">
+            <a:avLst/>
+          </a:prstGeom>
+          <a:noFill/>
+          <a:ln>
+            <a:noFill/>
+          </a:ln>
+        </p:spPr>
+        <p:txBody>
+          <a:bodyPr lIns="0" tIns="0" rIns="0" bIns="0" anchor="ctr"/>
+          <a:p>
+            <a:r>
+              <a:rPr lang="x-none" altLang="es-MX" sz="4000" b="0" strike="noStrike" spc="-1">
+                <a:solidFill>
+                  <a:srgbClr val="FFFFFF"/>
+                </a:solidFill>
+                <a:uFill>
+                  <a:solidFill>
+                    <a:srgbClr val="FFFFFF"/>
+                  </a:solidFill>
+                </a:uFill>
+                <a:latin typeface="Arial" charset="0"/>
+              </a:rPr>
+              <a:t>4 El esqueleto del planificador </a:t>
+            </a:r>
+            <a:r>
+              <a:rPr lang="es-MX" sz="4000" b="0" strike="noStrike" spc="-1">
+                <a:solidFill>
+                  <a:srgbClr val="FFFFFF"/>
+                </a:solidFill>
+                <a:uFill>
+                  <a:solidFill>
+                    <a:srgbClr val="FFFFFF"/>
+                  </a:solidFill>
+                </a:uFill>
+                <a:latin typeface="Arial" charset="0"/>
+              </a:rPr>
+              <a:t> </a:t>
+            </a:r>
+            <a:endParaRPr lang="es-MX" sz="4000" b="0" strike="noStrike" spc="-1">
+              <a:solidFill>
+                <a:srgbClr val="000000"/>
+              </a:solidFill>
+              <a:uFill>
+                <a:solidFill>
+                  <a:srgbClr val="FFFFFF"/>
+                </a:solidFill>
+              </a:uFill>
+              <a:latin typeface="Arial" charset="0"/>
+            </a:endParaRPr>
+          </a:p>
+        </p:txBody>
+      </p:sp>
+      <p:sp>
+        <p:nvSpPr>
+          <p:cNvPr id="134" name="TextShape 2"/>
+          <p:cNvSpPr txBox="1"/>
+          <p:nvPr/>
+        </p:nvSpPr>
+        <p:spPr>
+          <a:xfrm>
+            <a:off x="436885" y="1807250"/>
+            <a:ext cx="9072000" cy="4384440"/>
+          </a:xfrm>
+          <a:prstGeom prst="rect">
+            <a:avLst/>
+          </a:prstGeom>
+          <a:noFill/>
+          <a:ln>
+            <a:noFill/>
+          </a:ln>
+        </p:spPr>
+        <p:txBody>
+          <a:bodyPr lIns="0" tIns="0" rIns="0" bIns="0"/>
+          <a:p>
+            <a:pPr marL="431800" indent="-323850" algn="just">
+              <a:buClr>
+                <a:srgbClr val="000000"/>
+              </a:buClr>
+              <a:buSzPct val="45000"/>
+              <a:buFont typeface="Wingdings" panose="05000000000000000000" charset="2"/>
+              <a:buChar char=""/>
+            </a:pPr>
+            <a:r>
+              <a:rPr lang="x-none" altLang="es-MX" sz="3200" b="0" strike="noStrike" spc="-1">
+                <a:solidFill>
+                  <a:srgbClr val="000000"/>
+                </a:solidFill>
+                <a:uFill>
+                  <a:solidFill>
+                    <a:srgbClr val="FFFFFF"/>
+                  </a:solidFill>
+                </a:uFill>
+                <a:latin typeface="Arial" charset="0"/>
+              </a:rPr>
+              <a:t>La siguiente acción es verificar en la cola de procesos si existe alguna tarea que pueda ser ejecutada. Si no es así  </a:t>
+            </a:r>
+            <a:r>
+              <a:rPr lang="x-none" altLang="es-MX" sz="3200" b="0" i="1" strike="noStrike" spc="-1">
+                <a:solidFill>
+                  <a:srgbClr val="000000"/>
+                </a:solidFill>
+                <a:uFill>
+                  <a:solidFill>
+                    <a:srgbClr val="FFFFFF"/>
+                  </a:solidFill>
+                </a:uFill>
+                <a:latin typeface="Arial" charset="0"/>
+              </a:rPr>
+              <a:t>idle_balance() </a:t>
+            </a:r>
+            <a:r>
+              <a:rPr lang="x-none" altLang="es-MX" sz="3200" b="0" strike="noStrike" spc="-1">
+                <a:solidFill>
+                  <a:srgbClr val="000000"/>
+                </a:solidFill>
+                <a:uFill>
+                  <a:solidFill>
+                    <a:srgbClr val="FFFFFF"/>
+                  </a:solidFill>
+                </a:uFill>
+                <a:latin typeface="Arial" charset="0"/>
+              </a:rPr>
+              <a:t> es llamada para buscar una tarea ejecutable en la cola de otro procesador.</a:t>
+            </a:r>
+            <a:endParaRPr lang="x-none" altLang="es-MX" sz="3200" b="0" strike="noStrike" spc="-1">
+              <a:solidFill>
+                <a:srgbClr val="000000"/>
+              </a:solidFill>
+              <a:uFill>
+                <a:solidFill>
+                  <a:srgbClr val="FFFFFF"/>
+                </a:solidFill>
+              </a:uFill>
+              <a:latin typeface="Arial" charset="0"/>
+            </a:endParaRPr>
+          </a:p>
+          <a:p>
+            <a:pPr marL="431800" indent="-323850" algn="just">
+              <a:buClr>
+                <a:srgbClr val="000000"/>
+              </a:buClr>
+              <a:buSzPct val="45000"/>
+              <a:buFont typeface="Wingdings" panose="05000000000000000000" charset="2"/>
+              <a:buChar char=""/>
+            </a:pPr>
+            <a:endParaRPr lang="x-none" altLang="es-MX" sz="3200" b="0" strike="noStrike" spc="-1">
+              <a:solidFill>
+                <a:srgbClr val="000000"/>
+              </a:solidFill>
+              <a:uFill>
+                <a:solidFill>
+                  <a:srgbClr val="FFFFFF"/>
+                </a:solidFill>
+              </a:uFill>
+              <a:latin typeface="Arial" charset="0"/>
+            </a:endParaRPr>
+          </a:p>
+          <a:p>
+            <a:pPr marL="431800" indent="-323850" algn="just">
+              <a:buClr>
+                <a:srgbClr val="000000"/>
+              </a:buClr>
+              <a:buSzPct val="45000"/>
+              <a:buFont typeface="Wingdings" panose="05000000000000000000" charset="2"/>
+              <a:buChar char=""/>
+            </a:pPr>
+            <a:r>
+              <a:rPr lang="x-none" altLang="es-MX" sz="3200" b="0" i="1" strike="noStrike" spc="-1">
+                <a:solidFill>
+                  <a:srgbClr val="000000"/>
+                </a:solidFill>
+                <a:uFill>
+                  <a:solidFill>
+                    <a:srgbClr val="FFFFFF"/>
+                  </a:solidFill>
+                </a:uFill>
+                <a:latin typeface="Arial" charset="0"/>
+              </a:rPr>
+              <a:t>put_prev_task() </a:t>
+            </a:r>
+            <a:r>
+              <a:rPr lang="x-none" altLang="es-MX" sz="3200" b="0" strike="noStrike" spc="-1">
+                <a:solidFill>
+                  <a:srgbClr val="000000"/>
+                </a:solidFill>
+                <a:uFill>
+                  <a:solidFill>
+                    <a:srgbClr val="FFFFFF"/>
+                  </a:solidFill>
+                </a:uFill>
+                <a:latin typeface="Arial" charset="0"/>
+              </a:rPr>
+              <a:t>es una </a:t>
+            </a:r>
+            <a:r>
+              <a:rPr lang="x-none" altLang="es-MX" sz="3200" b="0" i="1" strike="noStrike" spc="-1">
+                <a:solidFill>
+                  <a:srgbClr val="000000"/>
+                </a:solidFill>
+                <a:uFill>
+                  <a:solidFill>
+                    <a:srgbClr val="FFFFFF"/>
+                  </a:solidFill>
+                </a:uFill>
+                <a:latin typeface="Arial" charset="0"/>
+              </a:rPr>
+              <a:t>clase de planificador </a:t>
+            </a:r>
+            <a:r>
+              <a:rPr lang="x-none" altLang="es-MX" sz="3200" b="0" strike="noStrike" spc="-1">
+                <a:solidFill>
+                  <a:srgbClr val="000000"/>
+                </a:solidFill>
+                <a:uFill>
+                  <a:solidFill>
+                    <a:srgbClr val="FFFFFF"/>
+                  </a:solidFill>
+                </a:uFill>
+                <a:latin typeface="Arial" charset="0"/>
+              </a:rPr>
+              <a:t>que informa sobre una tarea que va a ser cambiada de procesador.</a:t>
+            </a:r>
+            <a:endParaRPr lang="x-none" altLang="es-MX" sz="3200" b="0" strike="noStrike" spc="-1">
+              <a:solidFill>
+                <a:srgbClr val="000000"/>
+              </a:solidFill>
+              <a:uFill>
+                <a:solidFill>
+                  <a:srgbClr val="FFFFFF"/>
+                </a:solidFill>
+              </a:uFill>
+              <a:latin typeface="Arial" charset="0"/>
+            </a:endParaRPr>
+          </a:p>
+        </p:txBody>
+      </p:sp>
+    </p:spTree>
+  </p:cSld>
+  <p:clrMapOvr>
+    <a:masterClrMapping/>
+  </p:clrMapOvr>
+</p:sld>
+</file>
+
+<file path=ppt/slides/slide21.xml><?xml version="1.0" encoding="utf-8"?>
+<p:sld xmlns:a="http://schemas.openxmlformats.org/drawingml/2006/main" xmlns:r="http://schemas.openxmlformats.org/officeDocument/2006/relationships" xmlns:p="http://schemas.openxmlformats.org/presentationml/2006/main">
+  <p:cSld>
+    <p:spTree>
+      <p:nvGrpSpPr>
+        <p:cNvPr id="1" name=""/>
+        <p:cNvGrpSpPr/>
+        <p:nvPr/>
+      </p:nvGrpSpPr>
+      <p:grpSpPr>
+        <a:xfrm>
+          <a:off x="0" y="0"/>
+          <a:ext cx="0" cy="0"/>
+          <a:chOff x="0" y="0"/>
+          <a:chExt cx="0" cy="0"/>
+        </a:xfrm>
+      </p:grpSpPr>
+      <p:sp>
+        <p:nvSpPr>
+          <p:cNvPr id="133" name="TextShape 1"/>
+          <p:cNvSpPr txBox="1"/>
+          <p:nvPr/>
+        </p:nvSpPr>
+        <p:spPr>
+          <a:xfrm>
+            <a:off x="457200" y="182880"/>
+            <a:ext cx="8568000" cy="1440000"/>
+          </a:xfrm>
+          <a:prstGeom prst="rect">
+            <a:avLst/>
+          </a:prstGeom>
+          <a:noFill/>
+          <a:ln>
+            <a:noFill/>
+          </a:ln>
+        </p:spPr>
+        <p:txBody>
+          <a:bodyPr lIns="0" tIns="0" rIns="0" bIns="0" anchor="ctr"/>
+          <a:p>
+            <a:r>
+              <a:rPr lang="x-none" altLang="es-MX" sz="4000" b="0" strike="noStrike" spc="-1">
+                <a:solidFill>
+                  <a:srgbClr val="FFFFFF"/>
+                </a:solidFill>
+                <a:uFill>
+                  <a:solidFill>
+                    <a:srgbClr val="FFFFFF"/>
+                  </a:solidFill>
+                </a:uFill>
+                <a:latin typeface="Arial" charset="0"/>
+              </a:rPr>
+              <a:t>4 El esqueleto del planificador </a:t>
+            </a:r>
+            <a:r>
+              <a:rPr lang="es-MX" sz="4000" b="0" strike="noStrike" spc="-1">
+                <a:solidFill>
+                  <a:srgbClr val="FFFFFF"/>
+                </a:solidFill>
+                <a:uFill>
+                  <a:solidFill>
+                    <a:srgbClr val="FFFFFF"/>
+                  </a:solidFill>
+                </a:uFill>
+                <a:latin typeface="Arial" charset="0"/>
+              </a:rPr>
+              <a:t> </a:t>
+            </a:r>
+            <a:endParaRPr lang="es-MX" sz="4000" b="0" strike="noStrike" spc="-1">
+              <a:solidFill>
+                <a:srgbClr val="000000"/>
+              </a:solidFill>
+              <a:uFill>
+                <a:solidFill>
+                  <a:srgbClr val="FFFFFF"/>
+                </a:solidFill>
+              </a:uFill>
+              <a:latin typeface="Arial" charset="0"/>
+            </a:endParaRPr>
+          </a:p>
+        </p:txBody>
+      </p:sp>
+      <p:sp>
+        <p:nvSpPr>
+          <p:cNvPr id="134" name="TextShape 2"/>
+          <p:cNvSpPr txBox="1"/>
+          <p:nvPr/>
+        </p:nvSpPr>
+        <p:spPr>
+          <a:xfrm>
+            <a:off x="436885" y="1807250"/>
+            <a:ext cx="9072000" cy="4384440"/>
+          </a:xfrm>
+          <a:prstGeom prst="rect">
+            <a:avLst/>
+          </a:prstGeom>
+          <a:noFill/>
+          <a:ln>
+            <a:noFill/>
+          </a:ln>
+        </p:spPr>
+        <p:txBody>
+          <a:bodyPr lIns="0" tIns="0" rIns="0" bIns="0"/>
+          <a:p>
+            <a:pPr marL="431800" indent="-323850" algn="just">
+              <a:buClr>
+                <a:srgbClr val="000000"/>
+              </a:buClr>
+              <a:buSzPct val="45000"/>
+              <a:buFont typeface="Wingdings" panose="05000000000000000000" charset="2"/>
+              <a:buChar char=""/>
+            </a:pPr>
+            <a:r>
+              <a:rPr lang="x-none" altLang="es-MX" sz="3200" b="0" strike="noStrike" spc="-1">
+                <a:solidFill>
+                  <a:srgbClr val="000000"/>
+                </a:solidFill>
+                <a:uFill>
+                  <a:solidFill>
+                    <a:srgbClr val="FFFFFF"/>
+                  </a:solidFill>
+                </a:uFill>
+                <a:latin typeface="Arial" charset="0"/>
+              </a:rPr>
+              <a:t>Entonces la clase correspondiente llama a la función  </a:t>
+            </a:r>
+            <a:r>
+              <a:rPr lang="x-none" altLang="es-MX" sz="3200" b="0" i="1" strike="noStrike" spc="-1">
+                <a:solidFill>
+                  <a:srgbClr val="000000"/>
+                </a:solidFill>
+                <a:uFill>
+                  <a:solidFill>
+                    <a:srgbClr val="FFFFFF"/>
+                  </a:solidFill>
+                </a:uFill>
+                <a:latin typeface="Arial" charset="0"/>
+              </a:rPr>
+              <a:t>pick_next_task(), </a:t>
+            </a:r>
+            <a:r>
+              <a:rPr lang="x-none" altLang="es-MX" sz="3200" b="0" strike="noStrike" spc="-1">
+                <a:solidFill>
+                  <a:srgbClr val="000000"/>
+                </a:solidFill>
+                <a:uFill>
+                  <a:solidFill>
+                    <a:srgbClr val="FFFFFF"/>
+                  </a:solidFill>
+                </a:uFill>
+                <a:latin typeface="Arial" charset="0"/>
+              </a:rPr>
+              <a:t>seguido por la limpieza de la bandera </a:t>
+            </a:r>
+            <a:r>
+              <a:rPr lang="x-none" altLang="es-MX" sz="3200" b="0" i="1" strike="noStrike" spc="-1">
+                <a:solidFill>
+                  <a:srgbClr val="000000"/>
+                </a:solidFill>
+                <a:uFill>
+                  <a:solidFill>
+                    <a:srgbClr val="FFFFFF"/>
+                  </a:solidFill>
+                </a:uFill>
+                <a:latin typeface="Arial" charset="0"/>
+              </a:rPr>
+              <a:t>need_resched </a:t>
+            </a:r>
+            <a:r>
+              <a:rPr lang="x-none" altLang="es-MX" sz="3200" b="0" strike="noStrike" spc="-1">
+                <a:solidFill>
+                  <a:srgbClr val="000000"/>
+                </a:solidFill>
+                <a:uFill>
+                  <a:solidFill>
+                    <a:srgbClr val="FFFFFF"/>
+                  </a:solidFill>
+                </a:uFill>
+                <a:latin typeface="Arial" charset="0"/>
+              </a:rPr>
+              <a:t>la cual debió haber sido llamada antes para invocar al planificador.</a:t>
+            </a:r>
+            <a:endParaRPr lang="x-none" altLang="es-MX" sz="3200" b="0" strike="noStrike" spc="-1">
+              <a:solidFill>
+                <a:srgbClr val="000000"/>
+              </a:solidFill>
+              <a:uFill>
+                <a:solidFill>
+                  <a:srgbClr val="FFFFFF"/>
+                </a:solidFill>
+              </a:uFill>
+              <a:latin typeface="Arial" charset="0"/>
+            </a:endParaRPr>
+          </a:p>
+          <a:p>
+            <a:pPr marL="431800" indent="-323850" algn="just">
+              <a:buClr>
+                <a:srgbClr val="000000"/>
+              </a:buClr>
+              <a:buSzPct val="45000"/>
+              <a:buFont typeface="Wingdings" panose="05000000000000000000" charset="2"/>
+              <a:buChar char=""/>
+            </a:pPr>
+            <a:endParaRPr lang="x-none" altLang="es-MX" sz="3200" b="0" strike="noStrike" spc="-1">
+              <a:solidFill>
+                <a:srgbClr val="000000"/>
+              </a:solidFill>
+              <a:uFill>
+                <a:solidFill>
+                  <a:srgbClr val="FFFFFF"/>
+                </a:solidFill>
+              </a:uFill>
+              <a:latin typeface="Arial" charset="0"/>
+            </a:endParaRPr>
+          </a:p>
+          <a:p>
+            <a:pPr marL="431800" indent="-323850" algn="just">
+              <a:buClr>
+                <a:srgbClr val="000000"/>
+              </a:buClr>
+              <a:buSzPct val="45000"/>
+              <a:buFont typeface="Wingdings" panose="05000000000000000000" charset="2"/>
+              <a:buChar char=""/>
+            </a:pPr>
+            <a:r>
+              <a:rPr lang="x-none" altLang="es-MX" sz="3200" b="0" i="1" strike="noStrike" spc="-1">
+                <a:solidFill>
+                  <a:srgbClr val="000000"/>
+                </a:solidFill>
+                <a:uFill>
+                  <a:solidFill>
+                    <a:srgbClr val="FFFFFF"/>
+                  </a:solidFill>
+                </a:uFill>
+                <a:latin typeface="Arial" charset="0"/>
+              </a:rPr>
+              <a:t>need_resched </a:t>
+            </a:r>
+            <a:r>
+              <a:rPr lang="x-none" altLang="es-MX" sz="3200" b="0" strike="noStrike" spc="-1">
+                <a:solidFill>
+                  <a:srgbClr val="000000"/>
+                </a:solidFill>
+                <a:uFill>
+                  <a:solidFill>
+                    <a:srgbClr val="FFFFFF"/>
+                  </a:solidFill>
+                </a:uFill>
+                <a:latin typeface="Arial" charset="0"/>
+              </a:rPr>
+              <a:t> es una forma de decir al kernel que una tarea necesita se ejecutada y el planificador [</a:t>
+            </a:r>
+            <a:r>
+              <a:rPr lang="x-none" altLang="es-MX" sz="3200" b="0" i="1" strike="noStrike" spc="-1">
+                <a:solidFill>
+                  <a:srgbClr val="000000"/>
+                </a:solidFill>
+                <a:uFill>
+                  <a:solidFill>
+                    <a:srgbClr val="FFFFFF"/>
+                  </a:solidFill>
+                </a:uFill>
+                <a:latin typeface="Arial" charset="0"/>
+              </a:rPr>
+              <a:t>schedule()] </a:t>
+            </a:r>
+            <a:r>
+              <a:rPr lang="x-none" altLang="es-MX" sz="3200" b="0" strike="noStrike" spc="-1">
+                <a:solidFill>
+                  <a:srgbClr val="000000"/>
+                </a:solidFill>
+                <a:uFill>
+                  <a:solidFill>
+                    <a:srgbClr val="FFFFFF"/>
+                  </a:solidFill>
+                </a:uFill>
+                <a:latin typeface="Arial" charset="0"/>
+              </a:rPr>
+              <a:t> debe ser ejecutado lo antes posible.</a:t>
+            </a:r>
+            <a:endParaRPr lang="x-none" altLang="es-MX" sz="3200" b="0" strike="noStrike" spc="-1">
+              <a:solidFill>
+                <a:srgbClr val="000000"/>
+              </a:solidFill>
+              <a:uFill>
+                <a:solidFill>
+                  <a:srgbClr val="FFFFFF"/>
+                </a:solidFill>
+              </a:uFill>
+              <a:latin typeface="Arial" charset="0"/>
+            </a:endParaRPr>
+          </a:p>
+        </p:txBody>
+      </p:sp>
+      <p:sp>
+        <p:nvSpPr>
+          <p:cNvPr id="2" name="Oval 1"/>
+          <p:cNvSpPr/>
+          <p:nvPr/>
+        </p:nvSpPr>
+        <p:spPr>
+          <a:xfrm>
+            <a:off x="8109585" y="249555"/>
+            <a:ext cx="1229995" cy="1109980"/>
+          </a:xfrm>
+          <a:prstGeom prst="ellipse">
+            <a:avLst/>
+          </a:prstGeom>
+        </p:spPr>
+        <p:style>
+          <a:lnRef idx="2">
+            <a:schemeClr val="accent2">
+              <a:shade val="50000"/>
+            </a:schemeClr>
+          </a:lnRef>
+          <a:fillRef idx="1">
+            <a:schemeClr val="accent2"/>
+          </a:fillRef>
+          <a:effectRef idx="0">
+            <a:schemeClr val="accent2"/>
+          </a:effectRef>
+          <a:fontRef idx="minor">
+            <a:schemeClr val="lt1"/>
+          </a:fontRef>
+        </p:style>
+        <p:txBody>
+          <a:bodyPr rtlCol="0" anchor="ctr"/>
+          <a:p>
+            <a:pPr algn="ctr"/>
+            <a:r>
+              <a:rPr lang="x-none" altLang="en-US"/>
+              <a:t>Pag 8</a:t>
+            </a:r>
+            <a:endParaRPr lang="x-none" altLang="en-US"/>
+          </a:p>
+        </p:txBody>
+      </p:sp>
+    </p:spTree>
+  </p:cSld>
+  <p:clrMapOvr>
+    <a:masterClrMapping/>
+  </p:clrMapOvr>
+</p:sld>
+</file>
+
+<file path=ppt/slides/slide22.xml><?xml version="1.0" encoding="utf-8"?>
+<p:sld xmlns:a="http://schemas.openxmlformats.org/drawingml/2006/main" xmlns:r="http://schemas.openxmlformats.org/officeDocument/2006/relationships" xmlns:p="http://schemas.openxmlformats.org/presentationml/2006/main">
+  <p:cSld>
+    <p:spTree>
+      <p:nvGrpSpPr>
+        <p:cNvPr id="1" name=""/>
+        <p:cNvGrpSpPr/>
+        <p:nvPr/>
+      </p:nvGrpSpPr>
+      <p:grpSpPr>
+        <a:xfrm>
+          <a:off x="0" y="0"/>
+          <a:ext cx="0" cy="0"/>
+          <a:chOff x="0" y="0"/>
+          <a:chExt cx="0" cy="0"/>
+        </a:xfrm>
+      </p:grpSpPr>
+      <p:sp>
+        <p:nvSpPr>
+          <p:cNvPr id="133" name="TextShape 1"/>
+          <p:cNvSpPr txBox="1"/>
+          <p:nvPr/>
+        </p:nvSpPr>
+        <p:spPr>
+          <a:xfrm>
+            <a:off x="457200" y="182880"/>
+            <a:ext cx="8568000" cy="1440000"/>
+          </a:xfrm>
+          <a:prstGeom prst="rect">
+            <a:avLst/>
+          </a:prstGeom>
+          <a:noFill/>
+          <a:ln>
+            <a:noFill/>
+          </a:ln>
+        </p:spPr>
+        <p:txBody>
+          <a:bodyPr lIns="0" tIns="0" rIns="0" bIns="0" anchor="ctr"/>
+          <a:p>
+            <a:r>
+              <a:rPr lang="x-none" altLang="es-MX" sz="4000" b="0" strike="noStrike" spc="-1">
+                <a:solidFill>
+                  <a:srgbClr val="FFFFFF"/>
+                </a:solidFill>
+                <a:uFill>
+                  <a:solidFill>
+                    <a:srgbClr val="FFFFFF"/>
+                  </a:solidFill>
+                </a:uFill>
+                <a:latin typeface="Arial" charset="0"/>
+              </a:rPr>
+              <a:t>4 El esqueleto del planificador </a:t>
+            </a:r>
+            <a:r>
+              <a:rPr lang="es-MX" sz="4000" b="0" strike="noStrike" spc="-1">
+                <a:solidFill>
+                  <a:srgbClr val="FFFFFF"/>
+                </a:solidFill>
+                <a:uFill>
+                  <a:solidFill>
+                    <a:srgbClr val="FFFFFF"/>
+                  </a:solidFill>
+                </a:uFill>
+                <a:latin typeface="Arial" charset="0"/>
+              </a:rPr>
+              <a:t> </a:t>
+            </a:r>
+            <a:endParaRPr lang="es-MX" sz="4000" b="0" strike="noStrike" spc="-1">
+              <a:solidFill>
+                <a:srgbClr val="000000"/>
+              </a:solidFill>
+              <a:uFill>
+                <a:solidFill>
+                  <a:srgbClr val="FFFFFF"/>
+                </a:solidFill>
+              </a:uFill>
+              <a:latin typeface="Arial" charset="0"/>
+            </a:endParaRPr>
+          </a:p>
+        </p:txBody>
+      </p:sp>
+      <p:sp>
+        <p:nvSpPr>
+          <p:cNvPr id="134" name="TextShape 2"/>
+          <p:cNvSpPr txBox="1"/>
+          <p:nvPr/>
+        </p:nvSpPr>
+        <p:spPr>
+          <a:xfrm>
+            <a:off x="436885" y="1807250"/>
+            <a:ext cx="9072000" cy="4384440"/>
+          </a:xfrm>
+          <a:prstGeom prst="rect">
+            <a:avLst/>
+          </a:prstGeom>
+          <a:noFill/>
+          <a:ln>
+            <a:noFill/>
+          </a:ln>
+        </p:spPr>
+        <p:txBody>
+          <a:bodyPr lIns="0" tIns="0" rIns="0" bIns="0"/>
+          <a:p>
+            <a:pPr marL="431800" indent="-323850" algn="just">
+              <a:buClr>
+                <a:srgbClr val="000000"/>
+              </a:buClr>
+              <a:buSzPct val="45000"/>
+              <a:buFont typeface="Wingdings" panose="05000000000000000000" charset="2"/>
+              <a:buChar char=""/>
+            </a:pPr>
+            <a:r>
+              <a:rPr lang="x-none" altLang="es-MX" sz="3200" b="0" strike="noStrike" spc="-1">
+                <a:solidFill>
+                  <a:srgbClr val="000000"/>
+                </a:solidFill>
+                <a:uFill>
+                  <a:solidFill>
+                    <a:srgbClr val="FFFFFF"/>
+                  </a:solidFill>
+                </a:uFill>
+                <a:latin typeface="Arial" charset="0"/>
+              </a:rPr>
+              <a:t>Entonces la clase correspondiente llama a la función  </a:t>
+            </a:r>
+            <a:r>
+              <a:rPr lang="x-none" altLang="es-MX" sz="3200" b="0" i="1" strike="noStrike" spc="-1">
+                <a:solidFill>
+                  <a:srgbClr val="000000"/>
+                </a:solidFill>
+                <a:uFill>
+                  <a:solidFill>
+                    <a:srgbClr val="FFFFFF"/>
+                  </a:solidFill>
+                </a:uFill>
+                <a:latin typeface="Arial" charset="0"/>
+              </a:rPr>
+              <a:t>pick_next_task(), </a:t>
+            </a:r>
+            <a:r>
+              <a:rPr lang="x-none" altLang="es-MX" sz="3200" b="0" strike="noStrike" spc="-1">
+                <a:solidFill>
+                  <a:srgbClr val="000000"/>
+                </a:solidFill>
+                <a:uFill>
+                  <a:solidFill>
+                    <a:srgbClr val="FFFFFF"/>
+                  </a:solidFill>
+                </a:uFill>
+                <a:latin typeface="Arial" charset="0"/>
+              </a:rPr>
+              <a:t>seguido por la limpieza de la bandera </a:t>
+            </a:r>
+            <a:r>
+              <a:rPr lang="x-none" altLang="es-MX" sz="3200" b="0" i="1" strike="noStrike" spc="-1">
+                <a:solidFill>
+                  <a:srgbClr val="000000"/>
+                </a:solidFill>
+                <a:uFill>
+                  <a:solidFill>
+                    <a:srgbClr val="FFFFFF"/>
+                  </a:solidFill>
+                </a:uFill>
+                <a:latin typeface="Arial" charset="0"/>
+              </a:rPr>
+              <a:t>need_resched </a:t>
+            </a:r>
+            <a:r>
+              <a:rPr lang="x-none" altLang="es-MX" sz="3200" b="0" strike="noStrike" spc="-1">
+                <a:solidFill>
+                  <a:srgbClr val="000000"/>
+                </a:solidFill>
+                <a:uFill>
+                  <a:solidFill>
+                    <a:srgbClr val="FFFFFF"/>
+                  </a:solidFill>
+                </a:uFill>
+                <a:latin typeface="Arial" charset="0"/>
+              </a:rPr>
+              <a:t>la cual debió haber sido llamada antes para invocar al planificador.</a:t>
+            </a:r>
+            <a:endParaRPr lang="x-none" altLang="es-MX" sz="3200" b="0" strike="noStrike" spc="-1">
+              <a:solidFill>
+                <a:srgbClr val="000000"/>
+              </a:solidFill>
+              <a:uFill>
+                <a:solidFill>
+                  <a:srgbClr val="FFFFFF"/>
+                </a:solidFill>
+              </a:uFill>
+              <a:latin typeface="Arial" charset="0"/>
+            </a:endParaRPr>
+          </a:p>
+          <a:p>
+            <a:pPr marL="431800" indent="-323850" algn="just">
+              <a:buClr>
+                <a:srgbClr val="000000"/>
+              </a:buClr>
+              <a:buSzPct val="45000"/>
+              <a:buFont typeface="Wingdings" panose="05000000000000000000" charset="2"/>
+              <a:buChar char=""/>
+            </a:pPr>
+            <a:endParaRPr lang="x-none" altLang="es-MX" sz="3200" b="0" strike="noStrike" spc="-1">
+              <a:solidFill>
+                <a:srgbClr val="000000"/>
+              </a:solidFill>
+              <a:uFill>
+                <a:solidFill>
+                  <a:srgbClr val="FFFFFF"/>
+                </a:solidFill>
+              </a:uFill>
+              <a:latin typeface="Arial" charset="0"/>
+            </a:endParaRPr>
+          </a:p>
+          <a:p>
+            <a:pPr marL="431800" indent="-323850" algn="just">
+              <a:buClr>
+                <a:srgbClr val="000000"/>
+              </a:buClr>
+              <a:buSzPct val="45000"/>
+              <a:buFont typeface="Wingdings" panose="05000000000000000000" charset="2"/>
+              <a:buChar char=""/>
+            </a:pPr>
+            <a:r>
+              <a:rPr lang="x-none" altLang="es-MX" sz="3200" b="0" i="1" strike="noStrike" spc="-1">
+                <a:solidFill>
+                  <a:srgbClr val="000000"/>
+                </a:solidFill>
+                <a:uFill>
+                  <a:solidFill>
+                    <a:srgbClr val="FFFFFF"/>
+                  </a:solidFill>
+                </a:uFill>
+                <a:latin typeface="Arial" charset="0"/>
+              </a:rPr>
+              <a:t>need_resched </a:t>
+            </a:r>
+            <a:r>
+              <a:rPr lang="x-none" altLang="es-MX" sz="3200" b="0" strike="noStrike" spc="-1">
+                <a:solidFill>
+                  <a:srgbClr val="000000"/>
+                </a:solidFill>
+                <a:uFill>
+                  <a:solidFill>
+                    <a:srgbClr val="FFFFFF"/>
+                  </a:solidFill>
+                </a:uFill>
+                <a:latin typeface="Arial" charset="0"/>
+              </a:rPr>
+              <a:t> es una forma de decir al kernel que una tarea necesita se ejecutada y el planificador [</a:t>
+            </a:r>
+            <a:r>
+              <a:rPr lang="x-none" altLang="es-MX" sz="3200" b="0" i="1" strike="noStrike" spc="-1">
+                <a:solidFill>
+                  <a:srgbClr val="000000"/>
+                </a:solidFill>
+                <a:uFill>
+                  <a:solidFill>
+                    <a:srgbClr val="FFFFFF"/>
+                  </a:solidFill>
+                </a:uFill>
+                <a:latin typeface="Arial" charset="0"/>
+              </a:rPr>
+              <a:t>schedule()] </a:t>
+            </a:r>
+            <a:r>
+              <a:rPr lang="x-none" altLang="es-MX" sz="3200" b="0" strike="noStrike" spc="-1">
+                <a:solidFill>
+                  <a:srgbClr val="000000"/>
+                </a:solidFill>
+                <a:uFill>
+                  <a:solidFill>
+                    <a:srgbClr val="FFFFFF"/>
+                  </a:solidFill>
+                </a:uFill>
+                <a:latin typeface="Arial" charset="0"/>
+              </a:rPr>
+              <a:t> debe ser ejecutado lo antes posible.</a:t>
+            </a:r>
+            <a:endParaRPr lang="x-none" altLang="es-MX" sz="3200" b="0" strike="noStrike" spc="-1">
+              <a:solidFill>
+                <a:srgbClr val="000000"/>
+              </a:solidFill>
+              <a:uFill>
+                <a:solidFill>
+                  <a:srgbClr val="FFFFFF"/>
+                </a:solidFill>
+              </a:uFill>
+              <a:latin typeface="Arial" charset="0"/>
+            </a:endParaRPr>
+          </a:p>
+        </p:txBody>
+      </p:sp>
+    </p:spTree>
+  </p:cSld>
+  <p:clrMapOvr>
+    <a:masterClrMapping/>
+  </p:clrMapOvr>
+</p:sld>
+</file>
+
+<file path=ppt/slides/slide23.xml><?xml version="1.0" encoding="utf-8"?>
+<p:sld xmlns:a="http://schemas.openxmlformats.org/drawingml/2006/main" xmlns:r="http://schemas.openxmlformats.org/officeDocument/2006/relationships" xmlns:p="http://schemas.openxmlformats.org/presentationml/2006/main">
+  <p:cSld>
+    <p:spTree>
+      <p:nvGrpSpPr>
+        <p:cNvPr id="1" name=""/>
+        <p:cNvGrpSpPr/>
+        <p:nvPr/>
+      </p:nvGrpSpPr>
+      <p:grpSpPr>
+        <a:xfrm>
+          <a:off x="0" y="0"/>
+          <a:ext cx="0" cy="0"/>
+          <a:chOff x="0" y="0"/>
+          <a:chExt cx="0" cy="0"/>
+        </a:xfrm>
+      </p:grpSpPr>
+      <p:sp>
+        <p:nvSpPr>
+          <p:cNvPr id="135" name="TextShape 1"/>
+          <p:cNvSpPr txBox="1"/>
+          <p:nvPr/>
+        </p:nvSpPr>
+        <p:spPr>
+          <a:xfrm>
+            <a:off x="504000" y="627840"/>
+            <a:ext cx="7020000" cy="567360"/>
+          </a:xfrm>
+          <a:prstGeom prst="rect">
+            <a:avLst/>
+          </a:prstGeom>
+          <a:noFill/>
+          <a:ln>
+            <a:noFill/>
+          </a:ln>
+        </p:spPr>
+        <p:txBody>
+          <a:bodyPr lIns="0" tIns="0" rIns="0" bIns="0" anchor="ctr"/>
+          <a:p>
+            <a:r>
+              <a:rPr lang="es-MX" sz="4000" b="0" strike="noStrike" spc="-1">
+                <a:solidFill>
+                  <a:srgbClr val="FFFFFF"/>
+                </a:solidFill>
+                <a:uFill>
+                  <a:solidFill>
+                    <a:srgbClr val="FFFFFF"/>
+                  </a:solidFill>
+                </a:uFill>
+                <a:latin typeface="Arial" charset="0"/>
+              </a:rPr>
+              <a:t>Referencias</a:t>
+            </a:r>
+            <a:endParaRPr lang="es-MX" sz="4000" b="0" strike="noStrike" spc="-1">
+              <a:solidFill>
+                <a:srgbClr val="000000"/>
+              </a:solidFill>
+              <a:uFill>
+                <a:solidFill>
+                  <a:srgbClr val="FFFFFF"/>
+                </a:solidFill>
+              </a:uFill>
+              <a:latin typeface="Arial" charset="0"/>
+            </a:endParaRPr>
+          </a:p>
+        </p:txBody>
+      </p:sp>
+      <p:sp>
+        <p:nvSpPr>
+          <p:cNvPr id="136" name="TextShape 2"/>
+          <p:cNvSpPr txBox="1"/>
+          <p:nvPr/>
+        </p:nvSpPr>
+        <p:spPr>
+          <a:xfrm>
+            <a:off x="-66240" y="1823760"/>
+            <a:ext cx="9850320" cy="4384440"/>
+          </a:xfrm>
+          <a:prstGeom prst="rect">
+            <a:avLst/>
+          </a:prstGeom>
+          <a:noFill/>
+          <a:ln>
+            <a:noFill/>
+          </a:ln>
+        </p:spPr>
+        <p:txBody>
+          <a:bodyPr lIns="0" tIns="0" rIns="0" bIns="0"/>
+          <a:p>
+            <a:pPr marL="431800" indent="-323850">
+              <a:buClr>
+                <a:srgbClr val="000000"/>
+              </a:buClr>
+              <a:buSzPct val="45000"/>
+              <a:buFont typeface="Wingdings" panose="05000000000000000000" charset="2"/>
+              <a:buChar char=""/>
+            </a:pPr>
+            <a:r>
+              <a:rPr lang="es-MX" sz="2800" b="0" i="1" strike="noStrike" spc="-1">
+                <a:solidFill>
+                  <a:srgbClr val="000000"/>
+                </a:solidFill>
+                <a:uFill>
+                  <a:solidFill>
+                    <a:srgbClr val="FFFFFF"/>
+                  </a:solidFill>
+                </a:uFill>
+                <a:latin typeface="Arial" charset="0"/>
+              </a:rPr>
+              <a:t>Process Scheduling in Linux, </a:t>
+            </a:r>
+            <a:r>
+              <a:rPr lang="es-MX" sz="2800" b="1" strike="noStrike" spc="-1">
+                <a:solidFill>
+                  <a:srgbClr val="000000"/>
+                </a:solidFill>
+                <a:uFill>
+                  <a:solidFill>
+                    <a:srgbClr val="FFFFFF"/>
+                  </a:solidFill>
+                </a:uFill>
+                <a:latin typeface="Arial" charset="0"/>
+              </a:rPr>
+              <a:t>Volker Seeker</a:t>
+            </a:r>
+            <a:r>
+              <a:rPr lang="es-MX" sz="2800" b="0" strike="noStrike" spc="-1">
+                <a:solidFill>
+                  <a:srgbClr val="000000"/>
+                </a:solidFill>
+                <a:uFill>
+                  <a:solidFill>
+                    <a:srgbClr val="FFFFFF"/>
+                  </a:solidFill>
+                </a:uFill>
+                <a:latin typeface="Arial" charset="0"/>
+              </a:rPr>
+              <a:t>, University of Edinburg, Critical Blue, 5 de Mayo del 2013</a:t>
+            </a:r>
+            <a:endParaRPr lang="es-MX" sz="4620" b="0" strike="noStrike" spc="-1">
+              <a:solidFill>
+                <a:srgbClr val="000000"/>
+              </a:solidFill>
+              <a:uFill>
+                <a:solidFill>
+                  <a:srgbClr val="FFFFFF"/>
+                </a:solidFill>
+              </a:uFill>
+              <a:latin typeface="Arial" charset="0"/>
+            </a:endParaRPr>
+          </a:p>
+          <a:p>
+            <a:pPr marL="431800" indent="-323850">
+              <a:buClr>
+                <a:srgbClr val="000000"/>
+              </a:buClr>
+              <a:buSzPct val="45000"/>
+              <a:buFont typeface="Wingdings" panose="05000000000000000000" charset="2"/>
+              <a:buChar char=""/>
+            </a:pPr>
+            <a:r>
+              <a:rPr lang="es-MX" sz="2800" b="0" i="1" strike="noStrike" spc="-1">
+                <a:solidFill>
+                  <a:srgbClr val="000000"/>
+                </a:solidFill>
+                <a:uFill>
+                  <a:solidFill>
+                    <a:srgbClr val="FFFFFF"/>
+                  </a:solidFill>
+                </a:uFill>
+                <a:latin typeface="Arial" charset="0"/>
+              </a:rPr>
+              <a:t>Process Scheduling in Linux,</a:t>
+            </a:r>
+            <a:r>
+              <a:rPr lang="es-MX" sz="2800" b="1" i="1" strike="noStrike" spc="-1">
+                <a:solidFill>
+                  <a:srgbClr val="000000"/>
+                </a:solidFill>
+                <a:uFill>
+                  <a:solidFill>
+                    <a:srgbClr val="FFFFFF"/>
+                  </a:solidFill>
+                </a:uFill>
+                <a:latin typeface="Arial" charset="0"/>
+              </a:rPr>
+              <a:t> </a:t>
+            </a:r>
+            <a:r>
+              <a:rPr lang="es-MX" sz="2800" b="1" strike="noStrike" spc="-1">
+                <a:solidFill>
+                  <a:srgbClr val="000000"/>
+                </a:solidFill>
+                <a:uFill>
+                  <a:solidFill>
+                    <a:srgbClr val="FFFFFF"/>
+                  </a:solidFill>
+                </a:uFill>
+                <a:latin typeface="Arial" charset="0"/>
+              </a:rPr>
+              <a:t>Desconocido</a:t>
+            </a:r>
+            <a:r>
+              <a:rPr lang="es-MX" sz="2800" b="0" strike="noStrike" spc="-1">
+                <a:solidFill>
+                  <a:srgbClr val="000000"/>
+                </a:solidFill>
+                <a:uFill>
+                  <a:solidFill>
+                    <a:srgbClr val="FFFFFF"/>
+                  </a:solidFill>
+                </a:uFill>
+                <a:latin typeface="Arial" charset="0"/>
+              </a:rPr>
+              <a:t>,</a:t>
+            </a:r>
+            <a:r>
+              <a:rPr lang="es-MX" sz="2800" b="0" strike="noStrike" spc="-1">
+                <a:solidFill>
+                  <a:srgbClr val="000000"/>
+                </a:solidFill>
+                <a:uFill>
+                  <a:solidFill>
+                    <a:srgbClr val="FFFFFF"/>
+                  </a:solidFill>
+                </a:uFill>
+                <a:latin typeface="Arial" charset="0"/>
+                <a:hlinkClick r:id="rId1"/>
+              </a:rPr>
+              <a:t>http://cs.boisestate.edu/~amit/teaching/597/scheduling.pdf</a:t>
+            </a:r>
+            <a:endParaRPr lang="es-MX" sz="4620" b="0" strike="noStrike" spc="-1">
+              <a:solidFill>
+                <a:srgbClr val="000000"/>
+              </a:solidFill>
+              <a:uFill>
+                <a:solidFill>
+                  <a:srgbClr val="FFFFFF"/>
+                </a:solidFill>
+              </a:uFill>
+              <a:latin typeface="Arial" charset="0"/>
+            </a:endParaRPr>
+          </a:p>
+          <a:p>
+            <a:pPr marL="431800" indent="-323850">
+              <a:buClr>
+                <a:srgbClr val="000000"/>
+              </a:buClr>
+              <a:buSzPct val="45000"/>
+              <a:buFont typeface="Wingdings" panose="05000000000000000000" charset="2"/>
+              <a:buChar char=""/>
+            </a:pPr>
+            <a:r>
+              <a:rPr lang="es-MX" sz="2800" b="0" strike="noStrike" spc="-1">
+                <a:solidFill>
+                  <a:srgbClr val="000000"/>
+                </a:solidFill>
+                <a:uFill>
+                  <a:solidFill>
+                    <a:srgbClr val="FFFFFF"/>
+                  </a:solidFill>
+                </a:uFill>
+                <a:latin typeface="Arial" charset="0"/>
+              </a:rPr>
+              <a:t> </a:t>
             </a:r>
             <a:endParaRPr lang="es-MX" sz="4620" b="0" strike="noStrike" spc="-1">
               <a:solidFill>

</xml_diff>

<commit_message>
casi de la 14 a la 16 falta
</commit_message>
<xml_diff>
--- a/exposiciones/planificadorCFS/planificadorCFS.pptx
+++ b/exposiciones/planificadorCFS/planificadorCFS.pptx
@@ -9,27 +9,31 @@
   <p:sldIdLst>
     <p:sldId id="256" r:id="rId5"/>
     <p:sldId id="257" r:id="rId6"/>
-    <p:sldId id="258" r:id="rId7"/>
-    <p:sldId id="259" r:id="rId8"/>
-    <p:sldId id="260" r:id="rId9"/>
-    <p:sldId id="261" r:id="rId10"/>
-    <p:sldId id="262" r:id="rId11"/>
-    <p:sldId id="263" r:id="rId12"/>
-    <p:sldId id="265" r:id="rId13"/>
-    <p:sldId id="266" r:id="rId14"/>
-    <p:sldId id="268" r:id="rId15"/>
-    <p:sldId id="269" r:id="rId16"/>
-    <p:sldId id="270" r:id="rId17"/>
-    <p:sldId id="272" r:id="rId18"/>
-    <p:sldId id="273" r:id="rId19"/>
-    <p:sldId id="274" r:id="rId20"/>
-    <p:sldId id="275" r:id="rId21"/>
-    <p:sldId id="277" r:id="rId22"/>
-    <p:sldId id="278" r:id="rId23"/>
-    <p:sldId id="279" r:id="rId24"/>
-    <p:sldId id="280" r:id="rId25"/>
-    <p:sldId id="281" r:id="rId26"/>
-    <p:sldId id="264" r:id="rId27"/>
+    <p:sldId id="285" r:id="rId7"/>
+    <p:sldId id="258" r:id="rId8"/>
+    <p:sldId id="259" r:id="rId9"/>
+    <p:sldId id="260" r:id="rId10"/>
+    <p:sldId id="261" r:id="rId11"/>
+    <p:sldId id="262" r:id="rId12"/>
+    <p:sldId id="263" r:id="rId13"/>
+    <p:sldId id="265" r:id="rId14"/>
+    <p:sldId id="266" r:id="rId15"/>
+    <p:sldId id="268" r:id="rId16"/>
+    <p:sldId id="269" r:id="rId17"/>
+    <p:sldId id="270" r:id="rId18"/>
+    <p:sldId id="272" r:id="rId19"/>
+    <p:sldId id="273" r:id="rId20"/>
+    <p:sldId id="274" r:id="rId21"/>
+    <p:sldId id="275" r:id="rId22"/>
+    <p:sldId id="277" r:id="rId23"/>
+    <p:sldId id="278" r:id="rId24"/>
+    <p:sldId id="279" r:id="rId25"/>
+    <p:sldId id="280" r:id="rId26"/>
+    <p:sldId id="283" r:id="rId27"/>
+    <p:sldId id="284" r:id="rId28"/>
+    <p:sldId id="286" r:id="rId29"/>
+    <p:sldId id="287" r:id="rId30"/>
+    <p:sldId id="264" r:id="rId31"/>
   </p:sldIdLst>
   <p:sldSz cx="10080625" cy="7559675"/>
   <p:notesSz cx="7772400" cy="10058400"/>
@@ -6523,20 +6527,6 @@
           <a:bodyPr lIns="0" tIns="0" rIns="0" bIns="0" anchor="ctr"/>
           <a:p>
             <a:r>
-              <a:rPr lang="x-none" altLang="es-MX" sz="4000" b="0" strike="noStrike" spc="-1">
-                <a:solidFill>
-                  <a:srgbClr val="FFFFFF"/>
-                </a:solidFill>
-                <a:uFill>
-                  <a:solidFill>
-                    <a:srgbClr val="FFFFFF"/>
-                  </a:solidFill>
-                </a:uFill>
-                <a:latin typeface="Arial" charset="0"/>
-              </a:rPr>
-              <a:t>2 Clases de la planeacion</a:t>
-            </a:r>
-            <a:r>
               <a:rPr lang="es-MX" sz="4000" b="0" strike="noStrike" spc="-1">
                 <a:solidFill>
                   <a:srgbClr val="FFFFFF"/>
@@ -6548,7 +6538,7 @@
                 </a:uFill>
                 <a:latin typeface="Arial" charset="0"/>
               </a:rPr>
-              <a:t> </a:t>
+              <a:t>1 Clasificación de tareas</a:t>
             </a:r>
             <a:endParaRPr lang="es-MX" sz="4000" b="0" strike="noStrike" spc="-1">
               <a:solidFill>
@@ -6606,22 +6596,29 @@
                 </a:uFill>
                 <a:latin typeface="Arial" charset="0"/>
               </a:rPr>
-              <a:t>El planeador de linux es modular, implementando diferentes algoritmos/politicas para planear diferentes tipos de tareas. Estas implmemtaciones estan contenidas en el archivo llamado </a:t>
-            </a:r>
-            <a:r>
-              <a:rPr lang="x-none" altLang="es-MX" sz="3200" b="0" i="1" strike="noStrike" spc="-1">
-                <a:solidFill>
-                  <a:srgbClr val="000000"/>
-                </a:solidFill>
-                <a:uFill>
-                  <a:solidFill>
-                    <a:srgbClr val="FFFFFF"/>
-                  </a:solidFill>
-                </a:uFill>
-                <a:latin typeface="Arial" charset="0"/>
-              </a:rPr>
-              <a:t>Scheduling Class</a:t>
-            </a:r>
+              <a:t>Por valores de prioridad de tareas</a:t>
+            </a:r>
+            <a:endParaRPr lang="x-none" altLang="es-MX" sz="3200" b="0" strike="noStrike" spc="-1">
+              <a:solidFill>
+                <a:srgbClr val="000000"/>
+              </a:solidFill>
+              <a:uFill>
+                <a:solidFill>
+                  <a:srgbClr val="FFFFFF"/>
+                </a:solidFill>
+              </a:uFill>
+              <a:latin typeface="Arial" charset="0"/>
+            </a:endParaRPr>
+          </a:p>
+          <a:p>
+            <a:pPr marL="431800" indent="-323850" algn="just">
+              <a:buClr>
+                <a:srgbClr val="000000"/>
+              </a:buClr>
+              <a:buSzPct val="45000"/>
+              <a:buFont typeface="Wingdings" panose="05000000000000000000" charset="2"/>
+              <a:buChar char=""/>
+            </a:pPr>
             <a:r>
               <a:rPr lang="x-none" altLang="es-MX" sz="3200" b="0" strike="noStrike" spc="-1">
                 <a:solidFill>
@@ -6634,7 +6631,77 @@
                 </a:uFill>
                 <a:latin typeface="Arial" charset="0"/>
               </a:rPr>
-              <a:t>. Esta clase ofrece una interfaz al esqueleto pricipal del planeador, que lo usara para manejar las tareas de acuerdo al algoritmo implementado.</a:t>
+              <a:t>las prioridades altas en el kernel tienen valores numericos bajos.</a:t>
+            </a:r>
+            <a:endParaRPr lang="x-none" altLang="es-MX" sz="3200" b="0" strike="noStrike" spc="-1">
+              <a:solidFill>
+                <a:srgbClr val="000000"/>
+              </a:solidFill>
+              <a:uFill>
+                <a:solidFill>
+                  <a:srgbClr val="FFFFFF"/>
+                </a:solidFill>
+              </a:uFill>
+              <a:latin typeface="Arial" charset="0"/>
+            </a:endParaRPr>
+          </a:p>
+          <a:p>
+            <a:pPr marL="431800" indent="-323850" algn="just">
+              <a:buClr>
+                <a:srgbClr val="000000"/>
+              </a:buClr>
+              <a:buSzPct val="45000"/>
+              <a:buFont typeface="Wingdings" panose="05000000000000000000" charset="2"/>
+              <a:buChar char=""/>
+            </a:pPr>
+            <a:r>
+              <a:rPr lang="x-none" altLang="es-MX" sz="3200" b="0" strike="noStrike" spc="-1">
+                <a:solidFill>
+                  <a:srgbClr val="000000"/>
+                </a:solidFill>
+                <a:uFill>
+                  <a:solidFill>
+                    <a:srgbClr val="FFFFFF"/>
+                  </a:solidFill>
+                </a:uFill>
+                <a:latin typeface="Arial" charset="0"/>
+              </a:rPr>
+              <a:t>Las tareas de tiempo real tiene un rango de 1-a 99, minetras que las normales de 100-139.</a:t>
+            </a:r>
+            <a:endParaRPr lang="x-none" altLang="es-MX" sz="3200" b="0" strike="noStrike" spc="-1">
+              <a:solidFill>
+                <a:srgbClr val="000000"/>
+              </a:solidFill>
+              <a:uFill>
+                <a:solidFill>
+                  <a:srgbClr val="FFFFFF"/>
+                </a:solidFill>
+              </a:uFill>
+              <a:latin typeface="Arial" charset="0"/>
+            </a:endParaRPr>
+          </a:p>
+          <a:p>
+            <a:pPr marL="431800" indent="-323850" algn="just">
+              <a:buClr>
+                <a:srgbClr val="000000"/>
+              </a:buClr>
+              <a:buSzPct val="45000"/>
+              <a:buFont typeface="Wingdings" panose="05000000000000000000" charset="2"/>
+              <a:buChar char=""/>
+            </a:pPr>
+            <a:r>
+              <a:rPr lang="x-none" altLang="es-MX" sz="3200" b="0" strike="noStrike" spc="-1">
+                <a:solidFill>
+                  <a:srgbClr val="000000"/>
+                </a:solidFill>
+                <a:uFill>
+                  <a:solidFill>
+                    <a:srgbClr val="FFFFFF"/>
+                  </a:solidFill>
+                </a:uFill>
+                <a:latin typeface="Arial" charset="0"/>
+              </a:rPr>
+              <a:t>A veces hay confucion cuando se usan llamadas al sistema o bibliotecas de planeacion ya que en algunas el valor numerico se invierte o se asignan a diferentes propiedades (lindura).</a:t>
             </a:r>
             <a:endParaRPr lang="x-none" altLang="es-MX" sz="3200" b="0" strike="noStrike" spc="-1">
               <a:solidFill>
@@ -6669,48 +6736,47 @@
               <a:latin typeface="Arial" charset="0"/>
             </a:endParaRPr>
           </a:p>
-        </p:txBody>
-      </p:sp>
-      <p:sp>
-        <p:nvSpPr>
-          <p:cNvPr id="2" name="Oval 1"/>
-          <p:cNvSpPr/>
-          <p:nvPr/>
-        </p:nvSpPr>
-        <p:spPr>
-          <a:xfrm>
-            <a:off x="8109585" y="249555"/>
-            <a:ext cx="1229995" cy="1109980"/>
-          </a:xfrm>
-          <a:prstGeom prst="ellipse">
-            <a:avLst/>
-          </a:prstGeom>
-        </p:spPr>
-        <p:style>
-          <a:lnRef idx="2">
-            <a:schemeClr val="accent2">
-              <a:shade val="50000"/>
-            </a:schemeClr>
-          </a:lnRef>
-          <a:fillRef idx="1">
-            <a:schemeClr val="accent2"/>
-          </a:fillRef>
-          <a:effectRef idx="0">
-            <a:schemeClr val="accent2"/>
-          </a:effectRef>
-          <a:fontRef idx="minor">
-            <a:schemeClr val="lt1"/>
-          </a:fontRef>
-        </p:style>
-        <p:txBody>
-          <a:bodyPr rtlCol="0" anchor="ctr"/>
-          <a:p>
-            <a:pPr algn="ctr"/>
-            <a:r>
-              <a:rPr lang="x-none" altLang="en-US"/>
-              <a:t>Pag 3</a:t>
-            </a:r>
-            <a:endParaRPr lang="x-none" altLang="en-US"/>
+          <a:p>
+            <a:pPr marL="431800" indent="-323850" algn="just">
+              <a:buClr>
+                <a:srgbClr val="000000"/>
+              </a:buClr>
+              <a:buSzPct val="45000"/>
+              <a:buFont typeface="Wingdings" panose="05000000000000000000" charset="2"/>
+              <a:buChar char=""/>
+            </a:pPr>
+            <a:endParaRPr lang="x-none" altLang="es-MX" sz="3200" b="0" strike="noStrike" spc="-1">
+              <a:solidFill>
+                <a:srgbClr val="000000"/>
+              </a:solidFill>
+              <a:uFill>
+                <a:solidFill>
+                  <a:srgbClr val="FFFFFF"/>
+                </a:solidFill>
+              </a:uFill>
+              <a:latin typeface="Arial" charset="0"/>
+            </a:endParaRPr>
+          </a:p>
+          <a:p>
+            <a:pPr marL="431800" indent="-323850" algn="just">
+              <a:buClr>
+                <a:srgbClr val="000000"/>
+              </a:buClr>
+              <a:buSzPct val="45000"/>
+              <a:buFont typeface="Wingdings" panose="05000000000000000000" charset="2"/>
+              <a:buChar char=""/>
+            </a:pPr>
+            <a:endParaRPr lang="x-none" altLang="es-MX" sz="3200" b="0" strike="noStrike" spc="-1">
+              <a:solidFill>
+                <a:srgbClr val="000000"/>
+              </a:solidFill>
+              <a:uFill>
+                <a:solidFill>
+                  <a:srgbClr val="FFFFFF"/>
+                </a:solidFill>
+              </a:uFill>
+              <a:latin typeface="Arial" charset="0"/>
+            </a:endParaRPr>
           </a:p>
         </p:txBody>
       </p:sp>
@@ -6845,7 +6911,35 @@
                 </a:uFill>
                 <a:latin typeface="Arial" charset="0"/>
               </a:rPr>
-              <a:t>A excepcion del primero todos los miembros de esta estructura son funciones apuntador, las cuales, son usadas por el esqueleto del planeador para llamar a la correspondiende politica de implementacion.</a:t>
+              <a:t>El planeador de linux es modular, implementando diferentes algoritmos/politicas para planear diferentes tipos de tareas. Estas implmemtaciones estan contenidas en el archivo llamado </a:t>
+            </a:r>
+            <a:r>
+              <a:rPr lang="x-none" altLang="es-MX" sz="3200" b="0" i="1" strike="noStrike" spc="-1">
+                <a:solidFill>
+                  <a:srgbClr val="000000"/>
+                </a:solidFill>
+                <a:uFill>
+                  <a:solidFill>
+                    <a:srgbClr val="FFFFFF"/>
+                  </a:solidFill>
+                </a:uFill>
+                <a:latin typeface="Arial" charset="0"/>
+              </a:rPr>
+              <a:t>Scheduling Class</a:t>
+            </a:r>
+            <a:r>
+              <a:rPr lang="x-none" altLang="es-MX" sz="3200" b="0" strike="noStrike" spc="-1">
+                <a:solidFill>
+                  <a:srgbClr val="000000"/>
+                </a:solidFill>
+                <a:uFill>
+                  <a:solidFill>
+                    <a:srgbClr val="FFFFFF"/>
+                  </a:solidFill>
+                </a:uFill>
+                <a:latin typeface="Arial" charset="0"/>
+              </a:rPr>
+              <a:t>. Esta clase ofrece una interfaz al esqueleto pricipal del planeador, que lo usara para manejar las tareas de acuerdo al algoritmo implementado.</a:t>
             </a:r>
             <a:endParaRPr lang="x-none" altLang="es-MX" sz="3200" b="0" strike="noStrike" spc="-1">
               <a:solidFill>
@@ -6880,26 +6974,48 @@
               <a:latin typeface="Arial" charset="0"/>
             </a:endParaRPr>
           </a:p>
-          <a:p>
-            <a:pPr marL="431800" indent="-323850" algn="just">
-              <a:buClr>
-                <a:srgbClr val="000000"/>
-              </a:buClr>
-              <a:buSzPct val="45000"/>
-              <a:buFont typeface="Wingdings" panose="05000000000000000000" charset="2"/>
-              <a:buChar char=""/>
-            </a:pPr>
-            <a:endParaRPr lang="x-none" altLang="es-MX" sz="3200" b="0" strike="noStrike" spc="-1">
-              <a:solidFill>
-                <a:srgbClr val="000000"/>
-              </a:solidFill>
-              <a:uFill>
-                <a:solidFill>
-                  <a:srgbClr val="FFFFFF"/>
-                </a:solidFill>
-              </a:uFill>
-              <a:latin typeface="Arial" charset="0"/>
-            </a:endParaRPr>
+        </p:txBody>
+      </p:sp>
+      <p:sp>
+        <p:nvSpPr>
+          <p:cNvPr id="2" name="Oval 1"/>
+          <p:cNvSpPr/>
+          <p:nvPr/>
+        </p:nvSpPr>
+        <p:spPr>
+          <a:xfrm>
+            <a:off x="8109585" y="249555"/>
+            <a:ext cx="1229995" cy="1109980"/>
+          </a:xfrm>
+          <a:prstGeom prst="ellipse">
+            <a:avLst/>
+          </a:prstGeom>
+        </p:spPr>
+        <p:style>
+          <a:lnRef idx="2">
+            <a:schemeClr val="accent2">
+              <a:shade val="50000"/>
+            </a:schemeClr>
+          </a:lnRef>
+          <a:fillRef idx="1">
+            <a:schemeClr val="accent2"/>
+          </a:fillRef>
+          <a:effectRef idx="0">
+            <a:schemeClr val="accent2"/>
+          </a:effectRef>
+          <a:fontRef idx="minor">
+            <a:schemeClr val="lt1"/>
+          </a:fontRef>
+        </p:style>
+        <p:txBody>
+          <a:bodyPr rtlCol="0" anchor="ctr"/>
+          <a:p>
+            <a:pPr algn="ctr"/>
+            <a:r>
+              <a:rPr lang="x-none" altLang="en-US"/>
+              <a:t>Pag 3</a:t>
+            </a:r>
+            <a:endParaRPr lang="x-none" altLang="en-US"/>
           </a:p>
         </p:txBody>
       </p:sp>
@@ -7023,19 +7139,18 @@
               <a:buChar char=""/>
             </a:pPr>
             <a:r>
-              <a:rPr lang="x-none" altLang="es-MX" sz="3200" spc="-1">
-                <a:solidFill>
-                  <a:srgbClr val="000000"/>
-                </a:solidFill>
-                <a:uFill>
-                  <a:solidFill>
-                    <a:srgbClr val="FFFFFF"/>
-                  </a:solidFill>
-                </a:uFill>
-                <a:latin typeface="Arial" charset="0"/>
-                <a:sym typeface="+mn-ea"/>
-              </a:rPr>
-              <a:t>Todas las clases de planeacion en el kernel estan listadas por orden de prioridad. El primer miembro de la estructura llamado el siguiente, es un apuntador a la siguiente clase de planeacion, la cual tiene una prioridaad menor en la lista. Como en el siguiente ejemplo.</a:t>
+              <a:rPr lang="x-none" altLang="es-MX" sz="3200" b="0" strike="noStrike" spc="-1">
+                <a:solidFill>
+                  <a:srgbClr val="000000"/>
+                </a:solidFill>
+                <a:uFill>
+                  <a:solidFill>
+                    <a:srgbClr val="FFFFFF"/>
+                  </a:solidFill>
+                </a:uFill>
+                <a:latin typeface="Arial" charset="0"/>
+              </a:rPr>
+              <a:t>A excepcion del primero todos los miembros de esta estructura son funciones apuntador, las cuales, son usadas por el esqueleto del planeador para llamar a la correspondiende politica de implementacion.</a:t>
             </a:r>
             <a:endParaRPr lang="x-none" altLang="es-MX" sz="3200" b="0" strike="noStrike" spc="-1">
               <a:solidFill>
@@ -7093,30 +7208,6 @@
           </a:p>
         </p:txBody>
       </p:sp>
-      <p:pic>
-        <p:nvPicPr>
-          <p:cNvPr id="3" name="Picture 2"/>
-          <p:cNvPicPr>
-            <a:picLocks noChangeAspect="1"/>
-          </p:cNvPicPr>
-          <p:nvPr/>
-        </p:nvPicPr>
-        <p:blipFill>
-          <a:blip r:embed="rId1"/>
-          <a:stretch>
-            <a:fillRect/>
-          </a:stretch>
-        </p:blipFill>
-        <p:spPr>
-          <a:xfrm>
-            <a:off x="-88265" y="5037455"/>
-            <a:ext cx="10080000" cy="472541"/>
-          </a:xfrm>
-          <a:prstGeom prst="rect">
-            <a:avLst/>
-          </a:prstGeom>
-        </p:spPr>
-      </p:pic>
     </p:spTree>
   </p:cSld>
   <p:clrMapOvr>
@@ -7237,74 +7328,19 @@
               <a:buChar char=""/>
             </a:pPr>
             <a:r>
-              <a:rPr lang="x-none" altLang="es-MX" sz="3200" b="0" strike="noStrike" spc="-1">
-                <a:solidFill>
-                  <a:srgbClr val="000000"/>
-                </a:solidFill>
-                <a:uFill>
-                  <a:solidFill>
-                    <a:srgbClr val="FFFFFF"/>
-                  </a:solidFill>
-                </a:uFill>
-                <a:latin typeface="Arial" charset="0"/>
-              </a:rPr>
-              <a:t>La clase </a:t>
-            </a:r>
-            <a:r>
-              <a:rPr lang="x-none" altLang="es-MX" sz="3200" b="0" i="1" strike="noStrike" spc="-1">
-                <a:solidFill>
-                  <a:srgbClr val="000000"/>
-                </a:solidFill>
-                <a:uFill>
-                  <a:solidFill>
-                    <a:srgbClr val="FFFFFF"/>
-                  </a:solidFill>
-                </a:uFill>
-                <a:latin typeface="Arial" charset="0"/>
-              </a:rPr>
-              <a:t>stop </a:t>
-            </a:r>
-            <a:r>
-              <a:rPr lang="x-none" altLang="es-MX" sz="3200" b="0" strike="noStrike" spc="-1">
-                <a:solidFill>
-                  <a:srgbClr val="000000"/>
-                </a:solidFill>
-                <a:uFill>
-                  <a:solidFill>
-                    <a:srgbClr val="FFFFFF"/>
-                  </a:solidFill>
-                </a:uFill>
-                <a:latin typeface="Arial" charset="0"/>
-              </a:rPr>
-              <a:t>es usada para planear la tarea "detener" por procesador la cual </a:t>
-            </a:r>
-            <a:r>
-              <a:rPr lang="x-none" altLang="es-MX" sz="3200" b="0" i="1" strike="noStrike" spc="-1">
-                <a:solidFill>
-                  <a:srgbClr val="000000"/>
-                </a:solidFill>
-                <a:uFill>
-                  <a:solidFill>
-                    <a:srgbClr val="FFFFFF"/>
-                  </a:solidFill>
-                </a:uFill>
-                <a:latin typeface="Arial" charset="0"/>
-              </a:rPr>
-              <a:t>previene </a:t>
-            </a:r>
-            <a:r>
-              <a:rPr lang="x-none" altLang="es-MX" sz="3200" b="0" strike="noStrike" spc="-1">
-                <a:solidFill>
-                  <a:srgbClr val="000000"/>
-                </a:solidFill>
-                <a:uFill>
-                  <a:solidFill>
-                    <a:srgbClr val="FFFFFF"/>
-                  </a:solidFill>
-                </a:uFill>
-                <a:latin typeface="Arial" charset="0"/>
-              </a:rPr>
-              <a:t>todo y no puede ser prevista por nada. La clase IDLE es usada para planificar la tarea IDLE la cual es ejecutada cuando no hay nada que se pueda ejecutar. Las clases de enmedio son para la implementacion de tiempo real y normal.  </a:t>
+              <a:rPr lang="x-none" altLang="es-MX" sz="3200" spc="-1">
+                <a:solidFill>
+                  <a:srgbClr val="000000"/>
+                </a:solidFill>
+                <a:uFill>
+                  <a:solidFill>
+                    <a:srgbClr val="FFFFFF"/>
+                  </a:solidFill>
+                </a:uFill>
+                <a:latin typeface="Arial" charset="0"/>
+                <a:sym typeface="+mn-ea"/>
+              </a:rPr>
+              <a:t>Todas las clases de planeacion en el kernel estan listadas por orden de prioridad. El primer miembro de la estructura llamado el siguiente, es un apuntador a la siguiente clase de planeacion, la cual tiene una prioridaad menor en la lista. Como en el siguiente ejemplo.</a:t>
             </a:r>
             <a:endParaRPr lang="x-none" altLang="es-MX" sz="3200" b="0" strike="noStrike" spc="-1">
               <a:solidFill>
@@ -7318,8 +7354,74 @@
               <a:latin typeface="Arial" charset="0"/>
             </a:endParaRPr>
           </a:p>
-        </p:txBody>
-      </p:sp>
+          <a:p>
+            <a:pPr marL="431800" indent="-323850" algn="just">
+              <a:buClr>
+                <a:srgbClr val="000000"/>
+              </a:buClr>
+              <a:buSzPct val="45000"/>
+              <a:buFont typeface="Wingdings" panose="05000000000000000000" charset="2"/>
+              <a:buChar char=""/>
+            </a:pPr>
+            <a:endParaRPr lang="x-none" altLang="es-MX" sz="3200" b="0" strike="noStrike" spc="-1">
+              <a:solidFill>
+                <a:srgbClr val="000000"/>
+              </a:solidFill>
+              <a:uFill>
+                <a:solidFill>
+                  <a:srgbClr val="FFFFFF"/>
+                </a:solidFill>
+              </a:uFill>
+              <a:latin typeface="Arial" charset="0"/>
+            </a:endParaRPr>
+          </a:p>
+          <a:p>
+            <a:pPr marL="431800" indent="-323850" algn="just">
+              <a:buClr>
+                <a:srgbClr val="000000"/>
+              </a:buClr>
+              <a:buSzPct val="45000"/>
+              <a:buFont typeface="Wingdings" panose="05000000000000000000" charset="2"/>
+              <a:buChar char=""/>
+            </a:pPr>
+            <a:endParaRPr lang="x-none" altLang="es-MX" sz="3200" b="0" strike="noStrike" spc="-1">
+              <a:solidFill>
+                <a:srgbClr val="000000"/>
+              </a:solidFill>
+              <a:uFill>
+                <a:solidFill>
+                  <a:srgbClr val="FFFFFF"/>
+                </a:solidFill>
+              </a:uFill>
+              <a:latin typeface="Arial" charset="0"/>
+            </a:endParaRPr>
+          </a:p>
+        </p:txBody>
+      </p:sp>
+      <p:pic>
+        <p:nvPicPr>
+          <p:cNvPr id="3" name="Picture 2"/>
+          <p:cNvPicPr>
+            <a:picLocks noChangeAspect="1"/>
+          </p:cNvPicPr>
+          <p:nvPr/>
+        </p:nvPicPr>
+        <p:blipFill>
+          <a:blip r:embed="rId1"/>
+          <a:stretch>
+            <a:fillRect/>
+          </a:stretch>
+        </p:blipFill>
+        <p:spPr>
+          <a:xfrm>
+            <a:off x="-88265" y="5037455"/>
+            <a:ext cx="10080000" cy="472541"/>
+          </a:xfrm>
+          <a:prstGeom prst="rect">
+            <a:avLst/>
+          </a:prstGeom>
+        </p:spPr>
+      </p:pic>
     </p:spTree>
   </p:cSld>
   <p:clrMapOvr>
@@ -7379,7 +7481,7 @@
                 </a:uFill>
                 <a:latin typeface="Arial" charset="0"/>
               </a:rPr>
-              <a:t>3 Cola de ejecución principal </a:t>
+              <a:t>2 Clases de la planeacion</a:t>
             </a:r>
             <a:r>
               <a:rPr lang="es-MX" sz="4000" b="0" strike="noStrike" spc="-1">
@@ -7451,7 +7553,63 @@
                 </a:uFill>
                 <a:latin typeface="Arial" charset="0"/>
               </a:rPr>
-              <a:t>Esta cola se diferencia por procesador, esta estructura esta definida en kernel/sched.c , este programa guarda pista de todos las tareas asignadas a un procesador en particular,  y maneja varias estadisticas de planeación acerca la carga del CPU para un mejor balanceo. </a:t>
+              <a:t>La clase </a:t>
+            </a:r>
+            <a:r>
+              <a:rPr lang="x-none" altLang="es-MX" sz="3200" b="0" i="1" strike="noStrike" spc="-1">
+                <a:solidFill>
+                  <a:srgbClr val="000000"/>
+                </a:solidFill>
+                <a:uFill>
+                  <a:solidFill>
+                    <a:srgbClr val="FFFFFF"/>
+                  </a:solidFill>
+                </a:uFill>
+                <a:latin typeface="Arial" charset="0"/>
+              </a:rPr>
+              <a:t>stop </a:t>
+            </a:r>
+            <a:r>
+              <a:rPr lang="x-none" altLang="es-MX" sz="3200" b="0" strike="noStrike" spc="-1">
+                <a:solidFill>
+                  <a:srgbClr val="000000"/>
+                </a:solidFill>
+                <a:uFill>
+                  <a:solidFill>
+                    <a:srgbClr val="FFFFFF"/>
+                  </a:solidFill>
+                </a:uFill>
+                <a:latin typeface="Arial" charset="0"/>
+              </a:rPr>
+              <a:t>es usada para planear la tarea "detener" por procesador la cual </a:t>
+            </a:r>
+            <a:r>
+              <a:rPr lang="x-none" altLang="es-MX" sz="3200" b="0" i="1" strike="noStrike" spc="-1">
+                <a:solidFill>
+                  <a:srgbClr val="000000"/>
+                </a:solidFill>
+                <a:uFill>
+                  <a:solidFill>
+                    <a:srgbClr val="FFFFFF"/>
+                  </a:solidFill>
+                </a:uFill>
+                <a:latin typeface="Arial" charset="0"/>
+              </a:rPr>
+              <a:t>previene </a:t>
+            </a:r>
+            <a:r>
+              <a:rPr lang="x-none" altLang="es-MX" sz="3200" b="0" strike="noStrike" spc="-1">
+                <a:solidFill>
+                  <a:srgbClr val="000000"/>
+                </a:solidFill>
+                <a:uFill>
+                  <a:solidFill>
+                    <a:srgbClr val="FFFFFF"/>
+                  </a:solidFill>
+                </a:uFill>
+                <a:latin typeface="Arial" charset="0"/>
+              </a:rPr>
+              <a:t>todo y no puede ser prevista por nada. La clase IDLE es usada para planificar la tarea IDLE la cual es ejecutada cuando no hay nada que se pueda ejecutar. Las clases de enmedio son para la implementacion de tiempo real y normal.  </a:t>
             </a:r>
             <a:endParaRPr lang="x-none" altLang="es-MX" sz="3200" b="0" strike="noStrike" spc="-1">
               <a:solidFill>
@@ -7578,41 +7736,6 @@
         <p:txBody>
           <a:bodyPr lIns="0" tIns="0" rIns="0" bIns="0"/>
           <a:p>
-            <a:pPr marL="107950" indent="0" algn="just">
-              <a:buClr>
-                <a:srgbClr val="000000"/>
-              </a:buClr>
-              <a:buSzPct val="45000"/>
-              <a:buFont typeface="Wingdings" panose="05000000000000000000" charset="2"/>
-              <a:buNone/>
-            </a:pPr>
-            <a:r>
-              <a:rPr lang="x-none" altLang="es-MX" sz="3200" b="0" strike="noStrike" spc="-1">
-                <a:solidFill>
-                  <a:srgbClr val="000000"/>
-                </a:solidFill>
-                <a:uFill>
-                  <a:solidFill>
-                    <a:srgbClr val="FFFFFF"/>
-                  </a:solidFill>
-                </a:uFill>
-                <a:latin typeface="Arial" charset="0"/>
-              </a:rPr>
-              <a:t>Este programa contiene: </a:t>
-            </a:r>
-            <a:endParaRPr lang="x-none" altLang="es-MX" sz="3200" b="0" strike="noStrike" spc="-1">
-              <a:solidFill>
-                <a:srgbClr val="000000"/>
-              </a:solidFill>
-              <a:uFill>
-                <a:solidFill>
-                  <a:srgbClr val="FFFFFF"/>
-                </a:solidFill>
-              </a:uFill>
-              <a:latin typeface="Arial" charset="0"/>
-            </a:endParaRPr>
-          </a:p>
-          <a:p>
             <a:pPr marL="431800" indent="-323850" algn="just">
               <a:buClr>
                 <a:srgbClr val="000000"/>
@@ -7633,7 +7756,7 @@
                 </a:uFill>
                 <a:latin typeface="Arial" charset="0"/>
               </a:rPr>
-              <a:t>un candado para sincronizar operaciones en un CPU  </a:t>
+              <a:t>Esta cola se diferencia por procesador, esta estructura esta definida en kernel/sched.c , este programa guarda pista de todos las tareas asignadas a un procesador en particular,  y maneja varias estadisticas de planeación acerca la carga del CPU para un mejor balanceo. </a:t>
             </a:r>
             <a:endParaRPr lang="x-none" altLang="es-MX" sz="3200" b="0" strike="noStrike" spc="-1">
               <a:solidFill>
@@ -7647,220 +7770,8 @@
               <a:latin typeface="Arial" charset="0"/>
             </a:endParaRPr>
           </a:p>
-          <a:p>
-            <a:pPr marL="431800" indent="-323850" algn="just">
-              <a:buClr>
-                <a:srgbClr val="000000"/>
-              </a:buClr>
-              <a:buSzPct val="45000"/>
-              <a:buFont typeface="Wingdings" panose="05000000000000000000" charset="2"/>
-              <a:buChar char=""/>
-            </a:pPr>
-            <a:r>
-              <a:rPr lang="x-none" altLang="es-MX" sz="3200" b="0" strike="noStrike" spc="-1">
-                <a:solidFill>
-                  <a:srgbClr val="000000"/>
-                </a:solidFill>
-                <a:uFill>
-                  <a:solidFill>
-                    <a:srgbClr val="FFFFFF"/>
-                  </a:solidFill>
-                </a:uFill>
-                <a:latin typeface="Arial" charset="0"/>
-              </a:rPr>
-              <a:t>apuntadores al </a:t>
-            </a:r>
-            <a:r>
-              <a:rPr lang="x-none" altLang="es-MX" sz="3200" b="0" i="1" strike="noStrike" spc="-1">
-                <a:solidFill>
-                  <a:srgbClr val="000000"/>
-                </a:solidFill>
-                <a:uFill>
-                  <a:solidFill>
-                    <a:srgbClr val="FFFFFF"/>
-                  </a:solidFill>
-                </a:uFill>
-                <a:latin typeface="Arial" charset="0"/>
-              </a:rPr>
-              <a:t>task_structs </a:t>
-            </a:r>
-            <a:r>
-              <a:rPr lang="x-none" altLang="es-MX" sz="3200" b="0" strike="noStrike" spc="-1">
-                <a:solidFill>
-                  <a:srgbClr val="000000"/>
-                </a:solidFill>
-                <a:uFill>
-                  <a:solidFill>
-                    <a:srgbClr val="FFFFFF"/>
-                  </a:solidFill>
-                </a:uFill>
-                <a:latin typeface="Arial" charset="0"/>
-              </a:rPr>
-              <a:t>de la ejecución actual, el IDLE  y tarea STOP </a:t>
-            </a:r>
-            <a:endParaRPr lang="x-none" altLang="es-MX" sz="3200" b="0" strike="noStrike" spc="-1">
-              <a:solidFill>
-                <a:srgbClr val="000000"/>
-              </a:solidFill>
-              <a:uFill>
-                <a:solidFill>
-                  <a:srgbClr val="FFFFFF"/>
-                </a:solidFill>
-              </a:uFill>
-              <a:latin typeface="Arial" charset="0"/>
-            </a:endParaRPr>
-          </a:p>
-          <a:p>
-            <a:pPr marL="431800" indent="-323850" algn="just">
-              <a:buClr>
-                <a:srgbClr val="000000"/>
-              </a:buClr>
-              <a:buSzPct val="45000"/>
-              <a:buFont typeface="Wingdings" panose="05000000000000000000" charset="2"/>
-              <a:buChar char=""/>
-            </a:pPr>
-            <a:endParaRPr lang="x-none" altLang="es-MX" sz="3200" b="0" strike="noStrike" spc="-1">
-              <a:solidFill>
-                <a:srgbClr val="000000"/>
-              </a:solidFill>
-              <a:uFill>
-                <a:solidFill>
-                  <a:srgbClr val="FFFFFF"/>
-                </a:solidFill>
-              </a:uFill>
-              <a:latin typeface="Arial" charset="0"/>
-            </a:endParaRPr>
-          </a:p>
-          <a:p>
-            <a:pPr marL="431800" indent="-323850" algn="just">
-              <a:buClr>
-                <a:srgbClr val="000000"/>
-              </a:buClr>
-              <a:buSzPct val="45000"/>
-              <a:buFont typeface="Wingdings" panose="05000000000000000000" charset="2"/>
-              <a:buChar char=""/>
-            </a:pPr>
-            <a:r>
-              <a:rPr lang="x-none" altLang="es-MX" sz="3200" b="0" strike="noStrike" spc="-1">
-                <a:solidFill>
-                  <a:srgbClr val="000000"/>
-                </a:solidFill>
-                <a:uFill>
-                  <a:solidFill>
-                    <a:srgbClr val="FFFFFF"/>
-                  </a:solidFill>
-                </a:uFill>
-                <a:latin typeface="Arial" charset="0"/>
-              </a:rPr>
-              <a:t>Cola de ejecuciones para tiempo real y normal(fair)</a:t>
-            </a:r>
-            <a:endParaRPr lang="x-none" altLang="es-MX" sz="3200" b="0" strike="noStrike" spc="-1">
-              <a:solidFill>
-                <a:srgbClr val="000000"/>
-              </a:solidFill>
-              <a:uFill>
-                <a:solidFill>
-                  <a:srgbClr val="FFFFFF"/>
-                </a:solidFill>
-              </a:uFill>
-              <a:latin typeface="Arial" charset="0"/>
-            </a:endParaRPr>
-          </a:p>
-          <a:p>
-            <a:pPr marL="431800" indent="-323850" algn="just">
-              <a:buClr>
-                <a:srgbClr val="000000"/>
-              </a:buClr>
-              <a:buSzPct val="45000"/>
-              <a:buFont typeface="Wingdings" panose="05000000000000000000" charset="2"/>
-              <a:buChar char=""/>
-            </a:pPr>
-            <a:endParaRPr lang="x-none" altLang="es-MX" sz="3200" b="0" strike="noStrike" spc="-1">
-              <a:solidFill>
-                <a:srgbClr val="000000"/>
-              </a:solidFill>
-              <a:uFill>
-                <a:solidFill>
-                  <a:srgbClr val="FFFFFF"/>
-                </a:solidFill>
-              </a:uFill>
-              <a:latin typeface="Arial" charset="0"/>
-            </a:endParaRPr>
-          </a:p>
-        </p:txBody>
-      </p:sp>
-      <p:pic>
-        <p:nvPicPr>
-          <p:cNvPr id="2" name="Picture 1"/>
-          <p:cNvPicPr>
-            <a:picLocks noChangeAspect="1"/>
-          </p:cNvPicPr>
-          <p:nvPr/>
-        </p:nvPicPr>
-        <p:blipFill>
-          <a:blip r:embed="rId1"/>
-          <a:stretch>
-            <a:fillRect/>
-          </a:stretch>
-        </p:blipFill>
-        <p:spPr>
-          <a:xfrm>
-            <a:off x="2017395" y="2741295"/>
-            <a:ext cx="3004820" cy="522605"/>
-          </a:xfrm>
-          <a:prstGeom prst="rect">
-            <a:avLst/>
-          </a:prstGeom>
-        </p:spPr>
-      </p:pic>
-      <p:pic>
-        <p:nvPicPr>
-          <p:cNvPr id="3" name="Picture 2"/>
-          <p:cNvPicPr>
-            <a:picLocks noChangeAspect="1"/>
-          </p:cNvPicPr>
-          <p:nvPr/>
-        </p:nvPicPr>
-        <p:blipFill>
-          <a:blip r:embed="rId2"/>
-          <a:stretch>
-            <a:fillRect/>
-          </a:stretch>
-        </p:blipFill>
-        <p:spPr>
-          <a:xfrm>
-            <a:off x="1778635" y="4162425"/>
-            <a:ext cx="5953125" cy="567055"/>
-          </a:xfrm>
-          <a:prstGeom prst="rect">
-            <a:avLst/>
-          </a:prstGeom>
-        </p:spPr>
-      </p:pic>
-      <p:pic>
-        <p:nvPicPr>
-          <p:cNvPr id="4" name="Picture 3"/>
-          <p:cNvPicPr>
-            <a:picLocks noChangeAspect="1"/>
-          </p:cNvPicPr>
-          <p:nvPr/>
-        </p:nvPicPr>
-        <p:blipFill>
-          <a:blip r:embed="rId3"/>
-          <a:stretch>
-            <a:fillRect/>
-          </a:stretch>
-        </p:blipFill>
-        <p:spPr>
-          <a:xfrm>
-            <a:off x="1018540" y="5756910"/>
-            <a:ext cx="3121025" cy="924560"/>
-          </a:xfrm>
-          <a:prstGeom prst="rect">
-            <a:avLst/>
-          </a:prstGeom>
-        </p:spPr>
-      </p:pic>
+        </p:txBody>
+      </p:sp>
     </p:spTree>
   </p:cSld>
   <p:clrMapOvr>
@@ -7920,7 +7831,7 @@
                 </a:uFill>
                 <a:latin typeface="Arial" charset="0"/>
               </a:rPr>
-              <a:t>4 El esqueleto del planificador </a:t>
+              <a:t>3 Cola de ejecución principal </a:t>
             </a:r>
             <a:r>
               <a:rPr lang="es-MX" sz="4000" b="0" strike="noStrike" spc="-1">
@@ -7958,7 +7869,7 @@
         </p:nvSpPr>
         <p:spPr>
           <a:xfrm>
-            <a:off x="436885" y="1807250"/>
+            <a:off x="468000" y="1823760"/>
             <a:ext cx="9072000" cy="4384440"/>
           </a:xfrm>
           <a:prstGeom prst="rect">
@@ -7971,6 +7882,41 @@
         </p:spPr>
         <p:txBody>
           <a:bodyPr lIns="0" tIns="0" rIns="0" bIns="0"/>
+          <a:p>
+            <a:pPr marL="107950" indent="0" algn="just">
+              <a:buClr>
+                <a:srgbClr val="000000"/>
+              </a:buClr>
+              <a:buSzPct val="45000"/>
+              <a:buFont typeface="Wingdings" panose="05000000000000000000" charset="2"/>
+              <a:buNone/>
+            </a:pPr>
+            <a:r>
+              <a:rPr lang="x-none" altLang="es-MX" sz="3200" b="0" strike="noStrike" spc="-1">
+                <a:solidFill>
+                  <a:srgbClr val="000000"/>
+                </a:solidFill>
+                <a:uFill>
+                  <a:solidFill>
+                    <a:srgbClr val="FFFFFF"/>
+                  </a:solidFill>
+                </a:uFill>
+                <a:latin typeface="Arial" charset="0"/>
+              </a:rPr>
+              <a:t>Este programa contiene: </a:t>
+            </a:r>
+            <a:endParaRPr lang="x-none" altLang="es-MX" sz="3200" b="0" strike="noStrike" spc="-1">
+              <a:solidFill>
+                <a:srgbClr val="000000"/>
+              </a:solidFill>
+              <a:uFill>
+                <a:solidFill>
+                  <a:srgbClr val="FFFFFF"/>
+                </a:solidFill>
+              </a:uFill>
+              <a:latin typeface="Arial" charset="0"/>
+            </a:endParaRPr>
+          </a:p>
           <a:p>
             <a:pPr marL="431800" indent="-323850" algn="just">
               <a:buClr>
@@ -7992,7 +7938,7 @@
                 </a:uFill>
                 <a:latin typeface="Arial" charset="0"/>
               </a:rPr>
-              <a:t>Para abordar este tema se puede tomar como punto de partida la función schedule(), definida  en kernel/sched.c . Esta es la función que el resto del kernel usa para ejecutar el ejecutar el proceso planificador, decidiendo que proceso ejecutar y ejecuntándolo.</a:t>
+              <a:t>un candado para sincronizar operaciones en un CPU  </a:t>
             </a:r>
             <a:endParaRPr lang="x-none" altLang="es-MX" sz="3200" b="0" strike="noStrike" spc="-1">
               <a:solidFill>
@@ -8027,7 +7973,7 @@
                 </a:uFill>
                 <a:latin typeface="Arial" charset="0"/>
               </a:rPr>
-              <a:t>Su objetivo principal es buscar la siguiente tarea a ser ejecutada y asignarlo a la variable </a:t>
+              <a:t>apuntadores al </a:t>
             </a:r>
             <a:r>
               <a:rPr lang="x-none" altLang="es-MX" sz="3200" b="0" i="1" strike="noStrike" spc="-1">
@@ -8041,7 +7987,7 @@
                 </a:uFill>
                 <a:latin typeface="Arial" charset="0"/>
               </a:rPr>
-              <a:t>next </a:t>
+              <a:t>task_structs </a:t>
             </a:r>
             <a:r>
               <a:rPr lang="x-none" altLang="es-MX" sz="3200" b="0" strike="noStrike" spc="-1">
@@ -8055,7 +8001,7 @@
                 </a:uFill>
                 <a:latin typeface="Arial" charset="0"/>
               </a:rPr>
-              <a:t>. Al final ejecutar un cambio de contexto para cambiar a una nueva tarea.</a:t>
+              <a:t>de la ejecución actual, el IDLE  y tarea STOP </a:t>
             </a:r>
             <a:endParaRPr lang="x-none" altLang="es-MX" sz="3200" b="0" strike="noStrike" spc="-1">
               <a:solidFill>
@@ -8069,29 +8015,6 @@
               <a:latin typeface="Arial" charset="0"/>
             </a:endParaRPr>
           </a:p>
-        </p:txBody>
-      </p:sp>
-      <p:sp>
-        <p:nvSpPr>
-          <p:cNvPr id="5" name="TextShape 2"/>
-          <p:cNvSpPr txBox="1"/>
-          <p:nvPr/>
-        </p:nvSpPr>
-        <p:spPr>
-          <a:xfrm>
-            <a:off x="563885" y="1934250"/>
-            <a:ext cx="9072000" cy="4384440"/>
-          </a:xfrm>
-          <a:prstGeom prst="rect">
-            <a:avLst/>
-          </a:prstGeom>
-          <a:noFill/>
-          <a:ln>
-            <a:noFill/>
-          </a:ln>
-        </p:spPr>
-        <p:txBody>
-          <a:bodyPr lIns="0" tIns="0" rIns="0" bIns="0"/>
           <a:p>
             <a:pPr marL="431800" indent="-323850" algn="just">
               <a:buClr>
@@ -8113,8 +8036,136 @@
               <a:latin typeface="Arial" charset="0"/>
             </a:endParaRPr>
           </a:p>
-        </p:txBody>
-      </p:sp>
+          <a:p>
+            <a:pPr marL="431800" indent="-323850" algn="just">
+              <a:buClr>
+                <a:srgbClr val="000000"/>
+              </a:buClr>
+              <a:buSzPct val="45000"/>
+              <a:buFont typeface="Wingdings" panose="05000000000000000000" charset="2"/>
+              <a:buChar char=""/>
+            </a:pPr>
+            <a:r>
+              <a:rPr lang="x-none" altLang="es-MX" sz="3200" b="0" strike="noStrike" spc="-1">
+                <a:solidFill>
+                  <a:srgbClr val="000000"/>
+                </a:solidFill>
+                <a:uFill>
+                  <a:solidFill>
+                    <a:srgbClr val="FFFFFF"/>
+                  </a:solidFill>
+                </a:uFill>
+                <a:latin typeface="Arial" charset="0"/>
+              </a:rPr>
+              <a:t>Cola de ejecuciones para tiempo real y normal(fair)</a:t>
+            </a:r>
+            <a:endParaRPr lang="x-none" altLang="es-MX" sz="3200" b="0" strike="noStrike" spc="-1">
+              <a:solidFill>
+                <a:srgbClr val="000000"/>
+              </a:solidFill>
+              <a:uFill>
+                <a:solidFill>
+                  <a:srgbClr val="FFFFFF"/>
+                </a:solidFill>
+              </a:uFill>
+              <a:latin typeface="Arial" charset="0"/>
+            </a:endParaRPr>
+          </a:p>
+          <a:p>
+            <a:pPr marL="431800" indent="-323850" algn="just">
+              <a:buClr>
+                <a:srgbClr val="000000"/>
+              </a:buClr>
+              <a:buSzPct val="45000"/>
+              <a:buFont typeface="Wingdings" panose="05000000000000000000" charset="2"/>
+              <a:buChar char=""/>
+            </a:pPr>
+            <a:endParaRPr lang="x-none" altLang="es-MX" sz="3200" b="0" strike="noStrike" spc="-1">
+              <a:solidFill>
+                <a:srgbClr val="000000"/>
+              </a:solidFill>
+              <a:uFill>
+                <a:solidFill>
+                  <a:srgbClr val="FFFFFF"/>
+                </a:solidFill>
+              </a:uFill>
+              <a:latin typeface="Arial" charset="0"/>
+            </a:endParaRPr>
+          </a:p>
+        </p:txBody>
+      </p:sp>
+      <p:pic>
+        <p:nvPicPr>
+          <p:cNvPr id="2" name="Picture 1"/>
+          <p:cNvPicPr>
+            <a:picLocks noChangeAspect="1"/>
+          </p:cNvPicPr>
+          <p:nvPr/>
+        </p:nvPicPr>
+        <p:blipFill>
+          <a:blip r:embed="rId1"/>
+          <a:stretch>
+            <a:fillRect/>
+          </a:stretch>
+        </p:blipFill>
+        <p:spPr>
+          <a:xfrm>
+            <a:off x="2017395" y="2741295"/>
+            <a:ext cx="3004820" cy="522605"/>
+          </a:xfrm>
+          <a:prstGeom prst="rect">
+            <a:avLst/>
+          </a:prstGeom>
+        </p:spPr>
+      </p:pic>
+      <p:pic>
+        <p:nvPicPr>
+          <p:cNvPr id="3" name="Picture 2"/>
+          <p:cNvPicPr>
+            <a:picLocks noChangeAspect="1"/>
+          </p:cNvPicPr>
+          <p:nvPr/>
+        </p:nvPicPr>
+        <p:blipFill>
+          <a:blip r:embed="rId2"/>
+          <a:stretch>
+            <a:fillRect/>
+          </a:stretch>
+        </p:blipFill>
+        <p:spPr>
+          <a:xfrm>
+            <a:off x="1778635" y="4162425"/>
+            <a:ext cx="5953125" cy="567055"/>
+          </a:xfrm>
+          <a:prstGeom prst="rect">
+            <a:avLst/>
+          </a:prstGeom>
+        </p:spPr>
+      </p:pic>
+      <p:pic>
+        <p:nvPicPr>
+          <p:cNvPr id="4" name="Picture 3"/>
+          <p:cNvPicPr>
+            <a:picLocks noChangeAspect="1"/>
+          </p:cNvPicPr>
+          <p:nvPr/>
+        </p:nvPicPr>
+        <p:blipFill>
+          <a:blip r:embed="rId3"/>
+          <a:stretch>
+            <a:fillRect/>
+          </a:stretch>
+        </p:blipFill>
+        <p:spPr>
+          <a:xfrm>
+            <a:off x="1018540" y="5756910"/>
+            <a:ext cx="3121025" cy="924560"/>
+          </a:xfrm>
+          <a:prstGeom prst="rect">
+            <a:avLst/>
+          </a:prstGeom>
+        </p:spPr>
+      </p:pic>
     </p:spTree>
   </p:cSld>
   <p:clrMapOvr>
@@ -8246,7 +8297,42 @@
                 </a:uFill>
                 <a:latin typeface="Arial" charset="0"/>
               </a:rPr>
-              <a:t>Desde que el kernel de Linux es </a:t>
+              <a:t>Para abordar este tema se puede tomar como punto de partida la función schedule(), definida  en kernel/sched.c . Esta es la función que el resto del kernel usa para ejecutar el ejecutar el proceso planificador, decidiendo que proceso ejecutar y ejecuntándolo.</a:t>
+            </a:r>
+            <a:endParaRPr lang="x-none" altLang="es-MX" sz="3200" b="0" strike="noStrike" spc="-1">
+              <a:solidFill>
+                <a:srgbClr val="000000"/>
+              </a:solidFill>
+              <a:uFill>
+                <a:solidFill>
+                  <a:srgbClr val="FFFFFF"/>
+                </a:solidFill>
+              </a:uFill>
+              <a:latin typeface="Arial" charset="0"/>
+            </a:endParaRPr>
+          </a:p>
+          <a:p>
+            <a:pPr marL="431800" indent="-323850" algn="just">
+              <a:buClr>
+                <a:srgbClr val="000000"/>
+              </a:buClr>
+              <a:buSzPct val="45000"/>
+              <a:buFont typeface="Wingdings" panose="05000000000000000000" charset="2"/>
+              <a:buChar char=""/>
+            </a:pPr>
+            <a:r>
+              <a:rPr lang="x-none" altLang="es-MX" sz="3200" b="0" strike="noStrike" spc="-1">
+                <a:solidFill>
+                  <a:srgbClr val="000000"/>
+                </a:solidFill>
+                <a:uFill>
+                  <a:solidFill>
+                    <a:srgbClr val="FFFFFF"/>
+                  </a:solidFill>
+                </a:uFill>
+                <a:latin typeface="Arial" charset="0"/>
+              </a:rPr>
+              <a:t>Su objetivo principal es buscar la siguiente tarea a ser ejecutada y asignarlo a la variable </a:t>
             </a:r>
             <a:r>
               <a:rPr lang="x-none" altLang="es-MX" sz="3200" b="0" i="1" strike="noStrike" spc="-1">
@@ -8260,7 +8346,7 @@
                 </a:uFill>
                 <a:latin typeface="Arial" charset="0"/>
               </a:rPr>
-              <a:t>expulsivo,</a:t>
+              <a:t>next </a:t>
             </a:r>
             <a:r>
               <a:rPr lang="x-none" altLang="es-MX" sz="3200" b="0" strike="noStrike" spc="-1">
@@ -8274,35 +8360,7 @@
                 </a:uFill>
                 <a:latin typeface="Arial" charset="0"/>
               </a:rPr>
-              <a:t> puede pasar que una tarea que se ejeuta en espacio de kernel se involutariamente expulsada por otra tarea de mayor prioridad es por eso que lo primero que se hace es ejecutar  la función  </a:t>
-            </a:r>
-            <a:r>
-              <a:rPr lang="x-none" altLang="es-MX" sz="3200" b="0" i="1" strike="noStrike" spc="-1">
-                <a:solidFill>
-                  <a:srgbClr val="000000"/>
-                </a:solidFill>
-                <a:uFill>
-                  <a:solidFill>
-                    <a:srgbClr val="FFFFFF"/>
-                  </a:solidFill>
-                </a:uFill>
-                <a:latin typeface="Arial" charset="0"/>
-              </a:rPr>
-              <a:t>preempt_disable() </a:t>
-            </a:r>
-            <a:r>
-              <a:rPr lang="x-none" altLang="es-MX" sz="3200" b="0" strike="noStrike" spc="-1">
-                <a:solidFill>
-                  <a:srgbClr val="000000"/>
-                </a:solidFill>
-                <a:uFill>
-                  <a:solidFill>
-                    <a:srgbClr val="FFFFFF"/>
-                  </a:solidFill>
-                </a:uFill>
-                <a:latin typeface="Arial" charset="0"/>
-              </a:rPr>
-              <a:t>entonces el planificador no puede ser interrumpido durante la ejecución de un operación crítica.</a:t>
+              <a:t>. Al final ejecutar un cambio de contexto para cambiar a una nueva tarea.</a:t>
             </a:r>
             <a:endParaRPr lang="x-none" altLang="es-MX" sz="3200" b="0" strike="noStrike" spc="-1">
               <a:solidFill>
@@ -8320,44 +8378,45 @@
       </p:sp>
       <p:sp>
         <p:nvSpPr>
-          <p:cNvPr id="2" name="Oval 1"/>
-          <p:cNvSpPr/>
+          <p:cNvPr id="5" name="TextShape 2"/>
+          <p:cNvSpPr txBox="1"/>
           <p:nvPr/>
         </p:nvSpPr>
         <p:spPr>
           <a:xfrm>
-            <a:off x="8109585" y="249555"/>
-            <a:ext cx="1229995" cy="1109980"/>
-          </a:xfrm>
-          <a:prstGeom prst="ellipse">
-            <a:avLst/>
-          </a:prstGeom>
-        </p:spPr>
-        <p:style>
-          <a:lnRef idx="2">
-            <a:schemeClr val="accent2">
-              <a:shade val="50000"/>
-            </a:schemeClr>
-          </a:lnRef>
-          <a:fillRef idx="1">
-            <a:schemeClr val="accent2"/>
-          </a:fillRef>
-          <a:effectRef idx="0">
-            <a:schemeClr val="accent2"/>
-          </a:effectRef>
-          <a:fontRef idx="minor">
-            <a:schemeClr val="lt1"/>
-          </a:fontRef>
-        </p:style>
-        <p:txBody>
-          <a:bodyPr rtlCol="0" anchor="ctr"/>
-          <a:p>
-            <a:pPr algn="ctr"/>
-            <a:r>
-              <a:rPr lang="x-none" altLang="en-US"/>
-              <a:t>Pag 6</a:t>
-            </a:r>
-            <a:endParaRPr lang="x-none" altLang="en-US"/>
+            <a:off x="563885" y="1934250"/>
+            <a:ext cx="9072000" cy="4384440"/>
+          </a:xfrm>
+          <a:prstGeom prst="rect">
+            <a:avLst/>
+          </a:prstGeom>
+          <a:noFill/>
+          <a:ln>
+            <a:noFill/>
+          </a:ln>
+        </p:spPr>
+        <p:txBody>
+          <a:bodyPr lIns="0" tIns="0" rIns="0" bIns="0"/>
+          <a:p>
+            <a:pPr marL="431800" indent="-323850" algn="just">
+              <a:buClr>
+                <a:srgbClr val="000000"/>
+              </a:buClr>
+              <a:buSzPct val="45000"/>
+              <a:buFont typeface="Wingdings" panose="05000000000000000000" charset="2"/>
+              <a:buChar char=""/>
+            </a:pPr>
+            <a:endParaRPr lang="x-none" altLang="es-MX" sz="3200" b="0" strike="noStrike" spc="-1">
+              <a:solidFill>
+                <a:srgbClr val="000000"/>
+              </a:solidFill>
+              <a:uFill>
+                <a:solidFill>
+                  <a:srgbClr val="FFFFFF"/>
+                </a:solidFill>
+              </a:uFill>
+              <a:latin typeface="Arial" charset="0"/>
+            </a:endParaRPr>
           </a:p>
         </p:txBody>
       </p:sp>
@@ -8492,50 +8551,22 @@
                 </a:uFill>
                 <a:latin typeface="Arial" charset="0"/>
               </a:rPr>
-              <a:t>Después el planificador bloquea 	la cola de procesos del CPU actual para que un solo hilo a la vez pueda modificarla.</a:t>
-            </a:r>
-            <a:endParaRPr lang="x-none" altLang="es-MX" sz="3200" b="0" strike="noStrike" spc="-1">
-              <a:solidFill>
-                <a:srgbClr val="000000"/>
-              </a:solidFill>
-              <a:uFill>
-                <a:solidFill>
-                  <a:srgbClr val="FFFFFF"/>
-                </a:solidFill>
-              </a:uFill>
-              <a:latin typeface="Arial" charset="0"/>
-            </a:endParaRPr>
-          </a:p>
-          <a:p>
-            <a:pPr marL="431800" indent="-323850" algn="just">
-              <a:buClr>
-                <a:srgbClr val="000000"/>
-              </a:buClr>
-              <a:buSzPct val="45000"/>
-              <a:buFont typeface="Wingdings" panose="05000000000000000000" charset="2"/>
-              <a:buChar char=""/>
-            </a:pPr>
-            <a:endParaRPr lang="x-none" altLang="es-MX" sz="3200" b="0" strike="noStrike" spc="-1">
-              <a:solidFill>
-                <a:srgbClr val="000000"/>
-              </a:solidFill>
-              <a:uFill>
-                <a:solidFill>
-                  <a:srgbClr val="FFFFFF"/>
-                </a:solidFill>
-              </a:uFill>
-              <a:latin typeface="Arial" charset="0"/>
-            </a:endParaRPr>
-          </a:p>
-          <a:p>
-            <a:pPr marL="431800" indent="-323850" algn="just">
-              <a:buClr>
-                <a:srgbClr val="000000"/>
-              </a:buClr>
-              <a:buSzPct val="45000"/>
-              <a:buFont typeface="Wingdings" panose="05000000000000000000" charset="2"/>
-              <a:buChar char=""/>
-            </a:pPr>
+              <a:t>Desde que el kernel de Linux es </a:t>
+            </a:r>
+            <a:r>
+              <a:rPr lang="x-none" altLang="es-MX" sz="3200" b="0" i="1" strike="noStrike" spc="-1">
+                <a:solidFill>
+                  <a:srgbClr val="000000"/>
+                </a:solidFill>
+                <a:uFill>
+                  <a:solidFill>
+                    <a:srgbClr val="FFFFFF"/>
+                  </a:solidFill>
+                </a:uFill>
+                <a:latin typeface="Arial" charset="0"/>
+              </a:rPr>
+              <a:t>expulsivo,</a:t>
+            </a:r>
             <a:r>
               <a:rPr lang="x-none" altLang="es-MX" sz="3200" b="0" strike="noStrike" spc="-1">
                 <a:solidFill>
@@ -8548,7 +8579,35 @@
                 </a:uFill>
                 <a:latin typeface="Arial" charset="0"/>
               </a:rPr>
-              <a:t>Despues el planificador examamina el estado de la tarea anterior y si no es ejecutable y no ha sido expulsada del modo kernel, entonces el removida de la cola de procesos. Si no tiene bloqueo de señal pendiente, su estado es cambiado a tarea en ejecución y es dejado en la cola de procesos .</a:t>
+              <a:t> puede pasar que una tarea que se ejeuta en espacio de kernel se involutariamente expulsada por otra tarea de mayor prioridad es por eso que lo primero que se hace es ejecutar  la función  </a:t>
+            </a:r>
+            <a:r>
+              <a:rPr lang="x-none" altLang="es-MX" sz="3200" b="0" i="1" strike="noStrike" spc="-1">
+                <a:solidFill>
+                  <a:srgbClr val="000000"/>
+                </a:solidFill>
+                <a:uFill>
+                  <a:solidFill>
+                    <a:srgbClr val="FFFFFF"/>
+                  </a:solidFill>
+                </a:uFill>
+                <a:latin typeface="Arial" charset="0"/>
+              </a:rPr>
+              <a:t>preempt_disable() </a:t>
+            </a:r>
+            <a:r>
+              <a:rPr lang="x-none" altLang="es-MX" sz="3200" b="0" strike="noStrike" spc="-1">
+                <a:solidFill>
+                  <a:srgbClr val="000000"/>
+                </a:solidFill>
+                <a:uFill>
+                  <a:solidFill>
+                    <a:srgbClr val="FFFFFF"/>
+                  </a:solidFill>
+                </a:uFill>
+                <a:latin typeface="Arial" charset="0"/>
+              </a:rPr>
+              <a:t>entonces el planificador no puede ser interrumpido durante la ejecución de un operación crítica.</a:t>
             </a:r>
             <a:endParaRPr lang="x-none" altLang="es-MX" sz="3200" b="0" strike="noStrike" spc="-1">
               <a:solidFill>
@@ -8738,51 +8797,9 @@
                 </a:uFill>
                 <a:latin typeface="Arial" charset="0"/>
               </a:rPr>
-              <a:t>Para que una tarea sea removida de la cola de procesos, el planificador llama a la función </a:t>
-            </a:r>
-            <a:r>
-              <a:rPr lang="x-none" altLang="es-MX" sz="3200" b="0" i="1" strike="noStrike" spc="-1">
-                <a:solidFill>
-                  <a:srgbClr val="000000"/>
-                </a:solidFill>
-                <a:uFill>
-                  <a:solidFill>
-                    <a:srgbClr val="FFFFFF"/>
-                  </a:solidFill>
-                </a:uFill>
-                <a:latin typeface="Arial" charset="0"/>
-              </a:rPr>
-              <a:t>deactivate_task() </a:t>
-            </a:r>
-            <a:r>
-              <a:rPr lang="x-none" altLang="es-MX" sz="3200" b="0" strike="noStrike" spc="-1">
-                <a:solidFill>
-                  <a:srgbClr val="000000"/>
-                </a:solidFill>
-                <a:uFill>
-                  <a:solidFill>
-                    <a:srgbClr val="FFFFFF"/>
-                  </a:solidFill>
-                </a:uFill>
-                <a:latin typeface="Arial" charset="0"/>
-              </a:rPr>
-              <a:t> la cual de manera interna llama a </a:t>
-            </a:r>
-            <a:r>
-              <a:rPr lang="x-none" altLang="es-MX" sz="3200" b="0" i="1" strike="noStrike" spc="-1">
-                <a:solidFill>
-                  <a:srgbClr val="000000"/>
-                </a:solidFill>
-                <a:uFill>
-                  <a:solidFill>
-                    <a:srgbClr val="FFFFFF"/>
-                  </a:solidFill>
-                </a:uFill>
-                <a:latin typeface="Arial" charset="0"/>
-              </a:rPr>
-              <a:t>dequeue_task(). </a:t>
-            </a:r>
-            <a:endParaRPr lang="x-none" altLang="es-MX" sz="3200" b="0" i="1" strike="noStrike" spc="-1">
+              <a:t>Después el planificador bloquea 	la cola de procesos del CPU actual para que un solo hilo a la vez pueda modificarla.</a:t>
+            </a:r>
+            <a:endParaRPr lang="x-none" altLang="es-MX" sz="3200" b="0" strike="noStrike" spc="-1">
               <a:solidFill>
                 <a:srgbClr val="000000"/>
               </a:solidFill>
@@ -8803,44 +8820,98 @@
               <a:buFont typeface="Wingdings" panose="05000000000000000000" charset="2"/>
               <a:buChar char=""/>
             </a:pPr>
-            <a:endParaRPr lang="x-none" altLang="es-MX" sz="3200" b="0" i="1" strike="noStrike" spc="-1">
-              <a:solidFill>
-                <a:srgbClr val="000000"/>
-              </a:solidFill>
-              <a:uFill>
-                <a:solidFill>
-                  <a:srgbClr val="FFFFFF"/>
-                </a:solidFill>
-              </a:uFill>
-              <a:latin typeface="Arial" charset="0"/>
-            </a:endParaRPr>
-          </a:p>
-        </p:txBody>
-      </p:sp>
-      <p:pic>
-        <p:nvPicPr>
-          <p:cNvPr id="3" name="Picture 2"/>
-          <p:cNvPicPr>
-            <a:picLocks noChangeAspect="1"/>
-          </p:cNvPicPr>
+            <a:endParaRPr lang="x-none" altLang="es-MX" sz="3200" b="0" strike="noStrike" spc="-1">
+              <a:solidFill>
+                <a:srgbClr val="000000"/>
+              </a:solidFill>
+              <a:uFill>
+                <a:solidFill>
+                  <a:srgbClr val="FFFFFF"/>
+                </a:solidFill>
+              </a:uFill>
+              <a:latin typeface="Arial" charset="0"/>
+            </a:endParaRPr>
+          </a:p>
+          <a:p>
+            <a:pPr marL="431800" indent="-323850" algn="just">
+              <a:buClr>
+                <a:srgbClr val="000000"/>
+              </a:buClr>
+              <a:buSzPct val="45000"/>
+              <a:buFont typeface="Wingdings" panose="05000000000000000000" charset="2"/>
+              <a:buChar char=""/>
+            </a:pPr>
+            <a:r>
+              <a:rPr lang="x-none" altLang="es-MX" sz="3200" b="0" strike="noStrike" spc="-1">
+                <a:solidFill>
+                  <a:srgbClr val="000000"/>
+                </a:solidFill>
+                <a:uFill>
+                  <a:solidFill>
+                    <a:srgbClr val="FFFFFF"/>
+                  </a:solidFill>
+                </a:uFill>
+                <a:latin typeface="Arial" charset="0"/>
+              </a:rPr>
+              <a:t>Despues el planificador examamina el estado de la tarea anterior y si no es ejecutable y no ha sido expulsada del modo kernel, entonces el removida de la cola de procesos. Si no tiene bloqueo de señal pendiente, su estado es cambiado a tarea en ejecución y es dejado en la cola de procesos .</a:t>
+            </a:r>
+            <a:endParaRPr lang="x-none" altLang="es-MX" sz="3200" b="0" strike="noStrike" spc="-1">
+              <a:solidFill>
+                <a:srgbClr val="000000"/>
+              </a:solidFill>
+              <a:uFill>
+                <a:solidFill>
+                  <a:srgbClr val="FFFFFF"/>
+                </a:solidFill>
+              </a:uFill>
+              <a:latin typeface="Arial" charset="0"/>
+            </a:endParaRPr>
+          </a:p>
+        </p:txBody>
+      </p:sp>
+      <p:sp>
+        <p:nvSpPr>
+          <p:cNvPr id="2" name="Oval 1"/>
+          <p:cNvSpPr/>
           <p:nvPr/>
-        </p:nvPicPr>
-        <p:blipFill>
-          <a:blip r:embed="rId1"/>
-          <a:stretch>
-            <a:fillRect/>
-          </a:stretch>
-        </p:blipFill>
-        <p:spPr>
-          <a:xfrm>
-            <a:off x="-10160" y="3922395"/>
-            <a:ext cx="10074275" cy="1836420"/>
-          </a:xfrm>
-          <a:prstGeom prst="rect">
-            <a:avLst/>
-          </a:prstGeom>
-        </p:spPr>
-      </p:pic>
+        </p:nvSpPr>
+        <p:spPr>
+          <a:xfrm>
+            <a:off x="8109585" y="249555"/>
+            <a:ext cx="1229995" cy="1109980"/>
+          </a:xfrm>
+          <a:prstGeom prst="ellipse">
+            <a:avLst/>
+          </a:prstGeom>
+        </p:spPr>
+        <p:style>
+          <a:lnRef idx="2">
+            <a:schemeClr val="accent2">
+              <a:shade val="50000"/>
+            </a:schemeClr>
+          </a:lnRef>
+          <a:fillRef idx="1">
+            <a:schemeClr val="accent2"/>
+          </a:fillRef>
+          <a:effectRef idx="0">
+            <a:schemeClr val="accent2"/>
+          </a:effectRef>
+          <a:fontRef idx="minor">
+            <a:schemeClr val="lt1"/>
+          </a:fontRef>
+        </p:style>
+        <p:txBody>
+          <a:bodyPr rtlCol="0" anchor="ctr"/>
+          <a:p>
+            <a:pPr algn="ctr"/>
+            <a:r>
+              <a:rPr lang="x-none" altLang="en-US"/>
+              <a:t>Pag 6</a:t>
+            </a:r>
+            <a:endParaRPr lang="x-none" altLang="en-US"/>
+          </a:p>
+        </p:txBody>
+      </p:sp>
     </p:spTree>
   </p:cSld>
   <p:clrMapOvr>
@@ -8924,7 +8995,7 @@
         </p:nvSpPr>
         <p:spPr>
           <a:xfrm>
-            <a:off x="504000" y="1823760"/>
+            <a:off x="432245" y="1807250"/>
             <a:ext cx="9072000" cy="4384440"/>
           </a:xfrm>
           <a:prstGeom prst="rect">
@@ -8947,20 +9018,20 @@
               <a:buChar char=""/>
             </a:pPr>
             <a:r>
-              <a:rPr lang="es-MX" sz="3200" b="0" strike="noStrike" spc="-1">
-                <a:solidFill>
-                  <a:srgbClr val="000000"/>
-                </a:solidFill>
-                <a:uFill>
-                  <a:solidFill>
-                    <a:srgbClr val="FFFFFF"/>
-                  </a:solidFill>
-                </a:uFill>
-                <a:latin typeface="Arial" charset="0"/>
-              </a:rPr>
-              <a:t>¿Cual es el planificador de procesos de Linux?</a:t>
-            </a:r>
-            <a:endParaRPr lang="es-MX" sz="4620" b="0" strike="noStrike" spc="-1">
+              <a:rPr lang="x-none" altLang="es-MX" sz="2800" b="0" strike="noStrike" spc="-1">
+                <a:solidFill>
+                  <a:srgbClr val="000000"/>
+                </a:solidFill>
+                <a:uFill>
+                  <a:solidFill>
+                    <a:srgbClr val="FFFFFF"/>
+                  </a:solidFill>
+                </a:uFill>
+                <a:latin typeface="Arial" charset="0"/>
+              </a:rPr>
+              <a:t>Poco de historia del desarrollo del algoritmo del planificador de Linux:</a:t>
+            </a:r>
+            <a:endParaRPr lang="x-none" altLang="es-MX" sz="2800" b="0" strike="noStrike" spc="-1">
               <a:solidFill>
                 <a:srgbClr val="000000"/>
               </a:solidFill>
@@ -8982,20 +9053,118 @@
               <a:buChar char=""/>
             </a:pPr>
             <a:r>
-              <a:rPr lang="es-MX" sz="2800" b="0" strike="noStrike" spc="-1">
-                <a:solidFill>
-                  <a:srgbClr val="000000"/>
-                </a:solidFill>
-                <a:uFill>
-                  <a:solidFill>
-                    <a:srgbClr val="FFFFFF"/>
-                  </a:solidFill>
-                </a:uFill>
-                <a:latin typeface="Arial" charset="0"/>
-              </a:rPr>
-              <a:t>Su nombre es CFS (Completely fair scheduling) y es un algoritmo   </a:t>
-            </a:r>
-            <a:endParaRPr lang="es-MX" sz="4620" b="0" strike="noStrike" spc="-1">
+              <a:rPr lang="x-none" altLang="es-MX" sz="2800" b="0" strike="noStrike" spc="-1">
+                <a:solidFill>
+                  <a:srgbClr val="000000"/>
+                </a:solidFill>
+                <a:uFill>
+                  <a:solidFill>
+                    <a:srgbClr val="FFFFFF"/>
+                  </a:solidFill>
+                </a:uFill>
+                <a:latin typeface="Arial" charset="0"/>
+              </a:rPr>
+              <a:t>-1995 1.2 Cola de procesos circular  con procesos planificados en un sistema Round Robin.</a:t>
+            </a:r>
+            <a:endParaRPr lang="x-none" altLang="es-MX" sz="2800" b="0" strike="noStrike" spc="-1">
+              <a:solidFill>
+                <a:srgbClr val="000000"/>
+              </a:solidFill>
+              <a:uFill>
+                <a:solidFill>
+                  <a:srgbClr val="FFFFFF"/>
+                </a:solidFill>
+              </a:uFill>
+              <a:latin typeface="Arial" charset="0"/>
+            </a:endParaRPr>
+          </a:p>
+          <a:p>
+            <a:pPr marL="431800" indent="-323850" algn="just">
+              <a:buClr>
+                <a:srgbClr val="000000"/>
+              </a:buClr>
+              <a:buSzPct val="45000"/>
+              <a:buFont typeface="Wingdings" panose="05000000000000000000" charset="2"/>
+              <a:buChar char=""/>
+            </a:pPr>
+            <a:r>
+              <a:rPr lang="x-none" altLang="es-MX" sz="2800" b="0" strike="noStrike" spc="-1">
+                <a:solidFill>
+                  <a:srgbClr val="000000"/>
+                </a:solidFill>
+                <a:uFill>
+                  <a:solidFill>
+                    <a:srgbClr val="FFFFFF"/>
+                  </a:solidFill>
+                </a:uFill>
+                <a:latin typeface="Arial" charset="0"/>
+              </a:rPr>
+              <a:t>-1999 2.2 Clases de planeación introducidas y tareas de tiempo real, tareas no expulsivas y tareas no tiempo real, además de soporte SMP.</a:t>
+            </a:r>
+            <a:endParaRPr lang="x-none" altLang="es-MX" sz="2800" b="0" strike="noStrike" spc="-1">
+              <a:solidFill>
+                <a:srgbClr val="000000"/>
+              </a:solidFill>
+              <a:uFill>
+                <a:solidFill>
+                  <a:srgbClr val="FFFFFF"/>
+                </a:solidFill>
+              </a:uFill>
+              <a:latin typeface="Arial" charset="0"/>
+            </a:endParaRPr>
+          </a:p>
+          <a:p>
+            <a:pPr marL="431800" indent="-323850" algn="just">
+              <a:buClr>
+                <a:srgbClr val="000000"/>
+              </a:buClr>
+              <a:buSzPct val="45000"/>
+              <a:buFont typeface="Wingdings" panose="05000000000000000000" charset="2"/>
+              <a:buChar char=""/>
+            </a:pPr>
+            <a:r>
+              <a:rPr lang="x-none" altLang="es-MX" sz="2800" b="0" strike="noStrike" spc="-1">
+                <a:solidFill>
+                  <a:srgbClr val="000000"/>
+                </a:solidFill>
+                <a:uFill>
+                  <a:solidFill>
+                    <a:srgbClr val="FFFFFF"/>
+                  </a:solidFill>
+                </a:uFill>
+                <a:latin typeface="Arial" charset="0"/>
+              </a:rPr>
+              <a:t>-2001 2.4 planificador O(n), división del tiempo en epocas donde a cada tarea  le correspondia cierto tiempo, iterando a través de n tareas y aplicando la funcion </a:t>
+            </a:r>
+            <a:r>
+              <a:rPr lang="x-none" altLang="es-MX" sz="2800" b="0" i="1" strike="noStrike" spc="-1">
+                <a:solidFill>
+                  <a:srgbClr val="000000"/>
+                </a:solidFill>
+                <a:uFill>
+                  <a:solidFill>
+                    <a:srgbClr val="FFFFFF"/>
+                  </a:solidFill>
+                </a:uFill>
+                <a:latin typeface="Arial" charset="0"/>
+              </a:rPr>
+              <a:t>goodness </a:t>
+            </a:r>
+            <a:r>
+              <a:rPr lang="x-none" altLang="es-MX" sz="2800" b="0" strike="noStrike" spc="-1">
+                <a:solidFill>
+                  <a:srgbClr val="000000"/>
+                </a:solidFill>
+                <a:uFill>
+                  <a:solidFill>
+                    <a:srgbClr val="FFFFFF"/>
+                  </a:solidFill>
+                </a:uFill>
+                <a:latin typeface="Arial" charset="0"/>
+              </a:rPr>
+              <a:t>para determinar la siguiente tarea.</a:t>
+            </a:r>
+            <a:endParaRPr lang="x-none" altLang="es-MX" sz="2800" b="0" strike="noStrike" spc="-1">
               <a:solidFill>
                 <a:srgbClr val="000000"/>
               </a:solidFill>
@@ -9140,7 +9309,7 @@
                 </a:uFill>
                 <a:latin typeface="Arial" charset="0"/>
               </a:rPr>
-              <a:t>La siguiente acción es verificar en la cola de procesos si existe alguna tarea que pueda ser ejecutada. Si no es así  </a:t>
+              <a:t>Para que una tarea sea removida de la cola de procesos, el planificador llama a la función </a:t>
             </a:r>
             <a:r>
               <a:rPr lang="x-none" altLang="es-MX" sz="3200" b="0" i="1" strike="noStrike" spc="-1">
@@ -9154,7 +9323,7 @@
                 </a:uFill>
                 <a:latin typeface="Arial" charset="0"/>
               </a:rPr>
-              <a:t>idle_balance() </a:t>
+              <a:t>deactivate_task() </a:t>
             </a:r>
             <a:r>
               <a:rPr lang="x-none" altLang="es-MX" sz="3200" b="0" strike="noStrike" spc="-1">
@@ -9168,9 +9337,23 @@
                 </a:uFill>
                 <a:latin typeface="Arial" charset="0"/>
               </a:rPr>
-              <a:t> es llamada para buscar una tarea ejecutable en la cola de otro procesador.</a:t>
-            </a:r>
-            <a:endParaRPr lang="x-none" altLang="es-MX" sz="3200" b="0" strike="noStrike" spc="-1">
+              <a:t> la cual de manera interna llama a </a:t>
+            </a:r>
+            <a:r>
+              <a:rPr lang="x-none" altLang="es-MX" sz="3200" b="0" i="1" strike="noStrike" spc="-1">
+                <a:solidFill>
+                  <a:srgbClr val="000000"/>
+                </a:solidFill>
+                <a:uFill>
+                  <a:solidFill>
+                    <a:srgbClr val="FFFFFF"/>
+                  </a:solidFill>
+                </a:uFill>
+                <a:latin typeface="Arial" charset="0"/>
+              </a:rPr>
+              <a:t>dequeue_task(). </a:t>
+            </a:r>
+            <a:endParaRPr lang="x-none" altLang="es-MX" sz="3200" b="0" i="1" strike="noStrike" spc="-1">
               <a:solidFill>
                 <a:srgbClr val="000000"/>
               </a:solidFill>
@@ -9191,97 +9374,44 @@
               <a:buFont typeface="Wingdings" panose="05000000000000000000" charset="2"/>
               <a:buChar char=""/>
             </a:pPr>
-            <a:endParaRPr lang="x-none" altLang="es-MX" sz="3200" b="0" strike="noStrike" spc="-1">
-              <a:solidFill>
-                <a:srgbClr val="000000"/>
-              </a:solidFill>
-              <a:uFill>
-                <a:solidFill>
-                  <a:srgbClr val="FFFFFF"/>
-                </a:solidFill>
-              </a:uFill>
-              <a:latin typeface="Arial" charset="0"/>
-            </a:endParaRPr>
-          </a:p>
-          <a:p>
-            <a:pPr marL="431800" indent="-323850" algn="just">
-              <a:buClr>
-                <a:srgbClr val="000000"/>
-              </a:buClr>
-              <a:buSzPct val="45000"/>
-              <a:buFont typeface="Wingdings" panose="05000000000000000000" charset="2"/>
-              <a:buChar char=""/>
-            </a:pPr>
-            <a:r>
-              <a:rPr lang="x-none" altLang="es-MX" sz="3200" b="0" i="1" strike="noStrike" spc="-1">
-                <a:solidFill>
-                  <a:srgbClr val="000000"/>
-                </a:solidFill>
-                <a:uFill>
-                  <a:solidFill>
-                    <a:srgbClr val="FFFFFF"/>
-                  </a:solidFill>
-                </a:uFill>
-                <a:latin typeface="Arial" charset="0"/>
-              </a:rPr>
-              <a:t>put_prev_task() </a:t>
-            </a:r>
-            <a:r>
-              <a:rPr lang="x-none" altLang="es-MX" sz="3200" b="0" strike="noStrike" spc="-1">
-                <a:solidFill>
-                  <a:srgbClr val="000000"/>
-                </a:solidFill>
-                <a:uFill>
-                  <a:solidFill>
-                    <a:srgbClr val="FFFFFF"/>
-                  </a:solidFill>
-                </a:uFill>
-                <a:latin typeface="Arial" charset="0"/>
-              </a:rPr>
-              <a:t>es una </a:t>
-            </a:r>
-            <a:r>
-              <a:rPr lang="x-none" altLang="es-MX" sz="3200" b="0" i="1" strike="noStrike" spc="-1">
-                <a:solidFill>
-                  <a:srgbClr val="000000"/>
-                </a:solidFill>
-                <a:uFill>
-                  <a:solidFill>
-                    <a:srgbClr val="FFFFFF"/>
-                  </a:solidFill>
-                </a:uFill>
-                <a:latin typeface="Arial" charset="0"/>
-              </a:rPr>
-              <a:t>clase de planificador </a:t>
-            </a:r>
-            <a:r>
-              <a:rPr lang="x-none" altLang="es-MX" sz="3200" b="0" strike="noStrike" spc="-1">
-                <a:solidFill>
-                  <a:srgbClr val="000000"/>
-                </a:solidFill>
-                <a:uFill>
-                  <a:solidFill>
-                    <a:srgbClr val="FFFFFF"/>
-                  </a:solidFill>
-                </a:uFill>
-                <a:latin typeface="Arial" charset="0"/>
-              </a:rPr>
-              <a:t>que informa sobre una tarea que va a ser cambiada de procesador.</a:t>
-            </a:r>
-            <a:endParaRPr lang="x-none" altLang="es-MX" sz="3200" b="0" strike="noStrike" spc="-1">
-              <a:solidFill>
-                <a:srgbClr val="000000"/>
-              </a:solidFill>
-              <a:uFill>
-                <a:solidFill>
-                  <a:srgbClr val="FFFFFF"/>
-                </a:solidFill>
-              </a:uFill>
-              <a:latin typeface="Arial" charset="0"/>
-            </a:endParaRPr>
-          </a:p>
-        </p:txBody>
-      </p:sp>
+            <a:endParaRPr lang="x-none" altLang="es-MX" sz="3200" b="0" i="1" strike="noStrike" spc="-1">
+              <a:solidFill>
+                <a:srgbClr val="000000"/>
+              </a:solidFill>
+              <a:uFill>
+                <a:solidFill>
+                  <a:srgbClr val="FFFFFF"/>
+                </a:solidFill>
+              </a:uFill>
+              <a:latin typeface="Arial" charset="0"/>
+            </a:endParaRPr>
+          </a:p>
+        </p:txBody>
+      </p:sp>
+      <p:pic>
+        <p:nvPicPr>
+          <p:cNvPr id="3" name="Picture 2"/>
+          <p:cNvPicPr>
+            <a:picLocks noChangeAspect="1"/>
+          </p:cNvPicPr>
+          <p:nvPr/>
+        </p:nvPicPr>
+        <p:blipFill>
+          <a:blip r:embed="rId1"/>
+          <a:stretch>
+            <a:fillRect/>
+          </a:stretch>
+        </p:blipFill>
+        <p:spPr>
+          <a:xfrm>
+            <a:off x="-10160" y="3922395"/>
+            <a:ext cx="10074275" cy="1836420"/>
+          </a:xfrm>
+          <a:prstGeom prst="rect">
+            <a:avLst/>
+          </a:prstGeom>
+        </p:spPr>
+      </p:pic>
     </p:spTree>
   </p:cSld>
   <p:clrMapOvr>
@@ -9413,7 +9543,7 @@
                 </a:uFill>
                 <a:latin typeface="Arial" charset="0"/>
               </a:rPr>
-              <a:t>Entonces la clase correspondiente llama a la función  </a:t>
+              <a:t>La siguiente acción es verificar en la cola de procesos si existe alguna tarea que pueda ser ejecutada. Si no es así  </a:t>
             </a:r>
             <a:r>
               <a:rPr lang="x-none" altLang="es-MX" sz="3200" b="0" i="1" strike="noStrike" spc="-1">
@@ -9427,7 +9557,7 @@
                 </a:uFill>
                 <a:latin typeface="Arial" charset="0"/>
               </a:rPr>
-              <a:t>pick_next_task(), </a:t>
+              <a:t>idle_balance() </a:t>
             </a:r>
             <a:r>
               <a:rPr lang="x-none" altLang="es-MX" sz="3200" b="0" strike="noStrike" spc="-1">
@@ -9441,35 +9571,7 @@
                 </a:uFill>
                 <a:latin typeface="Arial" charset="0"/>
               </a:rPr>
-              <a:t>seguido por la limpieza de la bandera </a:t>
-            </a:r>
-            <a:r>
-              <a:rPr lang="x-none" altLang="es-MX" sz="3200" b="0" i="1" strike="noStrike" spc="-1">
-                <a:solidFill>
-                  <a:srgbClr val="000000"/>
-                </a:solidFill>
-                <a:uFill>
-                  <a:solidFill>
-                    <a:srgbClr val="FFFFFF"/>
-                  </a:solidFill>
-                </a:uFill>
-                <a:latin typeface="Arial" charset="0"/>
-              </a:rPr>
-              <a:t>need_resched </a:t>
-            </a:r>
-            <a:r>
-              <a:rPr lang="x-none" altLang="es-MX" sz="3200" b="0" strike="noStrike" spc="-1">
-                <a:solidFill>
-                  <a:srgbClr val="000000"/>
-                </a:solidFill>
-                <a:uFill>
-                  <a:solidFill>
-                    <a:srgbClr val="FFFFFF"/>
-                  </a:solidFill>
-                </a:uFill>
-                <a:latin typeface="Arial" charset="0"/>
-              </a:rPr>
-              <a:t>la cual debió haber sido llamada antes para invocar al planificador.</a:t>
+              <a:t> es llamada para buscar una tarea ejecutable en la cola de otro procesador.</a:t>
             </a:r>
             <a:endParaRPr lang="x-none" altLang="es-MX" sz="3200" b="0" strike="noStrike" spc="-1">
               <a:solidFill>
@@ -9525,7 +9627,7 @@
                 </a:uFill>
                 <a:latin typeface="Arial" charset="0"/>
               </a:rPr>
-              <a:t>need_resched </a:t>
+              <a:t>put_prev_task() </a:t>
             </a:r>
             <a:r>
               <a:rPr lang="x-none" altLang="es-MX" sz="3200" b="0" strike="noStrike" spc="-1">
@@ -9539,7 +9641,7 @@
                 </a:uFill>
                 <a:latin typeface="Arial" charset="0"/>
               </a:rPr>
-              <a:t> es una forma de decir al kernel que una tarea necesita se ejecutada y el planificador [</a:t>
+              <a:t>es una </a:t>
             </a:r>
             <a:r>
               <a:rPr lang="x-none" altLang="es-MX" sz="3200" b="0" i="1" strike="noStrike" spc="-1">
@@ -9553,7 +9655,7 @@
                 </a:uFill>
                 <a:latin typeface="Arial" charset="0"/>
               </a:rPr>
-              <a:t>schedule()] </a:t>
+              <a:t>clase de planificador </a:t>
             </a:r>
             <a:r>
               <a:rPr lang="x-none" altLang="es-MX" sz="3200" b="0" strike="noStrike" spc="-1">
@@ -9567,7 +9669,7 @@
                 </a:uFill>
                 <a:latin typeface="Arial" charset="0"/>
               </a:rPr>
-              <a:t> debe ser ejecutado lo antes posible.</a:t>
+              <a:t>que informa sobre una tarea que va a ser cambiada de procesador.</a:t>
             </a:r>
             <a:endParaRPr lang="x-none" altLang="es-MX" sz="3200" b="0" strike="noStrike" spc="-1">
               <a:solidFill>
@@ -9580,49 +9682,6 @@
               </a:uFill>
               <a:latin typeface="Arial" charset="0"/>
             </a:endParaRPr>
-          </a:p>
-        </p:txBody>
-      </p:sp>
-      <p:sp>
-        <p:nvSpPr>
-          <p:cNvPr id="2" name="Oval 1"/>
-          <p:cNvSpPr/>
-          <p:nvPr/>
-        </p:nvSpPr>
-        <p:spPr>
-          <a:xfrm>
-            <a:off x="8109585" y="249555"/>
-            <a:ext cx="1229995" cy="1109980"/>
-          </a:xfrm>
-          <a:prstGeom prst="ellipse">
-            <a:avLst/>
-          </a:prstGeom>
-        </p:spPr>
-        <p:style>
-          <a:lnRef idx="2">
-            <a:schemeClr val="accent2">
-              <a:shade val="50000"/>
-            </a:schemeClr>
-          </a:lnRef>
-          <a:fillRef idx="1">
-            <a:schemeClr val="accent2"/>
-          </a:fillRef>
-          <a:effectRef idx="0">
-            <a:schemeClr val="accent2"/>
-          </a:effectRef>
-          <a:fontRef idx="minor">
-            <a:schemeClr val="lt1"/>
-          </a:fontRef>
-        </p:style>
-        <p:txBody>
-          <a:bodyPr rtlCol="0" anchor="ctr"/>
-          <a:p>
-            <a:pPr algn="ctr"/>
-            <a:r>
-              <a:rPr lang="x-none" altLang="en-US"/>
-              <a:t>Pag 8</a:t>
-            </a:r>
-            <a:endParaRPr lang="x-none" altLang="en-US"/>
           </a:p>
         </p:txBody>
       </p:sp>
@@ -9927,6 +9986,49 @@
           </a:p>
         </p:txBody>
       </p:sp>
+      <p:sp>
+        <p:nvSpPr>
+          <p:cNvPr id="2" name="Oval 1"/>
+          <p:cNvSpPr/>
+          <p:nvPr/>
+        </p:nvSpPr>
+        <p:spPr>
+          <a:xfrm>
+            <a:off x="8109585" y="249555"/>
+            <a:ext cx="1229995" cy="1109980"/>
+          </a:xfrm>
+          <a:prstGeom prst="ellipse">
+            <a:avLst/>
+          </a:prstGeom>
+        </p:spPr>
+        <p:style>
+          <a:lnRef idx="2">
+            <a:schemeClr val="accent2">
+              <a:shade val="50000"/>
+            </a:schemeClr>
+          </a:lnRef>
+          <a:fillRef idx="1">
+            <a:schemeClr val="accent2"/>
+          </a:fillRef>
+          <a:effectRef idx="0">
+            <a:schemeClr val="accent2"/>
+          </a:effectRef>
+          <a:fontRef idx="minor">
+            <a:schemeClr val="lt1"/>
+          </a:fontRef>
+        </p:style>
+        <p:txBody>
+          <a:bodyPr rtlCol="0" anchor="ctr"/>
+          <a:p>
+            <a:pPr algn="ctr"/>
+            <a:r>
+              <a:rPr lang="x-none" altLang="en-US"/>
+              <a:t>Pag 8</a:t>
+            </a:r>
+            <a:endParaRPr lang="x-none" altLang="en-US"/>
+          </a:p>
+        </p:txBody>
+      </p:sp>
     </p:spTree>
   </p:cSld>
   <p:clrMapOvr>
@@ -9954,6 +10056,932 @@
       </p:grpSpPr>
       <p:sp>
         <p:nvSpPr>
+          <p:cNvPr id="133" name="TextShape 1"/>
+          <p:cNvSpPr txBox="1"/>
+          <p:nvPr/>
+        </p:nvSpPr>
+        <p:spPr>
+          <a:xfrm>
+            <a:off x="457200" y="182880"/>
+            <a:ext cx="8568000" cy="1440000"/>
+          </a:xfrm>
+          <a:prstGeom prst="rect">
+            <a:avLst/>
+          </a:prstGeom>
+          <a:noFill/>
+          <a:ln>
+            <a:noFill/>
+          </a:ln>
+        </p:spPr>
+        <p:txBody>
+          <a:bodyPr lIns="0" tIns="0" rIns="0" bIns="0" anchor="ctr"/>
+          <a:p>
+            <a:r>
+              <a:rPr lang="x-none" altLang="es-MX" sz="4000" b="0" strike="noStrike" spc="-1">
+                <a:solidFill>
+                  <a:srgbClr val="FFFFFF"/>
+                </a:solidFill>
+                <a:uFill>
+                  <a:solidFill>
+                    <a:srgbClr val="FFFFFF"/>
+                  </a:solidFill>
+                </a:uFill>
+                <a:latin typeface="Arial" charset="0"/>
+              </a:rPr>
+              <a:t>4 El esqueleto del planificador </a:t>
+            </a:r>
+            <a:r>
+              <a:rPr lang="es-MX" sz="4000" b="0" strike="noStrike" spc="-1">
+                <a:solidFill>
+                  <a:srgbClr val="FFFFFF"/>
+                </a:solidFill>
+                <a:uFill>
+                  <a:solidFill>
+                    <a:srgbClr val="FFFFFF"/>
+                  </a:solidFill>
+                </a:uFill>
+                <a:latin typeface="Arial" charset="0"/>
+              </a:rPr>
+              <a:t> </a:t>
+            </a:r>
+            <a:endParaRPr lang="es-MX" sz="4000" b="0" strike="noStrike" spc="-1">
+              <a:solidFill>
+                <a:srgbClr val="000000"/>
+              </a:solidFill>
+              <a:uFill>
+                <a:solidFill>
+                  <a:srgbClr val="FFFFFF"/>
+                </a:solidFill>
+              </a:uFill>
+              <a:latin typeface="Arial" charset="0"/>
+            </a:endParaRPr>
+          </a:p>
+        </p:txBody>
+      </p:sp>
+      <p:sp>
+        <p:nvSpPr>
+          <p:cNvPr id="134" name="TextShape 2"/>
+          <p:cNvSpPr txBox="1"/>
+          <p:nvPr/>
+        </p:nvSpPr>
+        <p:spPr>
+          <a:xfrm>
+            <a:off x="436885" y="1807250"/>
+            <a:ext cx="9072000" cy="4384440"/>
+          </a:xfrm>
+          <a:prstGeom prst="rect">
+            <a:avLst/>
+          </a:prstGeom>
+          <a:noFill/>
+          <a:ln>
+            <a:noFill/>
+          </a:ln>
+        </p:spPr>
+        <p:txBody>
+          <a:bodyPr lIns="0" tIns="0" rIns="0" bIns="0"/>
+          <a:p>
+            <a:pPr marL="431800" indent="-323850" algn="just">
+              <a:buClr>
+                <a:srgbClr val="000000"/>
+              </a:buClr>
+              <a:buSzPct val="45000"/>
+              <a:buFont typeface="Wingdings" panose="05000000000000000000" charset="2"/>
+              <a:buChar char=""/>
+            </a:pPr>
+            <a:r>
+              <a:rPr lang="x-none" altLang="es-MX" sz="3200" b="0" i="1" strike="noStrike" spc="-1">
+                <a:solidFill>
+                  <a:srgbClr val="000000"/>
+                </a:solidFill>
+                <a:uFill>
+                  <a:solidFill>
+                    <a:srgbClr val="FFFFFF"/>
+                  </a:solidFill>
+                </a:uFill>
+                <a:latin typeface="Arial" charset="0"/>
+              </a:rPr>
+              <a:t>pick_next_task() </a:t>
+            </a:r>
+            <a:r>
+              <a:rPr lang="x-none" altLang="es-MX" sz="3200" b="0" strike="noStrike" spc="-1">
+                <a:solidFill>
+                  <a:srgbClr val="000000"/>
+                </a:solidFill>
+                <a:uFill>
+                  <a:solidFill>
+                    <a:srgbClr val="FFFFFF"/>
+                  </a:solidFill>
+                </a:uFill>
+                <a:latin typeface="Arial" charset="0"/>
+              </a:rPr>
+              <a:t>es también implementada en </a:t>
+            </a:r>
+            <a:r>
+              <a:rPr lang="x-none" altLang="es-MX" sz="3200" b="0" i="1" strike="noStrike" spc="-1">
+                <a:solidFill>
+                  <a:srgbClr val="000000"/>
+                </a:solidFill>
+                <a:uFill>
+                  <a:solidFill>
+                    <a:srgbClr val="FFFFFF"/>
+                  </a:solidFill>
+                </a:uFill>
+                <a:latin typeface="Arial" charset="0"/>
+              </a:rPr>
+              <a:t>sched.c , </a:t>
+            </a:r>
+            <a:r>
+              <a:rPr lang="x-none" altLang="es-MX" sz="3200" b="0" strike="noStrike" spc="-1">
+                <a:solidFill>
+                  <a:srgbClr val="000000"/>
+                </a:solidFill>
+                <a:uFill>
+                  <a:solidFill>
+                    <a:srgbClr val="FFFFFF"/>
+                  </a:solidFill>
+                </a:uFill>
+                <a:latin typeface="Arial" charset="0"/>
+              </a:rPr>
+              <a:t>ésta itera a través de nuestra lista de clases de planeación para encontrar a la clase con la prioridad más alta que tenga una tarea ejecutable. Si la ultima tarea en ejecución fue la que se eligió como siguiente, entonces no se realiza un cambio de contexto, simplemente sigue ejecutando, si es una tarea nueva el cambio de contexto ocurre llamando a </a:t>
+            </a:r>
+            <a:r>
+              <a:rPr lang="x-none" altLang="es-MX" sz="3200" b="0" i="1" strike="noStrike" spc="-1">
+                <a:solidFill>
+                  <a:srgbClr val="000000"/>
+                </a:solidFill>
+                <a:uFill>
+                  <a:solidFill>
+                    <a:srgbClr val="FFFFFF"/>
+                  </a:solidFill>
+                </a:uFill>
+                <a:latin typeface="Arial" charset="0"/>
+              </a:rPr>
+              <a:t> context_switch().</a:t>
+            </a:r>
+            <a:endParaRPr lang="x-none" altLang="es-MX" sz="3200" b="0" i="1" strike="noStrike" spc="-1">
+              <a:solidFill>
+                <a:srgbClr val="000000"/>
+              </a:solidFill>
+              <a:uFill>
+                <a:solidFill>
+                  <a:srgbClr val="FFFFFF"/>
+                </a:solidFill>
+              </a:uFill>
+              <a:latin typeface="Arial" charset="0"/>
+            </a:endParaRPr>
+          </a:p>
+        </p:txBody>
+      </p:sp>
+      <p:sp>
+        <p:nvSpPr>
+          <p:cNvPr id="2" name="Oval 1"/>
+          <p:cNvSpPr/>
+          <p:nvPr/>
+        </p:nvSpPr>
+        <p:spPr>
+          <a:xfrm>
+            <a:off x="8109585" y="249555"/>
+            <a:ext cx="1229995" cy="1109980"/>
+          </a:xfrm>
+          <a:prstGeom prst="ellipse">
+            <a:avLst/>
+          </a:prstGeom>
+        </p:spPr>
+        <p:style>
+          <a:lnRef idx="2">
+            <a:schemeClr val="accent2">
+              <a:shade val="50000"/>
+            </a:schemeClr>
+          </a:lnRef>
+          <a:fillRef idx="1">
+            <a:schemeClr val="accent2"/>
+          </a:fillRef>
+          <a:effectRef idx="0">
+            <a:schemeClr val="accent2"/>
+          </a:effectRef>
+          <a:fontRef idx="minor">
+            <a:schemeClr val="lt1"/>
+          </a:fontRef>
+        </p:style>
+        <p:txBody>
+          <a:bodyPr rtlCol="0" anchor="ctr"/>
+          <a:p>
+            <a:pPr algn="ctr"/>
+            <a:r>
+              <a:rPr lang="x-none" altLang="en-US"/>
+              <a:t>Pag 8</a:t>
+            </a:r>
+            <a:endParaRPr lang="x-none" altLang="en-US"/>
+          </a:p>
+        </p:txBody>
+      </p:sp>
+    </p:spTree>
+  </p:cSld>
+  <p:clrMapOvr>
+    <a:masterClrMapping/>
+  </p:clrMapOvr>
+</p:sld>
+</file>
+
+<file path=ppt/slides/slide24.xml><?xml version="1.0" encoding="utf-8"?>
+<p:sld xmlns:a="http://schemas.openxmlformats.org/drawingml/2006/main" xmlns:r="http://schemas.openxmlformats.org/officeDocument/2006/relationships" xmlns:p="http://schemas.openxmlformats.org/presentationml/2006/main">
+  <p:cSld>
+    <p:spTree>
+      <p:nvGrpSpPr>
+        <p:cNvPr id="1" name=""/>
+        <p:cNvGrpSpPr/>
+        <p:nvPr/>
+      </p:nvGrpSpPr>
+      <p:grpSpPr>
+        <a:xfrm>
+          <a:off x="0" y="0"/>
+          <a:ext cx="0" cy="0"/>
+          <a:chOff x="0" y="0"/>
+          <a:chExt cx="0" cy="0"/>
+        </a:xfrm>
+      </p:grpSpPr>
+      <p:sp>
+        <p:nvSpPr>
+          <p:cNvPr id="133" name="TextShape 1"/>
+          <p:cNvSpPr txBox="1"/>
+          <p:nvPr/>
+        </p:nvSpPr>
+        <p:spPr>
+          <a:xfrm>
+            <a:off x="457200" y="182880"/>
+            <a:ext cx="8568000" cy="1440000"/>
+          </a:xfrm>
+          <a:prstGeom prst="rect">
+            <a:avLst/>
+          </a:prstGeom>
+          <a:noFill/>
+          <a:ln>
+            <a:noFill/>
+          </a:ln>
+        </p:spPr>
+        <p:txBody>
+          <a:bodyPr lIns="0" tIns="0" rIns="0" bIns="0" anchor="ctr"/>
+          <a:p>
+            <a:r>
+              <a:rPr lang="x-none" altLang="es-MX" sz="4000" b="0" strike="noStrike" spc="-1">
+                <a:solidFill>
+                  <a:srgbClr val="FFFFFF"/>
+                </a:solidFill>
+                <a:uFill>
+                  <a:solidFill>
+                    <a:srgbClr val="FFFFFF"/>
+                  </a:solidFill>
+                </a:uFill>
+                <a:latin typeface="Arial" charset="0"/>
+              </a:rPr>
+              <a:t>4 El esqueleto del planificador </a:t>
+            </a:r>
+            <a:r>
+              <a:rPr lang="es-MX" sz="4000" b="0" strike="noStrike" spc="-1">
+                <a:solidFill>
+                  <a:srgbClr val="FFFFFF"/>
+                </a:solidFill>
+                <a:uFill>
+                  <a:solidFill>
+                    <a:srgbClr val="FFFFFF"/>
+                  </a:solidFill>
+                </a:uFill>
+                <a:latin typeface="Arial" charset="0"/>
+              </a:rPr>
+              <a:t> </a:t>
+            </a:r>
+            <a:endParaRPr lang="es-MX" sz="4000" b="0" strike="noStrike" spc="-1">
+              <a:solidFill>
+                <a:srgbClr val="000000"/>
+              </a:solidFill>
+              <a:uFill>
+                <a:solidFill>
+                  <a:srgbClr val="FFFFFF"/>
+                </a:solidFill>
+              </a:uFill>
+              <a:latin typeface="Arial" charset="0"/>
+            </a:endParaRPr>
+          </a:p>
+        </p:txBody>
+      </p:sp>
+      <p:sp>
+        <p:nvSpPr>
+          <p:cNvPr id="134" name="TextShape 2"/>
+          <p:cNvSpPr txBox="1"/>
+          <p:nvPr/>
+        </p:nvSpPr>
+        <p:spPr>
+          <a:xfrm>
+            <a:off x="436885" y="1807250"/>
+            <a:ext cx="9072000" cy="4384440"/>
+          </a:xfrm>
+          <a:prstGeom prst="rect">
+            <a:avLst/>
+          </a:prstGeom>
+          <a:noFill/>
+          <a:ln>
+            <a:noFill/>
+          </a:ln>
+        </p:spPr>
+        <p:txBody>
+          <a:bodyPr lIns="0" tIns="0" rIns="0" bIns="0"/>
+          <a:p>
+            <a:pPr marL="107950" indent="0" algn="just">
+              <a:buClr>
+                <a:srgbClr val="000000"/>
+              </a:buClr>
+              <a:buSzPct val="45000"/>
+              <a:buFont typeface="Wingdings" panose="05000000000000000000" charset="2"/>
+              <a:buNone/>
+            </a:pPr>
+            <a:r>
+              <a:rPr lang="x-none" altLang="es-MX" sz="3200" b="0" strike="noStrike" spc="-1">
+                <a:solidFill>
+                  <a:srgbClr val="000000"/>
+                </a:solidFill>
+                <a:uFill>
+                  <a:solidFill>
+                    <a:srgbClr val="FFFFFF"/>
+                  </a:solidFill>
+                </a:uFill>
+                <a:latin typeface="Arial" charset="0"/>
+              </a:rPr>
+              <a:t>Internamente </a:t>
+            </a:r>
+            <a:r>
+              <a:rPr lang="x-none" altLang="es-MX" sz="3200" b="0" i="1" strike="noStrike" spc="-1">
+                <a:solidFill>
+                  <a:srgbClr val="000000"/>
+                </a:solidFill>
+                <a:uFill>
+                  <a:solidFill>
+                    <a:srgbClr val="FFFFFF"/>
+                  </a:solidFill>
+                </a:uFill>
+                <a:latin typeface="Arial" charset="0"/>
+              </a:rPr>
+              <a:t>context_switch() </a:t>
+            </a:r>
+            <a:r>
+              <a:rPr lang="x-none" altLang="es-MX" sz="3200" b="0" strike="noStrike" spc="-1">
+                <a:solidFill>
+                  <a:srgbClr val="000000"/>
+                </a:solidFill>
+                <a:uFill>
+                  <a:solidFill>
+                    <a:srgbClr val="FFFFFF"/>
+                  </a:solidFill>
+                </a:uFill>
+                <a:latin typeface="Arial" charset="0"/>
+              </a:rPr>
+              <a:t> cambia al nuevo mapa de memoria de la nueva tarea y cambia los registros de estados y la pila. Por último la cola de procesos es bloqueada y la expulsión es rehabilitada. En caso de que la expulsión sea llamada durante el tiempo que fue deshabilitada, el planificador la corre de inmediato.</a:t>
+            </a:r>
+            <a:endParaRPr lang="x-none" altLang="es-MX" sz="3200" b="0" strike="noStrike" spc="-1">
+              <a:solidFill>
+                <a:srgbClr val="000000"/>
+              </a:solidFill>
+              <a:uFill>
+                <a:solidFill>
+                  <a:srgbClr val="FFFFFF"/>
+                </a:solidFill>
+              </a:uFill>
+              <a:latin typeface="Arial" charset="0"/>
+            </a:endParaRPr>
+          </a:p>
+        </p:txBody>
+      </p:sp>
+      <p:sp>
+        <p:nvSpPr>
+          <p:cNvPr id="2" name="Oval 1"/>
+          <p:cNvSpPr/>
+          <p:nvPr/>
+        </p:nvSpPr>
+        <p:spPr>
+          <a:xfrm>
+            <a:off x="8109585" y="249555"/>
+            <a:ext cx="1229995" cy="1109980"/>
+          </a:xfrm>
+          <a:prstGeom prst="ellipse">
+            <a:avLst/>
+          </a:prstGeom>
+        </p:spPr>
+        <p:style>
+          <a:lnRef idx="2">
+            <a:schemeClr val="accent2">
+              <a:shade val="50000"/>
+            </a:schemeClr>
+          </a:lnRef>
+          <a:fillRef idx="1">
+            <a:schemeClr val="accent2"/>
+          </a:fillRef>
+          <a:effectRef idx="0">
+            <a:schemeClr val="accent2"/>
+          </a:effectRef>
+          <a:fontRef idx="minor">
+            <a:schemeClr val="lt1"/>
+          </a:fontRef>
+        </p:style>
+        <p:txBody>
+          <a:bodyPr rtlCol="0" anchor="ctr"/>
+          <a:p>
+            <a:pPr algn="ctr"/>
+            <a:r>
+              <a:rPr lang="x-none" altLang="en-US"/>
+              <a:t>Pag 8</a:t>
+            </a:r>
+            <a:endParaRPr lang="x-none" altLang="en-US"/>
+          </a:p>
+        </p:txBody>
+      </p:sp>
+    </p:spTree>
+  </p:cSld>
+  <p:clrMapOvr>
+    <a:masterClrMapping/>
+  </p:clrMapOvr>
+</p:sld>
+</file>
+
+<file path=ppt/slides/slide25.xml><?xml version="1.0" encoding="utf-8"?>
+<p:sld xmlns:a="http://schemas.openxmlformats.org/drawingml/2006/main" xmlns:r="http://schemas.openxmlformats.org/officeDocument/2006/relationships" xmlns:p="http://schemas.openxmlformats.org/presentationml/2006/main">
+  <p:cSld>
+    <p:spTree>
+      <p:nvGrpSpPr>
+        <p:cNvPr id="1" name=""/>
+        <p:cNvGrpSpPr/>
+        <p:nvPr/>
+      </p:nvGrpSpPr>
+      <p:grpSpPr>
+        <a:xfrm>
+          <a:off x="0" y="0"/>
+          <a:ext cx="0" cy="0"/>
+          <a:chOff x="0" y="0"/>
+          <a:chExt cx="0" cy="0"/>
+        </a:xfrm>
+      </p:grpSpPr>
+      <p:sp>
+        <p:nvSpPr>
+          <p:cNvPr id="133" name="TextShape 1"/>
+          <p:cNvSpPr txBox="1"/>
+          <p:nvPr/>
+        </p:nvSpPr>
+        <p:spPr>
+          <a:xfrm>
+            <a:off x="457200" y="182880"/>
+            <a:ext cx="8568000" cy="1440000"/>
+          </a:xfrm>
+          <a:prstGeom prst="rect">
+            <a:avLst/>
+          </a:prstGeom>
+          <a:noFill/>
+          <a:ln>
+            <a:noFill/>
+          </a:ln>
+        </p:spPr>
+        <p:txBody>
+          <a:bodyPr lIns="0" tIns="0" rIns="0" bIns="0" anchor="ctr"/>
+          <a:p>
+            <a:r>
+              <a:rPr lang="x-none" altLang="es-MX" sz="4000" b="0" strike="noStrike" spc="-1">
+                <a:solidFill>
+                  <a:srgbClr val="FFFFFF"/>
+                </a:solidFill>
+                <a:uFill>
+                  <a:solidFill>
+                    <a:srgbClr val="FFFFFF"/>
+                  </a:solidFill>
+                </a:uFill>
+                <a:latin typeface="Arial" charset="0"/>
+              </a:rPr>
+              <a:t>5 Completely fair scheduler </a:t>
+            </a:r>
+            <a:r>
+              <a:rPr lang="es-MX" sz="4000" b="0" strike="noStrike" spc="-1">
+                <a:solidFill>
+                  <a:srgbClr val="FFFFFF"/>
+                </a:solidFill>
+                <a:uFill>
+                  <a:solidFill>
+                    <a:srgbClr val="FFFFFF"/>
+                  </a:solidFill>
+                </a:uFill>
+                <a:latin typeface="Arial" charset="0"/>
+              </a:rPr>
+              <a:t> </a:t>
+            </a:r>
+            <a:endParaRPr lang="es-MX" sz="4000" b="0" strike="noStrike" spc="-1">
+              <a:solidFill>
+                <a:srgbClr val="000000"/>
+              </a:solidFill>
+              <a:uFill>
+                <a:solidFill>
+                  <a:srgbClr val="FFFFFF"/>
+                </a:solidFill>
+              </a:uFill>
+              <a:latin typeface="Arial" charset="0"/>
+            </a:endParaRPr>
+          </a:p>
+        </p:txBody>
+      </p:sp>
+      <p:sp>
+        <p:nvSpPr>
+          <p:cNvPr id="134" name="TextShape 2"/>
+          <p:cNvSpPr txBox="1"/>
+          <p:nvPr/>
+        </p:nvSpPr>
+        <p:spPr>
+          <a:xfrm>
+            <a:off x="95885" y="1853565"/>
+            <a:ext cx="9499600" cy="4384675"/>
+          </a:xfrm>
+          <a:prstGeom prst="rect">
+            <a:avLst/>
+          </a:prstGeom>
+          <a:noFill/>
+          <a:ln>
+            <a:noFill/>
+          </a:ln>
+        </p:spPr>
+        <p:txBody>
+          <a:bodyPr lIns="0" tIns="0" rIns="0" bIns="0"/>
+          <a:p>
+            <a:pPr marL="107950" indent="0" algn="just">
+              <a:buClr>
+                <a:srgbClr val="000000"/>
+              </a:buClr>
+              <a:buSzPct val="45000"/>
+              <a:buFont typeface="Wingdings" panose="05000000000000000000" charset="2"/>
+              <a:buNone/>
+            </a:pPr>
+            <a:r>
+              <a:rPr lang="x-none" altLang="es-MX" sz="3200" b="0" strike="noStrike" spc="-1">
+                <a:solidFill>
+                  <a:srgbClr val="000000"/>
+                </a:solidFill>
+                <a:uFill>
+                  <a:solidFill>
+                    <a:srgbClr val="FFFFFF"/>
+                  </a:solidFill>
+                </a:uFill>
+                <a:latin typeface="Arial" charset="0"/>
+              </a:rPr>
+              <a:t>CFS - Ingo Molnar </a:t>
+            </a:r>
+            <a:endParaRPr lang="x-none" altLang="es-MX" sz="3200" b="0" strike="noStrike" spc="-1">
+              <a:solidFill>
+                <a:srgbClr val="000000"/>
+              </a:solidFill>
+              <a:uFill>
+                <a:solidFill>
+                  <a:srgbClr val="FFFFFF"/>
+                </a:solidFill>
+              </a:uFill>
+              <a:latin typeface="Arial" charset="0"/>
+            </a:endParaRPr>
+          </a:p>
+          <a:p>
+            <a:pPr marL="107950" indent="0" algn="just">
+              <a:buClr>
+                <a:srgbClr val="000000"/>
+              </a:buClr>
+              <a:buSzPct val="45000"/>
+              <a:buFont typeface="Wingdings" panose="05000000000000000000" charset="2"/>
+              <a:buNone/>
+            </a:pPr>
+            <a:r>
+              <a:rPr lang="x-none" altLang="es-MX" sz="3200" b="0" strike="noStrike" spc="-1">
+                <a:solidFill>
+                  <a:srgbClr val="000000"/>
+                </a:solidFill>
+                <a:uFill>
+                  <a:solidFill>
+                    <a:srgbClr val="FFFFFF"/>
+                  </a:solidFill>
+                </a:uFill>
+                <a:latin typeface="Arial" charset="0"/>
+              </a:rPr>
+              <a:t>Rotating staircase deadline scheduler - Con kolivas</a:t>
+            </a:r>
+            <a:endParaRPr lang="x-none" altLang="es-MX" sz="3200" b="0" strike="noStrike" spc="-1">
+              <a:solidFill>
+                <a:srgbClr val="000000"/>
+              </a:solidFill>
+              <a:uFill>
+                <a:solidFill>
+                  <a:srgbClr val="FFFFFF"/>
+                </a:solidFill>
+              </a:uFill>
+              <a:latin typeface="Arial" charset="0"/>
+            </a:endParaRPr>
+          </a:p>
+          <a:p>
+            <a:pPr marL="107950" indent="0" algn="just">
+              <a:buClr>
+                <a:srgbClr val="000000"/>
+              </a:buClr>
+              <a:buSzPct val="45000"/>
+              <a:buFont typeface="Wingdings" panose="05000000000000000000" charset="2"/>
+              <a:buNone/>
+            </a:pPr>
+            <a:endParaRPr lang="x-none" altLang="es-MX" sz="3200" b="0" strike="noStrike" spc="-1">
+              <a:solidFill>
+                <a:srgbClr val="000000"/>
+              </a:solidFill>
+              <a:uFill>
+                <a:solidFill>
+                  <a:srgbClr val="FFFFFF"/>
+                </a:solidFill>
+              </a:uFill>
+              <a:latin typeface="Arial" charset="0"/>
+            </a:endParaRPr>
+          </a:p>
+          <a:p>
+            <a:pPr marL="107950" indent="0" algn="just">
+              <a:buClr>
+                <a:srgbClr val="000000"/>
+              </a:buClr>
+              <a:buSzPct val="45000"/>
+              <a:buFont typeface="Wingdings" panose="05000000000000000000" charset="2"/>
+              <a:buNone/>
+            </a:pPr>
+            <a:r>
+              <a:rPr lang="x-none" altLang="es-MX" sz="3200" b="0" strike="noStrike" spc="-1">
+                <a:solidFill>
+                  <a:srgbClr val="000000"/>
+                </a:solidFill>
+                <a:uFill>
+                  <a:solidFill>
+                    <a:srgbClr val="FFFFFF"/>
+                  </a:solidFill>
+                </a:uFill>
+                <a:latin typeface="Arial" charset="0"/>
+              </a:rPr>
+              <a:t>La implementación de CFS está en </a:t>
+            </a:r>
+            <a:r>
+              <a:rPr lang="x-none" altLang="es-MX" sz="3200" b="0" i="1" strike="noStrike" spc="-1">
+                <a:solidFill>
+                  <a:srgbClr val="000000"/>
+                </a:solidFill>
+                <a:uFill>
+                  <a:solidFill>
+                    <a:srgbClr val="FFFFFF"/>
+                  </a:solidFill>
+                </a:uFill>
+                <a:latin typeface="Arial" charset="0"/>
+              </a:rPr>
+              <a:t>sched_fair.c</a:t>
+            </a:r>
+            <a:endParaRPr lang="x-none" altLang="es-MX" sz="3200" b="0" i="1" strike="noStrike" spc="-1">
+              <a:solidFill>
+                <a:srgbClr val="000000"/>
+              </a:solidFill>
+              <a:uFill>
+                <a:solidFill>
+                  <a:srgbClr val="FFFFFF"/>
+                </a:solidFill>
+              </a:uFill>
+              <a:latin typeface="Arial" charset="0"/>
+            </a:endParaRPr>
+          </a:p>
+          <a:p>
+            <a:pPr marL="107950" indent="0" algn="just">
+              <a:buClr>
+                <a:srgbClr val="000000"/>
+              </a:buClr>
+              <a:buSzPct val="45000"/>
+              <a:buFont typeface="Wingdings" panose="05000000000000000000" charset="2"/>
+              <a:buNone/>
+            </a:pPr>
+            <a:r>
+              <a:rPr lang="x-none" altLang="es-MX" sz="3200" b="0" strike="noStrike" spc="-1">
+                <a:solidFill>
+                  <a:srgbClr val="000000"/>
+                </a:solidFill>
+                <a:uFill>
+                  <a:solidFill>
+                    <a:srgbClr val="FFFFFF"/>
+                  </a:solidFill>
+                </a:uFill>
+                <a:latin typeface="Arial" charset="0"/>
+              </a:rPr>
+              <a:t>El algoritmo de CFS está basado en un procesador multitarea ideal. Tal que el procesador pueda correr todas las tareas activas literalmente al mismo tiempo, mientras cada tarea tiene una porción de tiempo en el procesador.</a:t>
+            </a:r>
+            <a:endParaRPr lang="x-none" altLang="es-MX" sz="3200" b="0" strike="noStrike" spc="-1">
+              <a:solidFill>
+                <a:srgbClr val="000000"/>
+              </a:solidFill>
+              <a:uFill>
+                <a:solidFill>
+                  <a:srgbClr val="FFFFFF"/>
+                </a:solidFill>
+              </a:uFill>
+              <a:latin typeface="Arial" charset="0"/>
+            </a:endParaRPr>
+          </a:p>
+        </p:txBody>
+      </p:sp>
+    </p:spTree>
+  </p:cSld>
+  <p:clrMapOvr>
+    <a:masterClrMapping/>
+  </p:clrMapOvr>
+</p:sld>
+</file>
+
+<file path=ppt/slides/slide26.xml><?xml version="1.0" encoding="utf-8"?>
+<p:sld xmlns:a="http://schemas.openxmlformats.org/drawingml/2006/main" xmlns:r="http://schemas.openxmlformats.org/officeDocument/2006/relationships" xmlns:p="http://schemas.openxmlformats.org/presentationml/2006/main">
+  <p:cSld>
+    <p:spTree>
+      <p:nvGrpSpPr>
+        <p:cNvPr id="1" name=""/>
+        <p:cNvGrpSpPr/>
+        <p:nvPr/>
+      </p:nvGrpSpPr>
+      <p:grpSpPr>
+        <a:xfrm>
+          <a:off x="0" y="0"/>
+          <a:ext cx="0" cy="0"/>
+          <a:chOff x="0" y="0"/>
+          <a:chExt cx="0" cy="0"/>
+        </a:xfrm>
+      </p:grpSpPr>
+      <p:sp>
+        <p:nvSpPr>
+          <p:cNvPr id="133" name="TextShape 1"/>
+          <p:cNvSpPr txBox="1"/>
+          <p:nvPr/>
+        </p:nvSpPr>
+        <p:spPr>
+          <a:xfrm>
+            <a:off x="457200" y="182880"/>
+            <a:ext cx="8568000" cy="1440000"/>
+          </a:xfrm>
+          <a:prstGeom prst="rect">
+            <a:avLst/>
+          </a:prstGeom>
+          <a:noFill/>
+          <a:ln>
+            <a:noFill/>
+          </a:ln>
+        </p:spPr>
+        <p:txBody>
+          <a:bodyPr lIns="0" tIns="0" rIns="0" bIns="0" anchor="ctr"/>
+          <a:p>
+            <a:r>
+              <a:rPr lang="x-none" altLang="es-MX" sz="4000" b="0" strike="noStrike" spc="-1">
+                <a:solidFill>
+                  <a:srgbClr val="FFFFFF"/>
+                </a:solidFill>
+                <a:uFill>
+                  <a:solidFill>
+                    <a:srgbClr val="FFFFFF"/>
+                  </a:solidFill>
+                </a:uFill>
+                <a:latin typeface="Arial" charset="0"/>
+              </a:rPr>
+              <a:t>5 Completely fair scheduler </a:t>
+            </a:r>
+            <a:r>
+              <a:rPr lang="es-MX" sz="4000" b="0" strike="noStrike" spc="-1">
+                <a:solidFill>
+                  <a:srgbClr val="FFFFFF"/>
+                </a:solidFill>
+                <a:uFill>
+                  <a:solidFill>
+                    <a:srgbClr val="FFFFFF"/>
+                  </a:solidFill>
+                </a:uFill>
+                <a:latin typeface="Arial" charset="0"/>
+              </a:rPr>
+              <a:t> </a:t>
+            </a:r>
+            <a:endParaRPr lang="es-MX" sz="4000" b="0" strike="noStrike" spc="-1">
+              <a:solidFill>
+                <a:srgbClr val="000000"/>
+              </a:solidFill>
+              <a:uFill>
+                <a:solidFill>
+                  <a:srgbClr val="FFFFFF"/>
+                </a:solidFill>
+              </a:uFill>
+              <a:latin typeface="Arial" charset="0"/>
+            </a:endParaRPr>
+          </a:p>
+        </p:txBody>
+      </p:sp>
+      <p:sp>
+        <p:nvSpPr>
+          <p:cNvPr id="134" name="TextShape 2"/>
+          <p:cNvSpPr txBox="1"/>
+          <p:nvPr/>
+        </p:nvSpPr>
+        <p:spPr>
+          <a:xfrm>
+            <a:off x="95885" y="1853565"/>
+            <a:ext cx="9499600" cy="4384675"/>
+          </a:xfrm>
+          <a:prstGeom prst="rect">
+            <a:avLst/>
+          </a:prstGeom>
+          <a:noFill/>
+          <a:ln>
+            <a:noFill/>
+          </a:ln>
+        </p:spPr>
+        <p:txBody>
+          <a:bodyPr lIns="0" tIns="0" rIns="0" bIns="0"/>
+          <a:p>
+            <a:pPr marL="107950" indent="0" algn="just">
+              <a:buClr>
+                <a:srgbClr val="000000"/>
+              </a:buClr>
+              <a:buSzPct val="45000"/>
+              <a:buFont typeface="Wingdings" panose="05000000000000000000" charset="2"/>
+              <a:buNone/>
+            </a:pPr>
+            <a:r>
+              <a:rPr lang="x-none" altLang="es-MX" sz="3200" b="0" strike="noStrike" spc="-1">
+                <a:solidFill>
+                  <a:srgbClr val="000000"/>
+                </a:solidFill>
+                <a:uFill>
+                  <a:solidFill>
+                    <a:srgbClr val="FFFFFF"/>
+                  </a:solidFill>
+                </a:uFill>
+                <a:latin typeface="Arial" charset="0"/>
+              </a:rPr>
+              <a:t>Apesar de la imposibilidad de manejar los procesadores de esta manera y que es altamente ineficiente por los cambios de contexto, CFS intenta a este comportamiento lo más posible. CFS guarda la pista del tiempo de ejecución de cada tarea ejecutable, también llamado </a:t>
+            </a:r>
+            <a:r>
+              <a:rPr lang="x-none" altLang="es-MX" sz="3200" b="0" i="1" strike="noStrike" spc="-1">
+                <a:solidFill>
+                  <a:srgbClr val="000000"/>
+                </a:solidFill>
+                <a:uFill>
+                  <a:solidFill>
+                    <a:srgbClr val="FFFFFF"/>
+                  </a:solidFill>
+                </a:uFill>
+                <a:latin typeface="Arial" charset="0"/>
+              </a:rPr>
+              <a:t>virtual runtime </a:t>
+            </a:r>
+            <a:r>
+              <a:rPr lang="x-none" altLang="es-MX" sz="3200" b="0" strike="noStrike" spc="-1">
+                <a:solidFill>
+                  <a:srgbClr val="000000"/>
+                </a:solidFill>
+                <a:uFill>
+                  <a:solidFill>
+                    <a:srgbClr val="FFFFFF"/>
+                  </a:solidFill>
+                </a:uFill>
+                <a:latin typeface="Arial" charset="0"/>
+              </a:rPr>
+              <a:t>e intenta mantener un equilibrio entre todas las tareas ejecutables. </a:t>
+            </a:r>
+            <a:endParaRPr lang="x-none" altLang="es-MX" sz="3200" b="0" strike="noStrike" spc="-1">
+              <a:solidFill>
+                <a:srgbClr val="000000"/>
+              </a:solidFill>
+              <a:uFill>
+                <a:solidFill>
+                  <a:srgbClr val="FFFFFF"/>
+                </a:solidFill>
+              </a:uFill>
+              <a:latin typeface="Arial" charset="0"/>
+            </a:endParaRPr>
+          </a:p>
+        </p:txBody>
+      </p:sp>
+    </p:spTree>
+  </p:cSld>
+  <p:clrMapOvr>
+    <a:masterClrMapping/>
+  </p:clrMapOvr>
+</p:sld>
+</file>
+
+<file path=ppt/slides/slide27.xml><?xml version="1.0" encoding="utf-8"?>
+<p:sld xmlns:a="http://schemas.openxmlformats.org/drawingml/2006/main" xmlns:r="http://schemas.openxmlformats.org/officeDocument/2006/relationships" xmlns:p="http://schemas.openxmlformats.org/presentationml/2006/main">
+  <p:cSld>
+    <p:spTree>
+      <p:nvGrpSpPr>
+        <p:cNvPr id="1" name=""/>
+        <p:cNvGrpSpPr/>
+        <p:nvPr/>
+      </p:nvGrpSpPr>
+      <p:grpSpPr>
+        <a:xfrm>
+          <a:off x="0" y="0"/>
+          <a:ext cx="0" cy="0"/>
+          <a:chOff x="0" y="0"/>
+          <a:chExt cx="0" cy="0"/>
+        </a:xfrm>
+      </p:grpSpPr>
+      <p:sp>
+        <p:nvSpPr>
           <p:cNvPr id="135" name="TextShape 1"/>
           <p:cNvSpPr txBox="1"/>
           <p:nvPr/>
@@ -10242,7 +11270,7 @@
       </p:grpSpPr>
       <p:sp>
         <p:nvSpPr>
-          <p:cNvPr id="123" name="TextShape 1"/>
+          <p:cNvPr id="121" name="TextShape 1"/>
           <p:cNvSpPr txBox="1"/>
           <p:nvPr/>
         </p:nvSpPr>
@@ -10292,7 +11320,7 @@
       </p:sp>
       <p:sp>
         <p:nvSpPr>
-          <p:cNvPr id="124" name="TextShape 2"/>
+          <p:cNvPr id="122" name="TextShape 2"/>
           <p:cNvSpPr txBox="1"/>
           <p:nvPr/>
         </p:nvSpPr>
@@ -10312,7 +11340,7 @@
         <p:txBody>
           <a:bodyPr lIns="0" tIns="0" rIns="0" bIns="0"/>
           <a:p>
-            <a:pPr marL="431800" indent="-323850">
+            <a:pPr marL="431800" indent="-323850" algn="just">
               <a:buClr>
                 <a:srgbClr val="000000"/>
               </a:buClr>
@@ -10321,20 +11349,20 @@
               <a:buChar char=""/>
             </a:pPr>
             <a:r>
-              <a:rPr lang="es-MX" sz="3200" b="0" strike="noStrike" spc="-1">
-                <a:solidFill>
-                  <a:srgbClr val="000000"/>
-                </a:solidFill>
-                <a:uFill>
-                  <a:solidFill>
-                    <a:srgbClr val="FFFFFF"/>
-                  </a:solidFill>
-                </a:uFill>
-                <a:latin typeface="Arial" charset="0"/>
-              </a:rPr>
-              <a:t>¿Qué tareas realiza?</a:t>
-            </a:r>
-            <a:endParaRPr lang="es-MX" sz="4620" b="0" strike="noStrike" spc="-1">
+              <a:rPr lang="x-none" altLang="es-MX" sz="3200" b="0" strike="noStrike" spc="-1">
+                <a:solidFill>
+                  <a:srgbClr val="000000"/>
+                </a:solidFill>
+                <a:uFill>
+                  <a:solidFill>
+                    <a:srgbClr val="FFFFFF"/>
+                  </a:solidFill>
+                </a:uFill>
+                <a:latin typeface="Arial" charset="0"/>
+              </a:rPr>
+              <a:t>2003 2.6 Planificador O(1) usa multiples colas de procesos por cada prioridad, esta era una versión más eficiente de O(n), introducido como un sistema extra para sistemas interactivos contra taras por lote. </a:t>
+            </a:r>
+            <a:endParaRPr lang="x-none" altLang="es-MX" sz="3200" b="0" strike="noStrike" spc="-1">
               <a:solidFill>
                 <a:srgbClr val="000000"/>
               </a:solidFill>
@@ -10355,21 +11383,7 @@
               <a:buFont typeface="Wingdings" panose="05000000000000000000" charset="2"/>
               <a:buChar char=""/>
             </a:pPr>
-            <a:r>
-              <a:rPr lang="es-MX" sz="2800" b="0" strike="noStrike" spc="-1">
-                <a:solidFill>
-                  <a:srgbClr val="000000"/>
-                </a:solidFill>
-                <a:uFill>
-                  <a:solidFill>
-                    <a:srgbClr val="FFFFFF"/>
-                  </a:solidFill>
-                </a:uFill>
-                <a:latin typeface="Arial" charset="0"/>
-              </a:rPr>
-              <a:t>Actualmente el kernel de Linux es multitarea, esto quiere decir que en un momento dado pueden existir más de un sólo proceso en ejecución, éste se ejecutará como si fuera el único en ejecución(aunque no lo sea).</a:t>
-            </a:r>
-            <a:endParaRPr lang="es-MX" sz="4620" b="0" strike="noStrike" spc="-1">
+            <a:endParaRPr lang="x-none" altLang="es-MX" sz="3200" b="0" strike="noStrike" spc="-1">
               <a:solidFill>
                 <a:srgbClr val="000000"/>
               </a:solidFill>
@@ -10391,47 +11405,61 @@
               <a:buChar char=""/>
             </a:pPr>
             <a:r>
-              <a:rPr lang="es-MX" sz="2800" b="0" strike="noStrike" spc="-1">
-                <a:solidFill>
-                  <a:srgbClr val="000000"/>
-                </a:solidFill>
-                <a:uFill>
-                  <a:solidFill>
-                    <a:srgbClr val="FFFFFF"/>
-                  </a:solidFill>
-                </a:uFill>
-                <a:latin typeface="Arial" charset="0"/>
-              </a:rPr>
-              <a:t>El planeador del processos </a:t>
-            </a:r>
-            <a:r>
-              <a:rPr lang="es-MX" sz="2800" b="1" strike="noStrike" spc="-1">
-                <a:solidFill>
-                  <a:srgbClr val="000000"/>
-                </a:solidFill>
-                <a:uFill>
-                  <a:solidFill>
-                    <a:srgbClr val="FFFFFF"/>
-                  </a:solidFill>
-                </a:uFill>
-                <a:latin typeface="Arial" charset="0"/>
-              </a:rPr>
-              <a:t>coordina</a:t>
-            </a:r>
-            <a:r>
-              <a:rPr lang="es-MX" sz="2800" b="0" strike="noStrike" spc="-1">
-                <a:solidFill>
-                  <a:srgbClr val="000000"/>
-                </a:solidFill>
-                <a:uFill>
-                  <a:solidFill>
-                    <a:srgbClr val="FFFFFF"/>
-                  </a:solidFill>
-                </a:uFill>
-                <a:latin typeface="Arial" charset="0"/>
-              </a:rPr>
-              <a:t> cuando un proceso va a ser ejecutado.</a:t>
-            </a:r>
+              <a:rPr lang="x-none" altLang="es-MX" sz="3200" b="0" strike="noStrike" spc="-1">
+                <a:solidFill>
+                  <a:srgbClr val="000000"/>
+                </a:solidFill>
+                <a:uFill>
+                  <a:solidFill>
+                    <a:srgbClr val="FFFFFF"/>
+                  </a:solidFill>
+                </a:uFill>
+                <a:latin typeface="Arial" charset="0"/>
+              </a:rPr>
+              <a:t>2008 2.6.23  CFS (Completely fair scheduler) </a:t>
+            </a:r>
+            <a:endParaRPr lang="x-none" altLang="es-MX" sz="3200" b="0" strike="noStrike" spc="-1">
+              <a:solidFill>
+                <a:srgbClr val="000000"/>
+              </a:solidFill>
+              <a:uFill>
+                <a:solidFill>
+                  <a:srgbClr val="FFFFFF"/>
+                </a:solidFill>
+              </a:uFill>
+              <a:latin typeface="Arial" charset="0"/>
+            </a:endParaRPr>
+          </a:p>
+          <a:p>
+            <a:pPr marL="431800" indent="-323850" algn="just">
+              <a:buClr>
+                <a:srgbClr val="000000"/>
+              </a:buClr>
+              <a:buSzPct val="45000"/>
+              <a:buFont typeface="Wingdings" panose="05000000000000000000" charset="2"/>
+              <a:buChar char=""/>
+            </a:pPr>
+            <a:endParaRPr lang="es-MX" sz="3200" b="0" strike="noStrike" spc="-1">
+              <a:solidFill>
+                <a:srgbClr val="000000"/>
+              </a:solidFill>
+              <a:uFill>
+                <a:solidFill>
+                  <a:srgbClr val="FFFFFF"/>
+                </a:solidFill>
+              </a:uFill>
+              <a:latin typeface="Arial" charset="0"/>
+            </a:endParaRPr>
+          </a:p>
+          <a:p>
+            <a:pPr marL="431800" indent="-323850" algn="just">
+              <a:buClr>
+                <a:srgbClr val="000000"/>
+              </a:buClr>
+              <a:buSzPct val="45000"/>
+              <a:buFont typeface="Wingdings" panose="05000000000000000000" charset="2"/>
+              <a:buChar char=""/>
+            </a:pPr>
             <a:endParaRPr lang="es-MX" sz="4620" b="0" strike="noStrike" spc="-1">
               <a:solidFill>
                 <a:srgbClr val="000000"/>
@@ -10473,7 +11501,7 @@
       </p:grpSpPr>
       <p:sp>
         <p:nvSpPr>
-          <p:cNvPr id="125" name="TextShape 1"/>
+          <p:cNvPr id="123" name="TextShape 1"/>
           <p:cNvSpPr txBox="1"/>
           <p:nvPr/>
         </p:nvSpPr>
@@ -10523,13 +11551,13 @@
       </p:sp>
       <p:sp>
         <p:nvSpPr>
-          <p:cNvPr id="126" name="TextShape 2"/>
+          <p:cNvPr id="124" name="TextShape 2"/>
           <p:cNvSpPr txBox="1"/>
           <p:nvPr/>
         </p:nvSpPr>
         <p:spPr>
           <a:xfrm>
-            <a:off x="468000" y="1823760"/>
+            <a:off x="504000" y="1823760"/>
             <a:ext cx="9072000" cy="4384440"/>
           </a:xfrm>
           <a:prstGeom prst="rect">
@@ -10578,7 +11606,7 @@
             </a:endParaRPr>
           </a:p>
           <a:p>
-            <a:pPr marL="431800" indent="-323850">
+            <a:pPr marL="431800" indent="-323850" algn="just">
               <a:buClr>
                 <a:srgbClr val="000000"/>
               </a:buClr>
@@ -10598,7 +11626,7 @@
                 </a:uFill>
                 <a:latin typeface="Arial" charset="0"/>
               </a:rPr>
-              <a:t>En este contexto el planeador de procesos realiza:</a:t>
+              <a:t>Actualmente el kernel de Linux es multitarea, esto quiere decir que en un momento dado pueden existir más de un sólo proceso en ejecución, éste se ejecutará como si fuera el único en ejecución(aunque no lo sea).</a:t>
             </a:r>
             <a:endParaRPr lang="es-MX" sz="4620" b="0" strike="noStrike" spc="-1">
               <a:solidFill>
@@ -10613,7 +11641,7 @@
             </a:endParaRPr>
           </a:p>
           <a:p>
-            <a:pPr marL="431800" indent="-323850">
+            <a:pPr marL="431800" indent="-323850" algn="just">
               <a:buClr>
                 <a:srgbClr val="000000"/>
               </a:buClr>
@@ -10633,21 +11661,21 @@
                 </a:uFill>
                 <a:latin typeface="Arial" charset="0"/>
               </a:rPr>
-              <a:t>1.- Comparte el CPU </a:t>
-            </a:r>
-            <a:r>
-              <a:rPr lang="es-MX" sz="2800" b="0" i="1" strike="noStrike" spc="-1">
-                <a:solidFill>
-                  <a:srgbClr val="000000"/>
-                </a:solidFill>
-                <a:uFill>
-                  <a:solidFill>
-                    <a:srgbClr val="FFFFFF"/>
-                  </a:solidFill>
-                </a:uFill>
-                <a:latin typeface="Arial" charset="0"/>
-              </a:rPr>
-              <a:t>igualitariamente </a:t>
+              <a:t>El planeador del processos </a:t>
+            </a:r>
+            <a:r>
+              <a:rPr lang="es-MX" sz="2800" b="1" strike="noStrike" spc="-1">
+                <a:solidFill>
+                  <a:srgbClr val="000000"/>
+                </a:solidFill>
+                <a:uFill>
+                  <a:solidFill>
+                    <a:srgbClr val="FFFFFF"/>
+                  </a:solidFill>
+                </a:uFill>
+                <a:latin typeface="Arial" charset="0"/>
+              </a:rPr>
+              <a:t>coordina</a:t>
             </a:r>
             <a:r>
               <a:rPr lang="es-MX" sz="2800" b="0" strike="noStrike" spc="-1">
@@ -10661,161 +11689,7 @@
                 </a:uFill>
                 <a:latin typeface="Arial" charset="0"/>
               </a:rPr>
-              <a:t>entre los procesos que este actualmente ejecutándose.</a:t>
-            </a:r>
-            <a:endParaRPr lang="es-MX" sz="4620" b="0" strike="noStrike" spc="-1">
-              <a:solidFill>
-                <a:srgbClr val="000000"/>
-              </a:solidFill>
-              <a:uFill>
-                <a:solidFill>
-                  <a:srgbClr val="FFFFFF"/>
-                </a:solidFill>
-              </a:uFill>
-              <a:latin typeface="Arial" charset="0"/>
-            </a:endParaRPr>
-          </a:p>
-          <a:p>
-            <a:pPr marL="431800" indent="-323850">
-              <a:buClr>
-                <a:srgbClr val="000000"/>
-              </a:buClr>
-              <a:buSzPct val="45000"/>
-              <a:buFont typeface="Wingdings" panose="05000000000000000000" charset="2"/>
-              <a:buChar char=""/>
-            </a:pPr>
-            <a:r>
-              <a:rPr lang="es-MX" sz="2800" b="0" strike="noStrike" spc="-1">
-                <a:solidFill>
-                  <a:srgbClr val="000000"/>
-                </a:solidFill>
-                <a:uFill>
-                  <a:solidFill>
-                    <a:srgbClr val="FFFFFF"/>
-                  </a:solidFill>
-                </a:uFill>
-                <a:latin typeface="Arial" charset="0"/>
-              </a:rPr>
-              <a:t>2.- </a:t>
-            </a:r>
-            <a:r>
-              <a:rPr lang="es-MX" sz="2800" b="0" i="1" strike="noStrike" spc="-1">
-                <a:solidFill>
-                  <a:srgbClr val="000000"/>
-                </a:solidFill>
-                <a:uFill>
-                  <a:solidFill>
-                    <a:srgbClr val="FFFFFF"/>
-                  </a:solidFill>
-                </a:uFill>
-                <a:latin typeface="Arial" charset="0"/>
-              </a:rPr>
-              <a:t>Escoje </a:t>
-            </a:r>
-            <a:r>
-              <a:rPr lang="es-MX" sz="2800" b="0" strike="noStrike" spc="-1">
-                <a:solidFill>
-                  <a:srgbClr val="000000"/>
-                </a:solidFill>
-                <a:uFill>
-                  <a:solidFill>
-                    <a:srgbClr val="FFFFFF"/>
-                  </a:solidFill>
-                </a:uFill>
-                <a:latin typeface="Arial" charset="0"/>
-              </a:rPr>
-              <a:t>apropiadamente los procesos </a:t>
-            </a:r>
-            <a:r>
-              <a:rPr lang="es-MX" sz="2800" b="0" i="1" strike="noStrike" spc="-1">
-                <a:solidFill>
-                  <a:srgbClr val="000000"/>
-                </a:solidFill>
-                <a:uFill>
-                  <a:solidFill>
-                    <a:srgbClr val="FFFFFF"/>
-                  </a:solidFill>
-                </a:uFill>
-                <a:latin typeface="Arial" charset="0"/>
-              </a:rPr>
-              <a:t>siguientes</a:t>
-            </a:r>
-            <a:r>
-              <a:rPr lang="es-MX" sz="2800" b="0" strike="noStrike" spc="-1">
-                <a:solidFill>
-                  <a:srgbClr val="000000"/>
-                </a:solidFill>
-                <a:uFill>
-                  <a:solidFill>
-                    <a:srgbClr val="FFFFFF"/>
-                  </a:solidFill>
-                </a:uFill>
-                <a:latin typeface="Arial" charset="0"/>
-              </a:rPr>
-              <a:t> a ejecutar, considerando politicas y prioridades</a:t>
-            </a:r>
-            <a:endParaRPr lang="es-MX" sz="4620" b="0" strike="noStrike" spc="-1">
-              <a:solidFill>
-                <a:srgbClr val="000000"/>
-              </a:solidFill>
-              <a:uFill>
-                <a:solidFill>
-                  <a:srgbClr val="FFFFFF"/>
-                </a:solidFill>
-              </a:uFill>
-              <a:latin typeface="Arial" charset="0"/>
-            </a:endParaRPr>
-          </a:p>
-          <a:p>
-            <a:pPr marL="431800" indent="-323850">
-              <a:buClr>
-                <a:srgbClr val="000000"/>
-              </a:buClr>
-              <a:buSzPct val="45000"/>
-              <a:buFont typeface="Wingdings" panose="05000000000000000000" charset="2"/>
-              <a:buChar char=""/>
-            </a:pPr>
-            <a:r>
-              <a:rPr lang="es-MX" sz="2800" b="0" strike="noStrike" spc="-1">
-                <a:solidFill>
-                  <a:srgbClr val="000000"/>
-                </a:solidFill>
-                <a:uFill>
-                  <a:solidFill>
-                    <a:srgbClr val="FFFFFF"/>
-                  </a:solidFill>
-                </a:uFill>
-                <a:latin typeface="Arial" charset="0"/>
-              </a:rPr>
-              <a:t>3.- </a:t>
-            </a:r>
-            <a:r>
-              <a:rPr lang="es-MX" sz="2800" b="0" i="1" strike="noStrike" spc="-1">
-                <a:solidFill>
-                  <a:srgbClr val="000000"/>
-                </a:solidFill>
-                <a:uFill>
-                  <a:solidFill>
-                    <a:srgbClr val="FFFFFF"/>
-                  </a:solidFill>
-                </a:uFill>
-                <a:latin typeface="Arial" charset="0"/>
-              </a:rPr>
-              <a:t>Balancea </a:t>
-            </a:r>
-            <a:r>
-              <a:rPr lang="es-MX" sz="2800" b="0" strike="noStrike" spc="-1">
-                <a:solidFill>
-                  <a:srgbClr val="000000"/>
-                </a:solidFill>
-                <a:uFill>
-                  <a:solidFill>
-                    <a:srgbClr val="FFFFFF"/>
-                  </a:solidFill>
-                </a:uFill>
-                <a:latin typeface="Arial" charset="0"/>
-              </a:rPr>
-              <a:t>a los procesos en los diferentes núcleos en sistemas SMP (Symmetric multiprocessing). </a:t>
+              <a:t> cuando un proceso va a ser ejecutado.</a:t>
             </a:r>
             <a:endParaRPr lang="es-MX" sz="4620" b="0" strike="noStrike" spc="-1">
               <a:solidFill>
@@ -10858,7 +11732,7 @@
       </p:grpSpPr>
       <p:sp>
         <p:nvSpPr>
-          <p:cNvPr id="127" name="TextShape 1"/>
+          <p:cNvPr id="125" name="TextShape 1"/>
           <p:cNvSpPr txBox="1"/>
           <p:nvPr/>
         </p:nvSpPr>
@@ -10908,7 +11782,7 @@
       </p:sp>
       <p:sp>
         <p:nvSpPr>
-          <p:cNvPr id="128" name="TextShape 2"/>
+          <p:cNvPr id="126" name="TextShape 2"/>
           <p:cNvSpPr txBox="1"/>
           <p:nvPr/>
         </p:nvSpPr>
@@ -10937,33 +11811,33 @@
               <a:buChar char=""/>
             </a:pPr>
             <a:r>
-              <a:rPr lang="es-MX" sz="3200" b="0" strike="noStrike" spc="-1">
-                <a:solidFill>
-                  <a:srgbClr val="000000"/>
-                </a:solidFill>
-                <a:uFill>
-                  <a:solidFill>
-                    <a:srgbClr val="FFFFFF"/>
-                  </a:solidFill>
-                </a:uFill>
-                <a:latin typeface="Arial" charset="0"/>
-              </a:rPr>
-              <a:t>Nota:</a:t>
-            </a:r>
-            <a:endParaRPr lang="es-MX" sz="4620" b="0" strike="noStrike" spc="-1">
-              <a:solidFill>
-                <a:srgbClr val="000000"/>
-              </a:solidFill>
-              <a:uFill>
-                <a:solidFill>
-                  <a:srgbClr val="FFFFFF"/>
-                </a:solidFill>
-              </a:uFill>
-              <a:latin typeface="Arial" charset="0"/>
-            </a:endParaRPr>
-          </a:p>
-          <a:p>
-            <a:pPr marL="431800" indent="-323850" algn="just">
+              <a:rPr lang="es-MX" sz="2800" b="0" strike="noStrike" spc="-1">
+                <a:solidFill>
+                  <a:srgbClr val="000000"/>
+                </a:solidFill>
+                <a:uFill>
+                  <a:solidFill>
+                    <a:srgbClr val="FFFFFF"/>
+                  </a:solidFill>
+                </a:uFill>
+                <a:latin typeface="Arial" charset="0"/>
+              </a:rPr>
+              <a:t>¿Qué tareas realiza?</a:t>
+            </a:r>
+            <a:endParaRPr lang="es-MX" sz="2800" b="0" strike="noStrike" spc="-1">
+              <a:solidFill>
+                <a:srgbClr val="000000"/>
+              </a:solidFill>
+              <a:uFill>
+                <a:solidFill>
+                  <a:srgbClr val="FFFFFF"/>
+                </a:solidFill>
+              </a:uFill>
+              <a:latin typeface="Arial" charset="0"/>
+            </a:endParaRPr>
+          </a:p>
+          <a:p>
+            <a:pPr marL="431800" indent="-323850">
               <a:buClr>
                 <a:srgbClr val="000000"/>
               </a:buClr>
@@ -10972,90 +11846,237 @@
               <a:buChar char=""/>
             </a:pPr>
             <a:r>
-              <a:rPr lang="es-MX" sz="3200" b="0" strike="noStrike" spc="-1">
-                <a:solidFill>
-                  <a:srgbClr val="000000"/>
-                </a:solidFill>
-                <a:uFill>
-                  <a:solidFill>
-                    <a:srgbClr val="FFFFFF"/>
-                  </a:solidFill>
-                </a:uFill>
-                <a:latin typeface="Arial" charset="0"/>
-              </a:rPr>
-              <a:t>En Linux un proceso es un conjunto de hilos que comparten el mismo identificador de grupo de hilos </a:t>
-            </a:r>
-            <a:r>
-              <a:rPr lang="es-MX" sz="3200" b="0" i="1" strike="noStrike" spc="-1">
-                <a:solidFill>
-                  <a:srgbClr val="000000"/>
-                </a:solidFill>
-                <a:uFill>
-                  <a:solidFill>
-                    <a:srgbClr val="FFFFFF"/>
-                  </a:solidFill>
-                </a:uFill>
-                <a:latin typeface="Arial" charset="0"/>
-              </a:rPr>
-              <a:t>(TGID) </a:t>
-            </a:r>
-            <a:r>
-              <a:rPr lang="es-MX" sz="3200" b="0" strike="noStrike" spc="-1">
-                <a:solidFill>
-                  <a:srgbClr val="000000"/>
-                </a:solidFill>
-                <a:uFill>
-                  <a:solidFill>
-                    <a:srgbClr val="FFFFFF"/>
-                  </a:solidFill>
-                </a:uFill>
-                <a:latin typeface="Arial" charset="0"/>
-              </a:rPr>
-              <a:t>y cualquier recurso necesario. El kernel planifica hilos individualmente, no procesos. </a:t>
-            </a:r>
-            <a:r>
-              <a:rPr lang="es-MX" sz="3200" b="0" i="1" strike="noStrike" spc="-1">
-                <a:solidFill>
-                  <a:srgbClr val="000000"/>
-                </a:solidFill>
-                <a:uFill>
-                  <a:solidFill>
-                    <a:srgbClr val="FFFFFF"/>
-                  </a:solidFill>
-                </a:uFill>
-                <a:latin typeface="Arial" charset="0"/>
-              </a:rPr>
-              <a:t>A lo largo de la presentación se usará el término </a:t>
-            </a:r>
-            <a:r>
-              <a:rPr lang="es-MX" sz="3200" b="1" i="1" strike="noStrike" spc="-1">
-                <a:solidFill>
-                  <a:srgbClr val="000000"/>
-                </a:solidFill>
-                <a:uFill>
-                  <a:solidFill>
-                    <a:srgbClr val="FFFFFF"/>
-                  </a:solidFill>
-                </a:uFill>
-                <a:latin typeface="Arial" charset="0"/>
-              </a:rPr>
-              <a:t> tarea  </a:t>
-            </a:r>
-            <a:r>
-              <a:rPr lang="es-MX" sz="3200" b="0" i="1" strike="noStrike" spc="-1">
-                <a:solidFill>
-                  <a:srgbClr val="000000"/>
-                </a:solidFill>
-                <a:uFill>
-                  <a:solidFill>
-                    <a:srgbClr val="FFFFFF"/>
-                  </a:solidFill>
-                </a:uFill>
-                <a:latin typeface="Arial" charset="0"/>
-              </a:rPr>
-              <a:t>para referirse a hilos (por que en la documentación del planificador así lo hace)</a:t>
-            </a:r>
-            <a:endParaRPr lang="es-MX" sz="4620" b="0" strike="noStrike" spc="-1">
+              <a:rPr lang="es-MX" sz="2800" b="0" strike="noStrike" spc="-1">
+                <a:solidFill>
+                  <a:srgbClr val="000000"/>
+                </a:solidFill>
+                <a:uFill>
+                  <a:solidFill>
+                    <a:srgbClr val="FFFFFF"/>
+                  </a:solidFill>
+                </a:uFill>
+                <a:latin typeface="Arial" charset="0"/>
+              </a:rPr>
+              <a:t>En este contexto el planeador de procesos realiza:</a:t>
+            </a:r>
+            <a:endParaRPr lang="es-MX" sz="2800" b="0" strike="noStrike" spc="-1">
+              <a:solidFill>
+                <a:srgbClr val="000000"/>
+              </a:solidFill>
+              <a:uFill>
+                <a:solidFill>
+                  <a:srgbClr val="FFFFFF"/>
+                </a:solidFill>
+              </a:uFill>
+              <a:latin typeface="Arial" charset="0"/>
+            </a:endParaRPr>
+          </a:p>
+          <a:p>
+            <a:pPr marL="431800" indent="-323850">
+              <a:buClr>
+                <a:srgbClr val="000000"/>
+              </a:buClr>
+              <a:buSzPct val="45000"/>
+              <a:buFont typeface="Wingdings" panose="05000000000000000000" charset="2"/>
+              <a:buChar char=""/>
+            </a:pPr>
+            <a:r>
+              <a:rPr lang="es-MX" sz="2800" b="0" strike="noStrike" spc="-1">
+                <a:solidFill>
+                  <a:srgbClr val="000000"/>
+                </a:solidFill>
+                <a:uFill>
+                  <a:solidFill>
+                    <a:srgbClr val="FFFFFF"/>
+                  </a:solidFill>
+                </a:uFill>
+                <a:latin typeface="Arial" charset="0"/>
+              </a:rPr>
+              <a:t>1.- Comparte el CPU </a:t>
+            </a:r>
+            <a:r>
+              <a:rPr lang="es-MX" sz="2800" b="0" i="1" strike="noStrike" spc="-1">
+                <a:solidFill>
+                  <a:srgbClr val="000000"/>
+                </a:solidFill>
+                <a:uFill>
+                  <a:solidFill>
+                    <a:srgbClr val="FFFFFF"/>
+                  </a:solidFill>
+                </a:uFill>
+                <a:latin typeface="Arial" charset="0"/>
+              </a:rPr>
+              <a:t>igualitariamente </a:t>
+            </a:r>
+            <a:r>
+              <a:rPr lang="es-MX" sz="2800" b="0" strike="noStrike" spc="-1">
+                <a:solidFill>
+                  <a:srgbClr val="000000"/>
+                </a:solidFill>
+                <a:uFill>
+                  <a:solidFill>
+                    <a:srgbClr val="FFFFFF"/>
+                  </a:solidFill>
+                </a:uFill>
+                <a:latin typeface="Arial" charset="0"/>
+              </a:rPr>
+              <a:t>entre los procesos que este actualmente ejecutándose.</a:t>
+            </a:r>
+            <a:endParaRPr lang="es-MX" sz="2800" b="0" strike="noStrike" spc="-1">
+              <a:solidFill>
+                <a:srgbClr val="000000"/>
+              </a:solidFill>
+              <a:uFill>
+                <a:solidFill>
+                  <a:srgbClr val="FFFFFF"/>
+                </a:solidFill>
+              </a:uFill>
+              <a:latin typeface="Arial" charset="0"/>
+            </a:endParaRPr>
+          </a:p>
+          <a:p>
+            <a:pPr marL="431800" indent="-323850">
+              <a:buClr>
+                <a:srgbClr val="000000"/>
+              </a:buClr>
+              <a:buSzPct val="45000"/>
+              <a:buFont typeface="Wingdings" panose="05000000000000000000" charset="2"/>
+              <a:buChar char=""/>
+            </a:pPr>
+            <a:r>
+              <a:rPr lang="es-MX" sz="2800" b="0" strike="noStrike" spc="-1">
+                <a:solidFill>
+                  <a:srgbClr val="000000"/>
+                </a:solidFill>
+                <a:uFill>
+                  <a:solidFill>
+                    <a:srgbClr val="FFFFFF"/>
+                  </a:solidFill>
+                </a:uFill>
+                <a:latin typeface="Arial" charset="0"/>
+              </a:rPr>
+              <a:t>2.- </a:t>
+            </a:r>
+            <a:r>
+              <a:rPr lang="es-MX" sz="2800" b="0" i="1" strike="noStrike" spc="-1">
+                <a:solidFill>
+                  <a:srgbClr val="000000"/>
+                </a:solidFill>
+                <a:uFill>
+                  <a:solidFill>
+                    <a:srgbClr val="FFFFFF"/>
+                  </a:solidFill>
+                </a:uFill>
+                <a:latin typeface="Arial" charset="0"/>
+              </a:rPr>
+              <a:t>Escoje </a:t>
+            </a:r>
+            <a:r>
+              <a:rPr lang="es-MX" sz="2800" b="0" strike="noStrike" spc="-1">
+                <a:solidFill>
+                  <a:srgbClr val="000000"/>
+                </a:solidFill>
+                <a:uFill>
+                  <a:solidFill>
+                    <a:srgbClr val="FFFFFF"/>
+                  </a:solidFill>
+                </a:uFill>
+                <a:latin typeface="Arial" charset="0"/>
+              </a:rPr>
+              <a:t>apropiadamente los procesos </a:t>
+            </a:r>
+            <a:r>
+              <a:rPr lang="es-MX" sz="2800" b="0" i="1" strike="noStrike" spc="-1">
+                <a:solidFill>
+                  <a:srgbClr val="000000"/>
+                </a:solidFill>
+                <a:uFill>
+                  <a:solidFill>
+                    <a:srgbClr val="FFFFFF"/>
+                  </a:solidFill>
+                </a:uFill>
+                <a:latin typeface="Arial" charset="0"/>
+              </a:rPr>
+              <a:t>siguientes</a:t>
+            </a:r>
+            <a:r>
+              <a:rPr lang="es-MX" sz="2800" b="0" strike="noStrike" spc="-1">
+                <a:solidFill>
+                  <a:srgbClr val="000000"/>
+                </a:solidFill>
+                <a:uFill>
+                  <a:solidFill>
+                    <a:srgbClr val="FFFFFF"/>
+                  </a:solidFill>
+                </a:uFill>
+                <a:latin typeface="Arial" charset="0"/>
+              </a:rPr>
+              <a:t> a ejecutar, considerando politicas y prioridades</a:t>
+            </a:r>
+            <a:endParaRPr lang="es-MX" sz="2800" b="0" strike="noStrike" spc="-1">
+              <a:solidFill>
+                <a:srgbClr val="000000"/>
+              </a:solidFill>
+              <a:uFill>
+                <a:solidFill>
+                  <a:srgbClr val="FFFFFF"/>
+                </a:solidFill>
+              </a:uFill>
+              <a:latin typeface="Arial" charset="0"/>
+            </a:endParaRPr>
+          </a:p>
+          <a:p>
+            <a:pPr marL="431800" indent="-323850">
+              <a:buClr>
+                <a:srgbClr val="000000"/>
+              </a:buClr>
+              <a:buSzPct val="45000"/>
+              <a:buFont typeface="Wingdings" panose="05000000000000000000" charset="2"/>
+              <a:buChar char=""/>
+            </a:pPr>
+            <a:r>
+              <a:rPr lang="es-MX" sz="2800" b="0" strike="noStrike" spc="-1">
+                <a:solidFill>
+                  <a:srgbClr val="000000"/>
+                </a:solidFill>
+                <a:uFill>
+                  <a:solidFill>
+                    <a:srgbClr val="FFFFFF"/>
+                  </a:solidFill>
+                </a:uFill>
+                <a:latin typeface="Arial" charset="0"/>
+              </a:rPr>
+              <a:t>3.- </a:t>
+            </a:r>
+            <a:r>
+              <a:rPr lang="es-MX" sz="2800" b="0" i="1" strike="noStrike" spc="-1">
+                <a:solidFill>
+                  <a:srgbClr val="000000"/>
+                </a:solidFill>
+                <a:uFill>
+                  <a:solidFill>
+                    <a:srgbClr val="FFFFFF"/>
+                  </a:solidFill>
+                </a:uFill>
+                <a:latin typeface="Arial" charset="0"/>
+              </a:rPr>
+              <a:t>Balancea </a:t>
+            </a:r>
+            <a:r>
+              <a:rPr lang="es-MX" sz="2800" b="0" strike="noStrike" spc="-1">
+                <a:solidFill>
+                  <a:srgbClr val="000000"/>
+                </a:solidFill>
+                <a:uFill>
+                  <a:solidFill>
+                    <a:srgbClr val="FFFFFF"/>
+                  </a:solidFill>
+                </a:uFill>
+                <a:latin typeface="Arial" charset="0"/>
+              </a:rPr>
+              <a:t>a los procesos en los diferentes núcleos en sistemas SMP (Symmetric multiprocessing). </a:t>
+            </a:r>
+            <a:endParaRPr lang="es-MX" sz="2800" b="0" strike="noStrike" spc="-1">
               <a:solidFill>
                 <a:srgbClr val="000000"/>
               </a:solidFill>
@@ -11096,7 +12117,7 @@
       </p:grpSpPr>
       <p:sp>
         <p:nvSpPr>
-          <p:cNvPr id="129" name="TextShape 1"/>
+          <p:cNvPr id="127" name="TextShape 1"/>
           <p:cNvSpPr txBox="1"/>
           <p:nvPr/>
         </p:nvSpPr>
@@ -11128,7 +12149,7 @@
                 </a:uFill>
                 <a:latin typeface="Arial" charset="0"/>
               </a:rPr>
-              <a:t>1 Clasificación de tareas</a:t>
+              <a:t>Introducción</a:t>
             </a:r>
             <a:endParaRPr lang="es-MX" sz="4000" b="0" strike="noStrike" spc="-1">
               <a:solidFill>
@@ -11146,7 +12167,7 @@
       </p:sp>
       <p:sp>
         <p:nvSpPr>
-          <p:cNvPr id="130" name="TextShape 2"/>
+          <p:cNvPr id="128" name="TextShape 2"/>
           <p:cNvSpPr txBox="1"/>
           <p:nvPr/>
         </p:nvSpPr>
@@ -11186,7 +12207,7 @@
                 </a:uFill>
                 <a:latin typeface="Arial" charset="0"/>
               </a:rPr>
-              <a:t>Las tareas se pueden dividir en dos: </a:t>
+              <a:t>Nota:</a:t>
             </a:r>
             <a:endParaRPr lang="es-MX" sz="4620" b="0" strike="noStrike" spc="-1">
               <a:solidFill>
@@ -11201,7 +12222,7 @@
             </a:endParaRPr>
           </a:p>
           <a:p>
-            <a:pPr marL="431800" indent="-323850">
+            <a:pPr marL="431800" indent="-323850" algn="just">
               <a:buClr>
                 <a:srgbClr val="000000"/>
               </a:buClr>
@@ -11221,29 +12242,22 @@
                 </a:uFill>
                 <a:latin typeface="Arial" charset="0"/>
               </a:rPr>
-              <a:t>Ligadas al CPU (CPU-bound) </a:t>
-            </a:r>
-            <a:endParaRPr lang="es-MX" sz="4620" b="0" strike="noStrike" spc="-1">
-              <a:solidFill>
-                <a:srgbClr val="000000"/>
-              </a:solidFill>
-              <a:uFill>
-                <a:solidFill>
-                  <a:srgbClr val="FFFFFF"/>
-                </a:solidFill>
-              </a:uFill>
-              <a:latin typeface="Arial" charset="0"/>
-            </a:endParaRPr>
-          </a:p>
-          <a:p>
-            <a:pPr marL="431800" indent="-323850">
-              <a:buClr>
-                <a:srgbClr val="000000"/>
-              </a:buClr>
-              <a:buSzPct val="45000"/>
-              <a:buFont typeface="Wingdings" panose="05000000000000000000" charset="2"/>
-              <a:buChar char=""/>
-            </a:pPr>
+              <a:t>En Linux un proceso es un conjunto de hilos que comparten el mismo identificador de grupo de hilos </a:t>
+            </a:r>
+            <a:r>
+              <a:rPr lang="es-MX" sz="3200" b="0" i="1" strike="noStrike" spc="-1">
+                <a:solidFill>
+                  <a:srgbClr val="000000"/>
+                </a:solidFill>
+                <a:uFill>
+                  <a:solidFill>
+                    <a:srgbClr val="FFFFFF"/>
+                  </a:solidFill>
+                </a:uFill>
+                <a:latin typeface="Arial" charset="0"/>
+              </a:rPr>
+              <a:t>(TGID) </a:t>
+            </a:r>
             <a:r>
               <a:rPr lang="es-MX" sz="3200" b="0" strike="noStrike" spc="-1">
                 <a:solidFill>
@@ -11256,29 +12270,8 @@
                 </a:uFill>
                 <a:latin typeface="Arial" charset="0"/>
               </a:rPr>
-              <a:t>Ligadas a E/S (I/O-bound)</a:t>
-            </a:r>
-            <a:endParaRPr lang="es-MX" sz="4620" b="0" strike="noStrike" spc="-1">
-              <a:solidFill>
-                <a:srgbClr val="000000"/>
-              </a:solidFill>
-              <a:uFill>
-                <a:solidFill>
-                  <a:srgbClr val="FFFFFF"/>
-                </a:solidFill>
-              </a:uFill>
-              <a:latin typeface="Arial" charset="0"/>
-            </a:endParaRPr>
-          </a:p>
-          <a:p>
-            <a:pPr marL="431800" indent="-323850" algn="just">
-              <a:buClr>
-                <a:srgbClr val="000000"/>
-              </a:buClr>
-              <a:buSzPct val="45000"/>
-              <a:buFont typeface="Wingdings" panose="05000000000000000000" charset="2"/>
-              <a:buChar char=""/>
-            </a:pPr>
+              <a:t>y cualquier recurso necesario. El kernel planifica hilos individualmente, no procesos. </a:t>
+            </a:r>
             <a:r>
               <a:rPr lang="es-MX" sz="3200" b="0" i="1" strike="noStrike" spc="-1">
                 <a:solidFill>
@@ -11291,7 +12284,35 @@
                 </a:uFill>
                 <a:latin typeface="Arial" charset="0"/>
               </a:rPr>
-              <a:t>Para que el sistema logre ser útil para usos genrales es necesario que el planificador sea responsivo con las tareas ligadas a E/S y eficiente con las tareas ligadas a CPU. </a:t>
+              <a:t>A lo largo de la presentación se usará el término </a:t>
+            </a:r>
+            <a:r>
+              <a:rPr lang="es-MX" sz="3200" b="1" i="1" strike="noStrike" spc="-1">
+                <a:solidFill>
+                  <a:srgbClr val="000000"/>
+                </a:solidFill>
+                <a:uFill>
+                  <a:solidFill>
+                    <a:srgbClr val="FFFFFF"/>
+                  </a:solidFill>
+                </a:uFill>
+                <a:latin typeface="Arial" charset="0"/>
+              </a:rPr>
+              <a:t> tarea  </a:t>
+            </a:r>
+            <a:r>
+              <a:rPr lang="es-MX" sz="3200" b="0" i="1" strike="noStrike" spc="-1">
+                <a:solidFill>
+                  <a:srgbClr val="000000"/>
+                </a:solidFill>
+                <a:uFill>
+                  <a:solidFill>
+                    <a:srgbClr val="FFFFFF"/>
+                  </a:solidFill>
+                </a:uFill>
+                <a:latin typeface="Arial" charset="0"/>
+              </a:rPr>
+              <a:t>para referirse a hilos (por que en la documentación del planificador así lo hace)</a:t>
             </a:r>
             <a:endParaRPr lang="es-MX" sz="4620" b="0" strike="noStrike" spc="-1">
               <a:solidFill>
@@ -11334,7 +12355,7 @@
       </p:grpSpPr>
       <p:sp>
         <p:nvSpPr>
-          <p:cNvPr id="131" name="TextShape 1"/>
+          <p:cNvPr id="129" name="TextShape 1"/>
           <p:cNvSpPr txBox="1"/>
           <p:nvPr/>
         </p:nvSpPr>
@@ -11384,7 +12405,7 @@
       </p:sp>
       <p:sp>
         <p:nvSpPr>
-          <p:cNvPr id="132" name="TextShape 2"/>
+          <p:cNvPr id="130" name="TextShape 2"/>
           <p:cNvSpPr txBox="1"/>
           <p:nvPr/>
         </p:nvSpPr>
@@ -11404,7 +12425,7 @@
         <p:txBody>
           <a:bodyPr lIns="0" tIns="0" rIns="0" bIns="0"/>
           <a:p>
-            <a:pPr marL="431800" indent="-323850" algn="just">
+            <a:pPr marL="431800" indent="-323850">
               <a:buClr>
                 <a:srgbClr val="000000"/>
               </a:buClr>
@@ -11424,8 +12445,99 @@
                 </a:uFill>
                 <a:latin typeface="Arial" charset="0"/>
               </a:rPr>
-              <a:t>Si se beneficia más a las tareas ligadas con el CPU, se mejora la eficiencia de la computadora, al ser interrumpida menos veces, pero la respuesta se ve afectada, si  se interrumpe más seguido</a:t>
-            </a:r>
+              <a:t>Las tareas se pueden dividir en dos: </a:t>
+            </a:r>
+            <a:endParaRPr lang="es-MX" sz="4620" b="0" strike="noStrike" spc="-1">
+              <a:solidFill>
+                <a:srgbClr val="000000"/>
+              </a:solidFill>
+              <a:uFill>
+                <a:solidFill>
+                  <a:srgbClr val="FFFFFF"/>
+                </a:solidFill>
+              </a:uFill>
+              <a:latin typeface="Arial" charset="0"/>
+            </a:endParaRPr>
+          </a:p>
+          <a:p>
+            <a:pPr marL="431800" indent="-323850">
+              <a:buClr>
+                <a:srgbClr val="000000"/>
+              </a:buClr>
+              <a:buSzPct val="45000"/>
+              <a:buFont typeface="Wingdings" panose="05000000000000000000" charset="2"/>
+              <a:buChar char=""/>
+            </a:pPr>
+            <a:r>
+              <a:rPr lang="es-MX" sz="3200" b="0" strike="noStrike" spc="-1">
+                <a:solidFill>
+                  <a:srgbClr val="000000"/>
+                </a:solidFill>
+                <a:uFill>
+                  <a:solidFill>
+                    <a:srgbClr val="FFFFFF"/>
+                  </a:solidFill>
+                </a:uFill>
+                <a:latin typeface="Arial" charset="0"/>
+              </a:rPr>
+              <a:t>Ligadas al CPU (CPU-bound) </a:t>
+            </a:r>
+            <a:endParaRPr lang="es-MX" sz="4620" b="0" strike="noStrike" spc="-1">
+              <a:solidFill>
+                <a:srgbClr val="000000"/>
+              </a:solidFill>
+              <a:uFill>
+                <a:solidFill>
+                  <a:srgbClr val="FFFFFF"/>
+                </a:solidFill>
+              </a:uFill>
+              <a:latin typeface="Arial" charset="0"/>
+            </a:endParaRPr>
+          </a:p>
+          <a:p>
+            <a:pPr marL="431800" indent="-323850">
+              <a:buClr>
+                <a:srgbClr val="000000"/>
+              </a:buClr>
+              <a:buSzPct val="45000"/>
+              <a:buFont typeface="Wingdings" panose="05000000000000000000" charset="2"/>
+              <a:buChar char=""/>
+            </a:pPr>
+            <a:r>
+              <a:rPr lang="es-MX" sz="3200" b="0" strike="noStrike" spc="-1">
+                <a:solidFill>
+                  <a:srgbClr val="000000"/>
+                </a:solidFill>
+                <a:uFill>
+                  <a:solidFill>
+                    <a:srgbClr val="FFFFFF"/>
+                  </a:solidFill>
+                </a:uFill>
+                <a:latin typeface="Arial" charset="0"/>
+              </a:rPr>
+              <a:t>Ligadas a E/S (I/O-bound)</a:t>
+            </a:r>
+            <a:endParaRPr lang="es-MX" sz="4620" b="0" strike="noStrike" spc="-1">
+              <a:solidFill>
+                <a:srgbClr val="000000"/>
+              </a:solidFill>
+              <a:uFill>
+                <a:solidFill>
+                  <a:srgbClr val="FFFFFF"/>
+                </a:solidFill>
+              </a:uFill>
+              <a:latin typeface="Arial" charset="0"/>
+            </a:endParaRPr>
+          </a:p>
+          <a:p>
+            <a:pPr marL="431800" indent="-323850" algn="just">
+              <a:buClr>
+                <a:srgbClr val="000000"/>
+              </a:buClr>
+              <a:buSzPct val="45000"/>
+              <a:buFont typeface="Wingdings" panose="05000000000000000000" charset="2"/>
+              <a:buChar char=""/>
+            </a:pPr>
             <a:r>
               <a:rPr lang="es-MX" sz="3200" b="0" i="1" strike="noStrike" spc="-1">
                 <a:solidFill>
@@ -11438,21 +12550,7 @@
                 </a:uFill>
                 <a:latin typeface="Arial" charset="0"/>
               </a:rPr>
-              <a:t> al</a:t>
-            </a:r>
-            <a:r>
-              <a:rPr lang="es-MX" sz="3200" b="0" strike="noStrike" spc="-1">
-                <a:solidFill>
-                  <a:srgbClr val="000000"/>
-                </a:solidFill>
-                <a:uFill>
-                  <a:solidFill>
-                    <a:srgbClr val="FFFFFF"/>
-                  </a:solidFill>
-                </a:uFill>
-                <a:latin typeface="Arial" charset="0"/>
-              </a:rPr>
-              <a:t> procesador para responder a las tareas de E/S se tiene mayor responsiva, pero la eficiencia se ve afectada. Esto pone al planificador en un condición de dar y recibir para poner el balance los dos requerimientos.</a:t>
+              <a:t>Para que el sistema logre ser útil para usos genrales es necesario que el planificador sea responsivo con las tareas ligadas a E/S y eficiente con las tareas ligadas a CPU. </a:t>
             </a:r>
             <a:endParaRPr lang="es-MX" sz="4620" b="0" strike="noStrike" spc="-1">
               <a:solidFill>
@@ -11495,7 +12593,7 @@
       </p:grpSpPr>
       <p:sp>
         <p:nvSpPr>
-          <p:cNvPr id="133" name="TextShape 1"/>
+          <p:cNvPr id="131" name="TextShape 1"/>
           <p:cNvSpPr txBox="1"/>
           <p:nvPr/>
         </p:nvSpPr>
@@ -11545,7 +12643,7 @@
       </p:sp>
       <p:sp>
         <p:nvSpPr>
-          <p:cNvPr id="134" name="TextShape 2"/>
+          <p:cNvPr id="132" name="TextShape 2"/>
           <p:cNvSpPr txBox="1"/>
           <p:nvPr/>
         </p:nvSpPr>
@@ -11564,41 +12662,6 @@
         </p:spPr>
         <p:txBody>
           <a:bodyPr lIns="0" tIns="0" rIns="0" bIns="0"/>
-          <a:p>
-            <a:pPr marL="107950" indent="0" algn="just">
-              <a:buClr>
-                <a:srgbClr val="000000"/>
-              </a:buClr>
-              <a:buSzPct val="45000"/>
-              <a:buFont typeface="Wingdings" panose="05000000000000000000" charset="2"/>
-              <a:buNone/>
-            </a:pPr>
-            <a:r>
-              <a:rPr lang="es-MX" sz="2600" b="0" strike="noStrike" spc="-1">
-                <a:solidFill>
-                  <a:srgbClr val="000000"/>
-                </a:solidFill>
-                <a:uFill>
-                  <a:solidFill>
-                    <a:srgbClr val="FFFFFF"/>
-                  </a:solidFill>
-                </a:uFill>
-                <a:latin typeface="Arial" charset="0"/>
-              </a:rPr>
-              <a:t>Además tenemos esta otra clasificación</a:t>
-            </a:r>
-            <a:endParaRPr lang="es-MX" sz="2600" b="0" strike="noStrike" spc="-1">
-              <a:solidFill>
-                <a:srgbClr val="000000"/>
-              </a:solidFill>
-              <a:uFill>
-                <a:solidFill>
-                  <a:srgbClr val="FFFFFF"/>
-                </a:solidFill>
-              </a:uFill>
-              <a:latin typeface="Arial" charset="0"/>
-            </a:endParaRPr>
-          </a:p>
           <a:p>
             <a:pPr marL="431800" indent="-323850" algn="just">
               <a:buClr>
@@ -11609,104 +12672,48 @@
               <a:buChar char=""/>
             </a:pPr>
             <a:r>
-              <a:rPr lang="es-MX" sz="2600" b="0" strike="noStrike" spc="-1">
-                <a:solidFill>
-                  <a:srgbClr val="000000"/>
-                </a:solidFill>
-                <a:uFill>
-                  <a:solidFill>
-                    <a:srgbClr val="FFFFFF"/>
-                  </a:solidFill>
-                </a:uFill>
-                <a:latin typeface="Arial" charset="0"/>
-              </a:rPr>
-              <a:t>Tiempo Real</a:t>
-            </a:r>
-            <a:endParaRPr lang="es-MX" sz="2600" b="0" strike="noStrike" spc="-1">
-              <a:solidFill>
-                <a:srgbClr val="000000"/>
-              </a:solidFill>
-              <a:uFill>
-                <a:solidFill>
-                  <a:srgbClr val="FFFFFF"/>
-                </a:solidFill>
-              </a:uFill>
-              <a:latin typeface="Arial" charset="0"/>
-            </a:endParaRPr>
-          </a:p>
-          <a:p>
-            <a:pPr marL="431800" indent="-323850" algn="just">
-              <a:buClr>
-                <a:srgbClr val="000000"/>
-              </a:buClr>
-              <a:buSzPct val="45000"/>
-              <a:buFont typeface="Wingdings" panose="05000000000000000000" charset="2"/>
-              <a:buChar char=""/>
-            </a:pPr>
-            <a:r>
-              <a:rPr lang="es-MX" sz="2600" b="0" strike="noStrike" spc="-1">
-                <a:solidFill>
-                  <a:srgbClr val="000000"/>
-                </a:solidFill>
-                <a:uFill>
-                  <a:solidFill>
-                    <a:srgbClr val="FFFFFF"/>
-                  </a:solidFill>
-                </a:uFill>
-                <a:latin typeface="Arial" charset="0"/>
-              </a:rPr>
-              <a:t>Normal</a:t>
-            </a:r>
-            <a:endParaRPr lang="es-MX" sz="2600" b="0" strike="noStrike" spc="-1">
-              <a:solidFill>
-                <a:srgbClr val="000000"/>
-              </a:solidFill>
-              <a:uFill>
-                <a:solidFill>
-                  <a:srgbClr val="FFFFFF"/>
-                </a:solidFill>
-              </a:uFill>
-              <a:latin typeface="Arial" charset="0"/>
-            </a:endParaRPr>
-          </a:p>
-          <a:p>
-            <a:pPr marL="107950" indent="0" algn="just">
-              <a:buClr>
-                <a:srgbClr val="000000"/>
-              </a:buClr>
-              <a:buSzPct val="45000"/>
-              <a:buFont typeface="Wingdings" panose="05000000000000000000" charset="2"/>
-              <a:buNone/>
-            </a:pPr>
-            <a:r>
-              <a:rPr lang="es-MX" sz="2600" b="0" strike="noStrike" spc="-1">
-                <a:solidFill>
-                  <a:srgbClr val="000000"/>
-                </a:solidFill>
-                <a:uFill>
-                  <a:solidFill>
-                    <a:srgbClr val="FFFFFF"/>
-                  </a:solidFill>
-                </a:uFill>
-                <a:latin typeface="Arial" charset="0"/>
-              </a:rPr>
-              <a:t>Las tareas de tiempo real tienen una sincronización estricta </a:t>
-            </a:r>
-            <a:r>
-              <a:rPr lang="x-none" altLang="es-MX" sz="2600" b="0" strike="noStrike" spc="-1">
-                <a:solidFill>
-                  <a:srgbClr val="000000"/>
-                </a:solidFill>
-                <a:uFill>
-                  <a:solidFill>
-                    <a:srgbClr val="FFFFFF"/>
-                  </a:solidFill>
-                </a:uFill>
-                <a:latin typeface="Arial" charset="0"/>
-              </a:rPr>
-              <a:t>y además una priorizacion por encima de otras tareas en el sistema. Diferentes politicas de planeación son implementadas para tiempo real y normal, usando las clases de planeación.</a:t>
-            </a:r>
-            <a:endParaRPr lang="x-none" altLang="es-MX" sz="2600" b="0" strike="noStrike" spc="-1">
+              <a:rPr lang="es-MX" sz="3200" b="0" strike="noStrike" spc="-1">
+                <a:solidFill>
+                  <a:srgbClr val="000000"/>
+                </a:solidFill>
+                <a:uFill>
+                  <a:solidFill>
+                    <a:srgbClr val="FFFFFF"/>
+                  </a:solidFill>
+                </a:uFill>
+                <a:latin typeface="Arial" charset="0"/>
+              </a:rPr>
+              <a:t>Si se beneficia más a las tareas ligadas con el CPU, se mejora la eficiencia de la computadora, al ser interrumpida menos veces, pero la respuesta se ve afectada, si  se interrumpe más seguido</a:t>
+            </a:r>
+            <a:r>
+              <a:rPr lang="es-MX" sz="3200" b="0" i="1" strike="noStrike" spc="-1">
+                <a:solidFill>
+                  <a:srgbClr val="000000"/>
+                </a:solidFill>
+                <a:uFill>
+                  <a:solidFill>
+                    <a:srgbClr val="FFFFFF"/>
+                  </a:solidFill>
+                </a:uFill>
+                <a:latin typeface="Arial" charset="0"/>
+              </a:rPr>
+              <a:t> al</a:t>
+            </a:r>
+            <a:r>
+              <a:rPr lang="es-MX" sz="3200" b="0" strike="noStrike" spc="-1">
+                <a:solidFill>
+                  <a:srgbClr val="000000"/>
+                </a:solidFill>
+                <a:uFill>
+                  <a:solidFill>
+                    <a:srgbClr val="FFFFFF"/>
+                  </a:solidFill>
+                </a:uFill>
+                <a:latin typeface="Arial" charset="0"/>
+              </a:rPr>
+              <a:t> procesador para responder a las tareas de E/S se tiene mayor responsiva, pero la eficiencia se ve afectada. Esto pone al planificador en un condición de dar y recibir para poner el balance los dos requerimientos.</a:t>
+            </a:r>
+            <a:endParaRPr lang="es-MX" sz="4620" b="0" strike="noStrike" spc="-1">
               <a:solidFill>
                 <a:srgbClr val="000000"/>
               </a:solidFill>
@@ -11817,6 +12824,41 @@
         <p:txBody>
           <a:bodyPr lIns="0" tIns="0" rIns="0" bIns="0"/>
           <a:p>
+            <a:pPr marL="107950" indent="0" algn="just">
+              <a:buClr>
+                <a:srgbClr val="000000"/>
+              </a:buClr>
+              <a:buSzPct val="45000"/>
+              <a:buFont typeface="Wingdings" panose="05000000000000000000" charset="2"/>
+              <a:buNone/>
+            </a:pPr>
+            <a:r>
+              <a:rPr lang="es-MX" sz="3200" b="0" strike="noStrike" spc="-1">
+                <a:solidFill>
+                  <a:srgbClr val="000000"/>
+                </a:solidFill>
+                <a:uFill>
+                  <a:solidFill>
+                    <a:srgbClr val="FFFFFF"/>
+                  </a:solidFill>
+                </a:uFill>
+                <a:latin typeface="Arial" charset="0"/>
+              </a:rPr>
+              <a:t>Además tenemos esta otra clasificación</a:t>
+            </a:r>
+            <a:endParaRPr lang="es-MX" sz="3200" b="0" strike="noStrike" spc="-1">
+              <a:solidFill>
+                <a:srgbClr val="000000"/>
+              </a:solidFill>
+              <a:uFill>
+                <a:solidFill>
+                  <a:srgbClr val="FFFFFF"/>
+                </a:solidFill>
+              </a:uFill>
+              <a:latin typeface="Arial" charset="0"/>
+            </a:endParaRPr>
+          </a:p>
+          <a:p>
             <a:pPr marL="431800" indent="-323850" algn="just">
               <a:buClr>
                 <a:srgbClr val="000000"/>
@@ -11826,20 +12868,20 @@
               <a:buChar char=""/>
             </a:pPr>
             <a:r>
-              <a:rPr lang="x-none" altLang="es-MX" sz="3200" b="0" strike="noStrike" spc="-1">
-                <a:solidFill>
-                  <a:srgbClr val="000000"/>
-                </a:solidFill>
-                <a:uFill>
-                  <a:solidFill>
-                    <a:srgbClr val="FFFFFF"/>
-                  </a:solidFill>
-                </a:uFill>
-                <a:latin typeface="Arial" charset="0"/>
-              </a:rPr>
-              <a:t>Por valores de prioridad de tareas</a:t>
-            </a:r>
-            <a:endParaRPr lang="x-none" altLang="es-MX" sz="3200" b="0" strike="noStrike" spc="-1">
+              <a:rPr lang="es-MX" sz="3200" b="0" strike="noStrike" spc="-1">
+                <a:solidFill>
+                  <a:srgbClr val="000000"/>
+                </a:solidFill>
+                <a:uFill>
+                  <a:solidFill>
+                    <a:srgbClr val="FFFFFF"/>
+                  </a:solidFill>
+                </a:uFill>
+                <a:latin typeface="Arial" charset="0"/>
+              </a:rPr>
+              <a:t>Tiempo Real</a:t>
+            </a:r>
+            <a:endParaRPr lang="es-MX" sz="3200" b="0" strike="noStrike" spc="-1">
               <a:solidFill>
                 <a:srgbClr val="000000"/>
               </a:solidFill>
@@ -11861,41 +12903,55 @@
               <a:buChar char=""/>
             </a:pPr>
             <a:r>
-              <a:rPr lang="x-none" altLang="es-MX" sz="3200" b="0" strike="noStrike" spc="-1">
-                <a:solidFill>
-                  <a:srgbClr val="000000"/>
-                </a:solidFill>
-                <a:uFill>
-                  <a:solidFill>
-                    <a:srgbClr val="FFFFFF"/>
-                  </a:solidFill>
-                </a:uFill>
-                <a:latin typeface="Arial" charset="0"/>
-              </a:rPr>
-              <a:t>las prioridades altas en el kernel tienen valores numericos bajos.</a:t>
-            </a:r>
-            <a:endParaRPr lang="x-none" altLang="es-MX" sz="3200" b="0" strike="noStrike" spc="-1">
-              <a:solidFill>
-                <a:srgbClr val="000000"/>
-              </a:solidFill>
-              <a:uFill>
-                <a:solidFill>
-                  <a:srgbClr val="FFFFFF"/>
-                </a:solidFill>
-              </a:uFill>
-              <a:latin typeface="Arial" charset="0"/>
-            </a:endParaRPr>
-          </a:p>
-          <a:p>
-            <a:pPr marL="431800" indent="-323850" algn="just">
+              <a:rPr lang="es-MX" sz="3200" b="0" strike="noStrike" spc="-1">
+                <a:solidFill>
+                  <a:srgbClr val="000000"/>
+                </a:solidFill>
+                <a:uFill>
+                  <a:solidFill>
+                    <a:srgbClr val="FFFFFF"/>
+                  </a:solidFill>
+                </a:uFill>
+                <a:latin typeface="Arial" charset="0"/>
+              </a:rPr>
+              <a:t>Normal</a:t>
+            </a:r>
+            <a:endParaRPr lang="es-MX" sz="3200" b="0" strike="noStrike" spc="-1">
+              <a:solidFill>
+                <a:srgbClr val="000000"/>
+              </a:solidFill>
+              <a:uFill>
+                <a:solidFill>
+                  <a:srgbClr val="FFFFFF"/>
+                </a:solidFill>
+              </a:uFill>
+              <a:latin typeface="Arial" charset="0"/>
+            </a:endParaRPr>
+          </a:p>
+          <a:p>
+            <a:pPr marL="107950" indent="0" algn="just">
               <a:buClr>
                 <a:srgbClr val="000000"/>
               </a:buClr>
               <a:buSzPct val="45000"/>
               <a:buFont typeface="Wingdings" panose="05000000000000000000" charset="2"/>
-              <a:buChar char=""/>
+              <a:buNone/>
             </a:pPr>
             <a:r>
+              <a:rPr lang="es-MX" sz="3200" b="0" strike="noStrike" spc="-1">
+                <a:solidFill>
+                  <a:srgbClr val="000000"/>
+                </a:solidFill>
+                <a:uFill>
+                  <a:solidFill>
+                    <a:srgbClr val="FFFFFF"/>
+                  </a:solidFill>
+                </a:uFill>
+                <a:latin typeface="Arial" charset="0"/>
+              </a:rPr>
+              <a:t>Las tareas de tiempo real tienen una sincronización estricta </a:t>
+            </a:r>
+            <a:r>
               <a:rPr lang="x-none" altLang="es-MX" sz="3200" b="0" strike="noStrike" spc="-1">
                 <a:solidFill>
                   <a:srgbClr val="000000"/>
@@ -11907,106 +12963,8 @@
                 </a:uFill>
                 <a:latin typeface="Arial" charset="0"/>
               </a:rPr>
-              <a:t>Las tareas de tiempo real tiene un rango de 1-a 99, minetras que las normales de 100-139.</a:t>
-            </a:r>
-            <a:endParaRPr lang="x-none" altLang="es-MX" sz="3200" b="0" strike="noStrike" spc="-1">
-              <a:solidFill>
-                <a:srgbClr val="000000"/>
-              </a:solidFill>
-              <a:uFill>
-                <a:solidFill>
-                  <a:srgbClr val="FFFFFF"/>
-                </a:solidFill>
-              </a:uFill>
-              <a:latin typeface="Arial" charset="0"/>
-            </a:endParaRPr>
-          </a:p>
-          <a:p>
-            <a:pPr marL="431800" indent="-323850" algn="just">
-              <a:buClr>
-                <a:srgbClr val="000000"/>
-              </a:buClr>
-              <a:buSzPct val="45000"/>
-              <a:buFont typeface="Wingdings" panose="05000000000000000000" charset="2"/>
-              <a:buChar char=""/>
-            </a:pPr>
-            <a:r>
-              <a:rPr lang="x-none" altLang="es-MX" sz="3200" b="0" strike="noStrike" spc="-1">
-                <a:solidFill>
-                  <a:srgbClr val="000000"/>
-                </a:solidFill>
-                <a:uFill>
-                  <a:solidFill>
-                    <a:srgbClr val="FFFFFF"/>
-                  </a:solidFill>
-                </a:uFill>
-                <a:latin typeface="Arial" charset="0"/>
-              </a:rPr>
-              <a:t>A veces hay confucion cuando se usan llamadas al sistema o bibliotecas de planeacion ya que en algunas el valor numerico se invierte o se asignan a diferentes propiedades (lindura).</a:t>
-            </a:r>
-            <a:endParaRPr lang="x-none" altLang="es-MX" sz="3200" b="0" strike="noStrike" spc="-1">
-              <a:solidFill>
-                <a:srgbClr val="000000"/>
-              </a:solidFill>
-              <a:uFill>
-                <a:solidFill>
-                  <a:srgbClr val="FFFFFF"/>
-                </a:solidFill>
-              </a:uFill>
-              <a:latin typeface="Arial" charset="0"/>
-            </a:endParaRPr>
-          </a:p>
-          <a:p>
-            <a:pPr marL="431800" indent="-323850" algn="just">
-              <a:buClr>
-                <a:srgbClr val="000000"/>
-              </a:buClr>
-              <a:buSzPct val="45000"/>
-              <a:buFont typeface="Wingdings" panose="05000000000000000000" charset="2"/>
-              <a:buChar char=""/>
-            </a:pPr>
-            <a:endParaRPr lang="x-none" altLang="es-MX" sz="3200" b="0" strike="noStrike" spc="-1">
-              <a:solidFill>
-                <a:srgbClr val="000000"/>
-              </a:solidFill>
-              <a:uFill>
-                <a:solidFill>
-                  <a:srgbClr val="FFFFFF"/>
-                </a:solidFill>
-              </a:uFill>
-              <a:latin typeface="Arial" charset="0"/>
-            </a:endParaRPr>
-          </a:p>
-          <a:p>
-            <a:pPr marL="431800" indent="-323850" algn="just">
-              <a:buClr>
-                <a:srgbClr val="000000"/>
-              </a:buClr>
-              <a:buSzPct val="45000"/>
-              <a:buFont typeface="Wingdings" panose="05000000000000000000" charset="2"/>
-              <a:buChar char=""/>
-            </a:pPr>
-            <a:endParaRPr lang="x-none" altLang="es-MX" sz="3200" b="0" strike="noStrike" spc="-1">
-              <a:solidFill>
-                <a:srgbClr val="000000"/>
-              </a:solidFill>
-              <a:uFill>
-                <a:solidFill>
-                  <a:srgbClr val="FFFFFF"/>
-                </a:solidFill>
-              </a:uFill>
-              <a:latin typeface="Arial" charset="0"/>
-            </a:endParaRPr>
-          </a:p>
-          <a:p>
-            <a:pPr marL="431800" indent="-323850" algn="just">
-              <a:buClr>
-                <a:srgbClr val="000000"/>
-              </a:buClr>
-              <a:buSzPct val="45000"/>
-              <a:buFont typeface="Wingdings" panose="05000000000000000000" charset="2"/>
-              <a:buChar char=""/>
-            </a:pPr>
+              <a:t>y además una priorizacion por encima de otras tareas en el sistema. Diferentes politicas de planeación son implementadas para tiempo real y normal, usando las clases de planeación.</a:t>
+            </a:r>
             <a:endParaRPr lang="x-none" altLang="es-MX" sz="3200" b="0" strike="noStrike" spc="-1">
               <a:solidFill>
                 <a:srgbClr val="000000"/>

</xml_diff>

<commit_message>
Correción de ortografía y ref extra
</commit_message>
<xml_diff>
--- a/exposiciones/planificadorCFS/planificadorCFS.pptx
+++ b/exposiciones/planificadorCFS/planificadorCFS.pptx
@@ -6637,7 +6637,7 @@
                 </a:uFill>
                 <a:latin typeface="Arial" charset="0"/>
               </a:rPr>
-              <a:t>las prioridades altas en el kernel tienen valores numericos bajos.</a:t>
+              <a:t>Las prioridades altas en el kernel tienen valores numericos bajos.</a:t>
             </a:r>
             <a:endParaRPr lang="x-none" altLang="es-MX" sz="3200" b="0" strike="noStrike" spc="-1">
               <a:solidFill>
@@ -6672,7 +6672,7 @@
                 </a:uFill>
                 <a:latin typeface="Arial" charset="0"/>
               </a:rPr>
-              <a:t>Las tareas de tiempo real tiene un rango de 1-a 99, minetras que las normales de 100-139.</a:t>
+              <a:t>Las tareas de tiempo real tienen un rango de   1 a 99, mientras que las normales de 100-139.</a:t>
             </a:r>
             <a:endParaRPr lang="x-none" altLang="es-MX" sz="3200" b="0" strike="noStrike" spc="-1">
               <a:solidFill>
@@ -6707,7 +6707,7 @@
                 </a:uFill>
                 <a:latin typeface="Arial" charset="0"/>
               </a:rPr>
-              <a:t>A veces hay confucion cuando se usan llamadas al sistema o bibliotecas de planeacion ya que en algunas el valor numerico se invierte o se asignan a diferentes propiedades (lindura).</a:t>
+              <a:t>A veces hay confusión cuando se usan llamadas al sistema o bibliotecas de planeación ya que en algunas el valor numérico se invierte o se asignan a diferentes propiedades (lindura).</a:t>
             </a:r>
             <a:endParaRPr lang="x-none" altLang="es-MX" sz="3200" b="0" strike="noStrike" spc="-1">
               <a:solidFill>
@@ -6917,7 +6917,7 @@
                 </a:uFill>
                 <a:latin typeface="Arial" charset="0"/>
               </a:rPr>
-              <a:t>El planeador de linux es modular, implementando diferentes algoritmos/politicas para planear diferentes tipos de tareas. Estas implmemtaciones estan contenidas en el archivo llamado </a:t>
+              <a:t>El planeador de linux es modular, implementando diferentes algoritmos/politicas para planear diferentes tipos de tareas. Estas implementaciones están contenidas en el archivo llamado </a:t>
             </a:r>
             <a:r>
               <a:rPr lang="x-none" altLang="es-MX" sz="3200" b="0" i="1" strike="noStrike" spc="-1">
@@ -6945,7 +6945,7 @@
                 </a:uFill>
                 <a:latin typeface="Arial" charset="0"/>
               </a:rPr>
-              <a:t>. Esta clase ofrece una interfaz al esqueleto pricipal del planeador, que lo usara para manejar las tareas de acuerdo al algoritmo implementado.</a:t>
+              <a:t>. Esta clase ofrece una interfaz al esqueleto principal del planeador, que lo usará para manejar las tareas de acuerdo al algoritmo implementado.</a:t>
             </a:r>
             <a:endParaRPr lang="x-none" altLang="es-MX" sz="3200" b="0" strike="noStrike" spc="-1">
               <a:solidFill>
@@ -7156,7 +7156,7 @@
                 </a:uFill>
                 <a:latin typeface="Arial" charset="0"/>
               </a:rPr>
-              <a:t>A excepcion del primero todos los miembros de esta estructura son funciones apuntador, las cuales, son usadas por el esqueleto del planeador para llamar a la correspondiende politica de implementacion.</a:t>
+              <a:t>A excepción del primero, todos los miembros de esta estructura son funciones apuntador, las cuales, son usadas por el esqueleto del planeador para llamar a la correspondiende politica de implementación.</a:t>
             </a:r>
             <a:endParaRPr lang="x-none" altLang="es-MX" sz="3200" b="0" strike="noStrike" spc="-1">
               <a:solidFill>
@@ -7346,7 +7346,7 @@
                 <a:latin typeface="Arial" charset="0"/>
                 <a:sym typeface="+mn-ea"/>
               </a:rPr>
-              <a:t>Todas las clases de planeacion en el kernel estan listadas por orden de prioridad. El primer miembro de la estructura llamado el siguiente, es un apuntador a la siguiente clase de planeacion, la cual tiene una prioridaad menor en la lista. Como en el siguiente ejemplo.</a:t>
+              <a:t>Todas las clases de planeación en el kernel están listadas por orden de prioridad. El primer miembro de la estructura llamado el siguiente, es un apuntador a la siguiente clase de planeación, la cual tiene una prioridad menor en la lista. Como en el siguiente ejemplo.</a:t>
             </a:r>
             <a:endParaRPr lang="x-none" altLang="es-MX" sz="3200" b="0" strike="noStrike" spc="-1">
               <a:solidFill>
@@ -7615,7 +7615,7 @@
                 </a:uFill>
                 <a:latin typeface="Arial" charset="0"/>
               </a:rPr>
-              <a:t>todo y no puede ser prevista por nada. La clase IDLE es usada para planificar la tarea IDLE la cual es ejecutada cuando no hay nada que se pueda ejecutar. Las clases de enmedio son para la implementacion de tiempo real y normal.  </a:t>
+              <a:t>todo y no puede ser prevista por nada. La clase IDLE es usada para planificar la tarea IDLE la cual es ejecutada cuando no hay nada que se pueda ejecutar. Las clases de enmedio son para la implementación de tiempo real y normal.  </a:t>
             </a:r>
             <a:endParaRPr lang="x-none" altLang="es-MX" sz="3200" b="0" strike="noStrike" spc="-1">
               <a:solidFill>
@@ -7762,7 +7762,7 @@
                 </a:uFill>
                 <a:latin typeface="Arial" charset="0"/>
               </a:rPr>
-              <a:t>Esta cola se diferencia por procesador, esta estructura esta definida en kernel/sched.c , este programa guarda pista de todos las tareas asignadas a un procesador en particular,  y maneja varias estadisticas de planeación acerca la carga del CPU para un mejor balanceo. </a:t>
+              <a:t>Esta cola se diferencia por procesador, esta estructura está definida en kernel/sched.c , este programa guarda pista de todos las tareas asignadas a un procesador en particular,  y maneja varias estadísticas de planeación acerca la carga del CPU para un mejor balanceo. </a:t>
             </a:r>
             <a:endParaRPr lang="x-none" altLang="es-MX" sz="3200" b="0" strike="noStrike" spc="-1">
               <a:solidFill>
@@ -8382,50 +8382,6 @@
           </a:p>
         </p:txBody>
       </p:sp>
-      <p:sp>
-        <p:nvSpPr>
-          <p:cNvPr id="5" name="TextShape 2"/>
-          <p:cNvSpPr txBox="1"/>
-          <p:nvPr/>
-        </p:nvSpPr>
-        <p:spPr>
-          <a:xfrm>
-            <a:off x="563885" y="1934250"/>
-            <a:ext cx="9072000" cy="4384440"/>
-          </a:xfrm>
-          <a:prstGeom prst="rect">
-            <a:avLst/>
-          </a:prstGeom>
-          <a:noFill/>
-          <a:ln>
-            <a:noFill/>
-          </a:ln>
-        </p:spPr>
-        <p:txBody>
-          <a:bodyPr lIns="0" tIns="0" rIns="0" bIns="0"/>
-          <a:p>
-            <a:pPr marL="431800" indent="-323850" algn="just">
-              <a:buClr>
-                <a:srgbClr val="000000"/>
-              </a:buClr>
-              <a:buSzPct val="45000"/>
-              <a:buFont typeface="Wingdings" panose="05000000000000000000" charset="2"/>
-              <a:buChar char=""/>
-            </a:pPr>
-            <a:endParaRPr lang="x-none" altLang="es-MX" sz="3200" b="0" strike="noStrike" spc="-1">
-              <a:solidFill>
-                <a:srgbClr val="000000"/>
-              </a:solidFill>
-              <a:uFill>
-                <a:solidFill>
-                  <a:srgbClr val="FFFFFF"/>
-                </a:solidFill>
-              </a:uFill>
-              <a:latin typeface="Arial" charset="0"/>
-            </a:endParaRPr>
-          </a:p>
-        </p:txBody>
-      </p:sp>
     </p:spTree>
   </p:cSld>
   <p:clrMapOvr>
@@ -8585,7 +8541,7 @@
                 </a:uFill>
                 <a:latin typeface="Arial" charset="0"/>
               </a:rPr>
-              <a:t> puede pasar que una tarea que se ejeuta en espacio de kernel se involutariamente expulsada por otra tarea de mayor prioridad es por eso que lo primero que se hace es ejecutar  la función  </a:t>
+              <a:t> puede pasar que una tarea que se ejecuta en espacio de kernel es involutariamente expulsada por otra tarea de mayor prioridad es por eso que lo primero que se hace es ejecutar  la función  </a:t>
             </a:r>
             <a:r>
               <a:rPr lang="x-none" altLang="es-MX" sz="3200" b="0" i="1" strike="noStrike" spc="-1">
@@ -8599,7 +8555,7 @@
                 </a:uFill>
                 <a:latin typeface="Arial" charset="0"/>
               </a:rPr>
-              <a:t>preempt_disable() </a:t>
+              <a:t>preempt_disable(), </a:t>
             </a:r>
             <a:r>
               <a:rPr lang="x-none" altLang="es-MX" sz="3200" b="0" strike="noStrike" spc="-1">
@@ -8859,7 +8815,7 @@
                 </a:uFill>
                 <a:latin typeface="Arial" charset="0"/>
               </a:rPr>
-              <a:t>Despues el planificador examamina el estado de la tarea anterior y si no es ejecutable y no ha sido expulsada del modo kernel, entonces el removida de la cola de procesos. Si no tiene bloqueo de señal pendiente, su estado es cambiado a tarea en ejecución y es dejado en la cola de procesos .</a:t>
+              <a:t>Despues el planificador examina el estado de la tarea anterior y si no es ejecutable y no ha sido expulsada del modo kernel, entonces es removida de la cola de procesos. Si no tiene bloqueo de señal pendiente, su estado es cambiado a tarea en ejecución y es dejado en la cola de procesos .</a:t>
             </a:r>
             <a:endParaRPr lang="x-none" altLang="es-MX" sz="3200" b="0" strike="noStrike" spc="-1">
               <a:solidFill>
@@ -10208,7 +10164,7 @@
                 </a:uFill>
                 <a:latin typeface="Arial" charset="0"/>
               </a:rPr>
-              <a:t>ésta itera a través de nuestra lista de clases de planeación para encontrar a la clase con la prioridad más alta que tenga una tarea ejecutable. Si la ultima tarea en ejecución fue la que se eligió como siguiente, entonces no se realiza un cambio de contexto, simplemente sigue ejecutando, si es una tarea nueva el cambio de contexto ocurre llamando a </a:t>
+              <a:t>ésta itera a través de nuestra lista de clases de planeación para encontrar a la clase con la prioridad más alta que tenga una tarea ejecutable. Si la última tarea en ejecución fue la que se eligió como siguiente, entonces no se realiza un cambio de contexto, simplemente sigue ejecutando, si es una tarea nueva el cambio de contexto ocurre llamando a </a:t>
             </a:r>
             <a:r>
               <a:rPr lang="x-none" altLang="es-MX" sz="3200" b="0" i="1" strike="noStrike" spc="-1">
@@ -10917,7 +10873,7 @@
                 </a:uFill>
                 <a:latin typeface="Arial" charset="0"/>
               </a:rPr>
-              <a:t>Apesar de la imposibilidad de manejar los procesadores de esta manera y que es altamente ineficiente por los cambios de contexto, CFS intenta a este comportamiento lo más posible. CFS guarda la pista del tiempo de ejecución de cada tarea ejecutable, también llamado </a:t>
+              <a:t>Apesar de la imposibilidad de manejar los procesadores de esta manera y que es altamente ineficiente por los cambios de contexto, CFS intenta acercase a este comportamiento lo más posible. CFS guarda la pista del tiempo de ejecución de cada tarea ejecutable, también llamado </a:t>
             </a:r>
             <a:r>
               <a:rPr lang="x-none" altLang="es-MX" sz="3200" b="0" i="1" strike="noStrike" spc="-1">
@@ -11302,7 +11258,7 @@
                 </a:uFill>
                 <a:latin typeface="Arial" charset="0"/>
               </a:rPr>
-              <a:t>Para evitar la inmensa sobrecarga de la ejecución del planificador, debido a la frecuencia de los cambios de contexto, una latencia del planificador y un minimo de granularidad del VRT fueron introducidos. </a:t>
+              <a:t>Para evitar la inmensa sobrecarga de la ejecución del planificador, debido a la frecuencia de los cambios de contexto, una latencia del planificador y un mínimo de granularidad del VRT fueron introducidos. </a:t>
             </a:r>
             <a:endParaRPr lang="x-none" altLang="es-MX" sz="3200" b="0" strike="noStrike" spc="-1">
               <a:solidFill>
@@ -11386,7 +11342,7 @@
                 </a:uFill>
                 <a:latin typeface="Arial" charset="0"/>
               </a:rPr>
-              <a:t> es una constante que tiene como proposito calcular el tiempo minimo de ejecución de una tarea, por ejemplo si el TSL es de 20 ns y hay dos tareas, cada una durará 10 ns</a:t>
+              <a:t> es una constante que tiene como propósito calcular el tiempo mínimo de ejecución de una tarea, por ejemplo si el TSL es de 20 ns y hay dos tareas, cada una durará 10 ns</a:t>
             </a:r>
             <a:endParaRPr lang="x-none" altLang="es-MX" sz="3200" b="0" strike="noStrike" spc="-1">
               <a:solidFill>
@@ -11666,7 +11622,7 @@
                 </a:uFill>
                 <a:latin typeface="Arial" charset="0"/>
               </a:rPr>
-              <a:t>2003 2.6 Planificador O(1) usa multiples colas de procesos por cada prioridad, esta era una versión más eficiente de O(n), introducido como un sistema extra para sistemas interactivos contra taras por lote. </a:t>
+              <a:t>2003 2.6 Planificador O(1) usa multiples colas de procesos por cada prioridad, esta era una versión más eficiente de O(n), introducido como un sistema extra para sistemas interactivos contra tareas por lote. </a:t>
             </a:r>
             <a:endParaRPr lang="x-none" altLang="es-MX" sz="3200" b="0" strike="noStrike" spc="-1">
               <a:solidFill>
@@ -11681,13 +11637,13 @@
             </a:endParaRPr>
           </a:p>
           <a:p>
-            <a:pPr marL="431800" indent="-323850" algn="just">
+            <a:pPr marL="107950" indent="0" algn="just">
               <a:buClr>
                 <a:srgbClr val="000000"/>
               </a:buClr>
               <a:buSzPct val="45000"/>
               <a:buFont typeface="Wingdings" panose="05000000000000000000" charset="2"/>
-              <a:buChar char=""/>
+              <a:buNone/>
             </a:pPr>
             <a:endParaRPr lang="x-none" altLang="es-MX" sz="3200" b="0" strike="noStrike" spc="-1">
               <a:solidFill>
@@ -12141,7 +12097,7 @@
                 </a:uFill>
                 <a:latin typeface="Arial" charset="0"/>
               </a:rPr>
-              <a:t>Cuando se tienen estas dos tipos de tareas ocupando un mismo procesador, se planean estas tareas pensando más en el usuario que la eficiencia, ya que aunque el usuario requiera una tarea relacionada con el procesador, la tarea de E/S se prioriza por ser interactiva. Así es que cuando se tienen estas dos tareas, se ejecutara la mayor parte del tiempo la tarea ligada al CPU, pero siempre que lo requiera la tarea E/S será ejecutada.</a:t>
+              <a:t>Cuando se tienen estas dos tipos de tareas ocupando un mismo procesador, se planean estas tareas pensando más en el usuario que la eficiencia, ya que aunque el usuario requiera una tarea relacionada con el procesador, la tarea de E/S se prioriza por ser interactiva. Así es que cuando se tienen estas dos tareas, se ejecutará la mayor parte del tiempo la tarea ligada al CPU, pero siempre que lo requiera la tarea E/S será ejecutada.</a:t>
             </a:r>
             <a:endParaRPr lang="x-none" altLang="es-MX" sz="3200" b="0" strike="noStrike" spc="-1">
               <a:solidFill>
@@ -12373,7 +12329,7 @@
         </p:nvSpPr>
         <p:spPr>
           <a:xfrm>
-            <a:off x="-66240" y="1823760"/>
+            <a:off x="-106880" y="1779945"/>
             <a:ext cx="9850320" cy="4384440"/>
           </a:xfrm>
           <a:prstGeom prst="rect">
@@ -12529,16 +12485,17 @@
               </a:rPr>
               <a:t>http://cs.boisestate.edu/~amit/teaching/597/scheduling.pdf</a:t>
             </a:r>
-            <a:endParaRPr lang="es-MX" sz="4620" b="0" strike="noStrike" spc="-1">
-              <a:solidFill>
-                <a:srgbClr val="000000"/>
-              </a:solidFill>
-              <a:uFill>
-                <a:solidFill>
-                  <a:srgbClr val="FFFFFF"/>
-                </a:solidFill>
-              </a:uFill>
-              <a:latin typeface="Arial" charset="0"/>
+            <a:endParaRPr lang="es-MX" sz="2800" b="0" strike="noStrike" spc="-1">
+              <a:solidFill>
+                <a:srgbClr val="000000"/>
+              </a:solidFill>
+              <a:uFill>
+                <a:solidFill>
+                  <a:srgbClr val="FFFFFF"/>
+                </a:solidFill>
+              </a:uFill>
+              <a:latin typeface="Arial" charset="0"/>
+              <a:hlinkClick r:id="rId1"/>
             </a:endParaRPr>
           </a:p>
           <a:p>
@@ -12550,21 +12507,111 @@
               <a:buFont typeface="Wingdings" panose="05000000000000000000" charset="2"/>
               <a:buChar char=""/>
             </a:pPr>
-            <a:r>
-              <a:rPr lang="es-MX" sz="2800" b="0" strike="noStrike" spc="-1">
-                <a:solidFill>
-                  <a:srgbClr val="000000"/>
-                </a:solidFill>
-                <a:uFill>
-                  <a:solidFill>
-                    <a:srgbClr val="FFFFFF"/>
-                  </a:solidFill>
-                </a:uFill>
-                <a:latin typeface="Arial" charset="0"/>
+            <a:endParaRPr lang="x-none" altLang="es-MX" sz="2800" b="0" strike="noStrike" spc="-1">
+              <a:solidFill>
+                <a:srgbClr val="000000"/>
+              </a:solidFill>
+              <a:uFill>
+                <a:solidFill>
+                  <a:srgbClr val="FFFFFF"/>
+                </a:solidFill>
+              </a:uFill>
+              <a:latin typeface="Arial" charset="0"/>
+              <a:hlinkClick r:id="rId1"/>
+            </a:endParaRPr>
+          </a:p>
+          <a:p>
+            <a:pPr marL="431800" indent="-323850">
+              <a:buClr>
+                <a:srgbClr val="000000"/>
+              </a:buClr>
+              <a:buSzPct val="45000"/>
+              <a:buFont typeface="Wingdings" panose="05000000000000000000" charset="2"/>
+              <a:buChar char=""/>
+            </a:pPr>
+            <a:r>
+              <a:rPr lang="es-MX" sz="2800" spc="-1">
+                <a:solidFill>
+                  <a:srgbClr val="000000"/>
+                </a:solidFill>
+                <a:uFill>
+                  <a:solidFill>
+                    <a:srgbClr val="FFFFFF"/>
+                  </a:solidFill>
+                </a:uFill>
+                <a:latin typeface="Arial" charset="0"/>
+                <a:sym typeface="+mn-ea"/>
               </a:rPr>
               <a:t> </a:t>
             </a:r>
-            <a:endParaRPr lang="es-MX" sz="4620" b="0" strike="noStrike" spc="-1">
+            <a:r>
+              <a:rPr lang="x-none" altLang="es-MX" sz="2800" b="1" spc="-1">
+                <a:solidFill>
+                  <a:srgbClr val="000000"/>
+                </a:solidFill>
+                <a:uFill>
+                  <a:solidFill>
+                    <a:srgbClr val="FFFFFF"/>
+                  </a:solidFill>
+                </a:uFill>
+                <a:latin typeface="Arial" charset="0"/>
+                <a:sym typeface="+mn-ea"/>
+              </a:rPr>
+              <a:t>Mitchell Baker</a:t>
+            </a:r>
+            <a:r>
+              <a:rPr lang="x-none" altLang="es-MX" sz="2800" spc="-1">
+                <a:solidFill>
+                  <a:srgbClr val="000000"/>
+                </a:solidFill>
+                <a:uFill>
+                  <a:solidFill>
+                    <a:srgbClr val="FFFFFF"/>
+                  </a:solidFill>
+                </a:uFill>
+                <a:latin typeface="Arial" charset="0"/>
+                <a:sym typeface="+mn-ea"/>
+              </a:rPr>
+              <a:t> </a:t>
+            </a:r>
+            <a:r>
+              <a:rPr lang="x-none" altLang="es-MX" sz="2800" b="0" strike="noStrike" spc="-1">
+                <a:solidFill>
+                  <a:srgbClr val="000000"/>
+                </a:solidFill>
+                <a:uFill>
+                  <a:solidFill>
+                    <a:srgbClr val="FFFFFF"/>
+                  </a:solidFill>
+                </a:uFill>
+                <a:latin typeface="Arial" charset="0"/>
+                <a:hlinkClick r:id="rId1"/>
+              </a:rPr>
+              <a:t>https://www.ops-class.org/slides/2016-02-29-schedulingstory/deck.html#_rsdl_2</a:t>
+            </a:r>
+            <a:endParaRPr lang="x-none" altLang="es-MX" sz="2800" b="0" strike="noStrike" spc="-1">
+              <a:solidFill>
+                <a:srgbClr val="000000"/>
+              </a:solidFill>
+              <a:uFill>
+                <a:solidFill>
+                  <a:srgbClr val="FFFFFF"/>
+                </a:solidFill>
+              </a:uFill>
+              <a:latin typeface="Arial" charset="0"/>
+              <a:hlinkClick r:id="rId1"/>
+            </a:endParaRPr>
+          </a:p>
+          <a:p>
+            <a:pPr marL="431800" indent="-323850">
+              <a:buClr>
+                <a:srgbClr val="000000"/>
+              </a:buClr>
+              <a:buSzPct val="45000"/>
+              <a:buFont typeface="Wingdings" panose="05000000000000000000" charset="2"/>
+              <a:buChar char=""/>
+            </a:pPr>
+            <a:endParaRPr lang="x-none" altLang="es-MX" sz="2800" b="0" strike="noStrike" spc="-1">
               <a:solidFill>
                 <a:srgbClr val="000000"/>
               </a:solidFill>
@@ -12961,7 +13008,7 @@
                 </a:uFill>
                 <a:latin typeface="Arial" charset="0"/>
               </a:rPr>
-              <a:t>En este contexto el planeador de procesos realiza:</a:t>
+              <a:t>En este contexto el planeador de procesos :</a:t>
             </a:r>
             <a:endParaRPr lang="es-MX" sz="2800" b="0" strike="noStrike" spc="-1">
               <a:solidFill>
@@ -12999,6 +13046,20 @@
               <a:t>1.- Comparte el CPU </a:t>
             </a:r>
             <a:r>
+              <a:rPr lang="x-none" altLang="es-MX" sz="2800" b="0" i="1" strike="noStrike" spc="-1">
+                <a:solidFill>
+                  <a:srgbClr val="000000"/>
+                </a:solidFill>
+                <a:uFill>
+                  <a:solidFill>
+                    <a:srgbClr val="FFFFFF"/>
+                  </a:solidFill>
+                </a:uFill>
+                <a:latin typeface="Arial" charset="0"/>
+              </a:rPr>
+              <a:t>equitativa</a:t>
+            </a:r>
+            <a:r>
               <a:rPr lang="es-MX" sz="2800" b="0" i="1" strike="noStrike" spc="-1">
                 <a:solidFill>
                   <a:srgbClr val="000000"/>
@@ -13010,7 +13071,7 @@
                 </a:uFill>
                 <a:latin typeface="Arial" charset="0"/>
               </a:rPr>
-              <a:t>igualitariamente </a:t>
+              <a:t>mente </a:t>
             </a:r>
             <a:r>
               <a:rPr lang="es-MX" sz="2800" b="0" strike="noStrike" spc="-1">
@@ -13024,7 +13085,35 @@
                 </a:uFill>
                 <a:latin typeface="Arial" charset="0"/>
               </a:rPr>
-              <a:t>entre los procesos que este actualmente ejecutándose.</a:t>
+              <a:t>entre los procesos que este</a:t>
+            </a:r>
+            <a:r>
+              <a:rPr lang="x-none" altLang="es-MX" sz="2800" b="0" strike="noStrike" spc="-1">
+                <a:solidFill>
+                  <a:srgbClr val="000000"/>
+                </a:solidFill>
+                <a:uFill>
+                  <a:solidFill>
+                    <a:srgbClr val="FFFFFF"/>
+                  </a:solidFill>
+                </a:uFill>
+                <a:latin typeface="Arial" charset="0"/>
+              </a:rPr>
+              <a:t>n</a:t>
+            </a:r>
+            <a:r>
+              <a:rPr lang="es-MX" sz="2800" b="0" strike="noStrike" spc="-1">
+                <a:solidFill>
+                  <a:srgbClr val="000000"/>
+                </a:solidFill>
+                <a:uFill>
+                  <a:solidFill>
+                    <a:srgbClr val="FFFFFF"/>
+                  </a:solidFill>
+                </a:uFill>
+                <a:latin typeface="Arial" charset="0"/>
+              </a:rPr>
+              <a:t> actualmente ejecutándose.</a:t>
             </a:r>
             <a:endParaRPr lang="es-MX" sz="2800" b="0" strike="noStrike" spc="-1">
               <a:solidFill>
@@ -13416,9 +13505,23 @@
                 </a:uFill>
                 <a:latin typeface="Arial" charset="0"/>
               </a:rPr>
-              <a:t>para referirse a hilos (por que en la documentación del planificador así lo hace)</a:t>
-            </a:r>
-            <a:endParaRPr lang="es-MX" sz="4620" b="0" strike="noStrike" spc="-1">
+              <a:t>para referirse a hilos</a:t>
+            </a:r>
+            <a:r>
+              <a:rPr lang="x-none" altLang="es-MX" sz="3200" b="0" i="1" strike="noStrike" spc="-1">
+                <a:solidFill>
+                  <a:srgbClr val="000000"/>
+                </a:solidFill>
+                <a:uFill>
+                  <a:solidFill>
+                    <a:srgbClr val="FFFFFF"/>
+                  </a:solidFill>
+                </a:uFill>
+                <a:latin typeface="Arial" charset="0"/>
+              </a:rPr>
+              <a:t>.</a:t>
+            </a:r>
+            <a:endParaRPr lang="x-none" altLang="es-MX" sz="3200" b="0" i="1" strike="noStrike" spc="-1">
               <a:solidFill>
                 <a:srgbClr val="000000"/>
               </a:solidFill>
@@ -13643,18 +13746,46 @@
               <a:buChar char=""/>
             </a:pPr>
             <a:r>
-              <a:rPr lang="es-MX" sz="3200" b="0" i="1" strike="noStrike" spc="-1">
-                <a:solidFill>
-                  <a:srgbClr val="000000"/>
-                </a:solidFill>
-                <a:uFill>
-                  <a:solidFill>
-                    <a:srgbClr val="FFFFFF"/>
-                  </a:solidFill>
-                </a:uFill>
-                <a:latin typeface="Arial" charset="0"/>
-              </a:rPr>
-              <a:t>Para que el sistema logre ser útil para usos genrales es necesario que el planificador sea responsivo con las tareas ligadas a E/S y eficiente con las tareas ligadas a CPU. </a:t>
+              <a:rPr lang="es-MX" sz="3200" b="0" strike="noStrike" spc="-1">
+                <a:solidFill>
+                  <a:srgbClr val="000000"/>
+                </a:solidFill>
+                <a:uFill>
+                  <a:solidFill>
+                    <a:srgbClr val="FFFFFF"/>
+                  </a:solidFill>
+                </a:uFill>
+                <a:latin typeface="Arial" charset="0"/>
+              </a:rPr>
+              <a:t>Para que el sistema logre ser útil para usos gen</a:t>
+            </a:r>
+            <a:r>
+              <a:rPr lang="x-none" altLang="es-MX" sz="3200" b="0" strike="noStrike" spc="-1">
+                <a:solidFill>
+                  <a:srgbClr val="000000"/>
+                </a:solidFill>
+                <a:uFill>
+                  <a:solidFill>
+                    <a:srgbClr val="FFFFFF"/>
+                  </a:solidFill>
+                </a:uFill>
+                <a:latin typeface="Arial" charset="0"/>
+              </a:rPr>
+              <a:t>e</a:t>
+            </a:r>
+            <a:r>
+              <a:rPr lang="es-MX" sz="3200" b="0" strike="noStrike" spc="-1">
+                <a:solidFill>
+                  <a:srgbClr val="000000"/>
+                </a:solidFill>
+                <a:uFill>
+                  <a:solidFill>
+                    <a:srgbClr val="FFFFFF"/>
+                  </a:solidFill>
+                </a:uFill>
+                <a:latin typeface="Arial" charset="0"/>
+              </a:rPr>
+              <a:t>rales es necesario que el planificador sea responsivo con las tareas ligadas a E/S y eficiente con las tareas ligadas a CPU. </a:t>
             </a:r>
             <a:endParaRPr lang="es-MX" sz="4620" b="0" strike="noStrike" spc="-1">
               <a:solidFill>
@@ -13815,7 +13946,35 @@
                 </a:uFill>
                 <a:latin typeface="Arial" charset="0"/>
               </a:rPr>
-              <a:t> procesador para responder a las tareas de E/S se tiene mayor responsiva, pero la eficiencia se ve afectada. Esto pone al planificador en un condición de dar y recibir para poner el balance los dos requerimientos.</a:t>
+              <a:t> procesador para responder a las tareas de E/S se tiene mayor responsiva, pero la eficiencia se ve afectada. Esto pone al planificador en un condición de dar y recibir para poner e</a:t>
+            </a:r>
+            <a:r>
+              <a:rPr lang="x-none" altLang="es-MX" sz="3200" b="0" strike="noStrike" spc="-1">
+                <a:solidFill>
+                  <a:srgbClr val="000000"/>
+                </a:solidFill>
+                <a:uFill>
+                  <a:solidFill>
+                    <a:srgbClr val="FFFFFF"/>
+                  </a:solidFill>
+                </a:uFill>
+                <a:latin typeface="Arial" charset="0"/>
+              </a:rPr>
+              <a:t>n</a:t>
+            </a:r>
+            <a:r>
+              <a:rPr lang="es-MX" sz="3200" b="0" strike="noStrike" spc="-1">
+                <a:solidFill>
+                  <a:srgbClr val="000000"/>
+                </a:solidFill>
+                <a:uFill>
+                  <a:solidFill>
+                    <a:srgbClr val="FFFFFF"/>
+                  </a:solidFill>
+                </a:uFill>
+                <a:latin typeface="Arial" charset="0"/>
+              </a:rPr>
+              <a:t> balance los dos requerimientos.</a:t>
             </a:r>
             <a:endParaRPr lang="es-MX" sz="4620" b="0" strike="noStrike" spc="-1">
               <a:solidFill>

</xml_diff>